<commit_message>
ppt - team struggles
</commit_message>
<xml_diff>
--- a/doc/YZY Language School Final Report.pptx
+++ b/doc/YZY Language School Final Report.pptx
@@ -7,19 +7,20 @@
     <p:sldMasterId id="2147483809" r:id="rId3"/>
   </p:sldMasterIdLst>
   <p:notesMasterIdLst>
-    <p:notesMasterId r:id="rId14"/>
+    <p:notesMasterId r:id="rId15"/>
   </p:notesMasterIdLst>
   <p:sldIdLst>
     <p:sldId id="460" r:id="rId4"/>
     <p:sldId id="467" r:id="rId5"/>
     <p:sldId id="463" r:id="rId6"/>
-    <p:sldId id="468" r:id="rId7"/>
-    <p:sldId id="469" r:id="rId8"/>
-    <p:sldId id="470" r:id="rId9"/>
-    <p:sldId id="466" r:id="rId10"/>
-    <p:sldId id="471" r:id="rId11"/>
-    <p:sldId id="464" r:id="rId12"/>
-    <p:sldId id="472" r:id="rId13"/>
+    <p:sldId id="473" r:id="rId7"/>
+    <p:sldId id="468" r:id="rId8"/>
+    <p:sldId id="469" r:id="rId9"/>
+    <p:sldId id="470" r:id="rId10"/>
+    <p:sldId id="466" r:id="rId11"/>
+    <p:sldId id="471" r:id="rId12"/>
+    <p:sldId id="464" r:id="rId13"/>
+    <p:sldId id="472" r:id="rId14"/>
   </p:sldIdLst>
   <p:sldSz cx="24384000" cy="13716000"/>
   <p:notesSz cx="6858000" cy="9144000"/>
@@ -7793,7 +7794,7 @@
           </a:ln>
           <a:extLst>
             <a:ext uri="{C572A759-6A51-4108-AA02-DFA0A04FC94B}">
-              <ma14:wrappingTextBoxFlag xmlns:ma14="http://schemas.microsoft.com/office/mac/drawingml/2011/main" xmlns="" val="1"/>
+              <ma14:wrappingTextBoxFlag xmlns="" xmlns:ma14="http://schemas.microsoft.com/office/mac/drawingml/2011/main" val="1"/>
             </a:ext>
           </a:extLst>
         </p:spPr>
@@ -7833,7 +7834,7 @@
           </a:ln>
           <a:extLst>
             <a:ext uri="{C572A759-6A51-4108-AA02-DFA0A04FC94B}">
-              <ma14:wrappingTextBoxFlag xmlns:ma14="http://schemas.microsoft.com/office/mac/drawingml/2011/main" xmlns="" val="1"/>
+              <ma14:wrappingTextBoxFlag xmlns="" xmlns:ma14="http://schemas.microsoft.com/office/mac/drawingml/2011/main" val="1"/>
             </a:ext>
           </a:extLst>
         </p:spPr>
@@ -9651,6 +9652,580 @@
 <file path=ppt/slides/slide10.xml><?xml version="1.0" encoding="utf-8"?>
 <p:sld xmlns:a="http://schemas.openxmlformats.org/drawingml/2006/main" xmlns:r="http://schemas.openxmlformats.org/officeDocument/2006/relationships" xmlns:p="http://schemas.openxmlformats.org/presentationml/2006/main">
   <p:cSld>
+    <p:bg>
+      <p:bgPr>
+        <a:solidFill>
+          <a:schemeClr val="bg1"/>
+        </a:solidFill>
+        <a:effectLst/>
+      </p:bgPr>
+    </p:bg>
+    <p:spTree>
+      <p:nvGrpSpPr>
+        <p:cNvPr id="1" name=""/>
+        <p:cNvGrpSpPr/>
+        <p:nvPr/>
+      </p:nvGrpSpPr>
+      <p:grpSpPr>
+        <a:xfrm>
+          <a:off x="0" y="0"/>
+          <a:ext cx="0" cy="0"/>
+          <a:chOff x="0" y="0"/>
+          <a:chExt cx="0" cy="0"/>
+        </a:xfrm>
+      </p:grpSpPr>
+      <p:sp useBgFill="1">
+        <p:nvSpPr>
+          <p:cNvPr id="30" name="Rectangle 29">
+            <a:extLst>
+              <a:ext uri="{FF2B5EF4-FFF2-40B4-BE49-F238E27FC236}">
+                <a16:creationId xmlns:a16="http://schemas.microsoft.com/office/drawing/2014/main" id="{38257DC7-C8AB-454B-9095-B5BE2C910D8B}"/>
+              </a:ext>
+              <a:ext uri="{C183D7F6-B498-43B3-948B-1728B52AA6E4}">
+                <adec:decorative xmlns:adec="http://schemas.microsoft.com/office/drawing/2017/decorative" val="1"/>
+              </a:ext>
+            </a:extLst>
+          </p:cNvPr>
+          <p:cNvSpPr>
+            <a:spLocks noGrp="1" noRot="1" noChangeAspect="1" noMove="1" noResize="1" noEditPoints="1" noAdjustHandles="1" noChangeArrowheads="1" noChangeShapeType="1" noTextEdit="1"/>
+          </p:cNvSpPr>
+          <p:nvPr>
+            <p:extLst>
+              <p:ext uri="{386F3935-93C4-4BCD-93E2-E3B085C9AB24}">
+                <p16:designElem xmlns:p16="http://schemas.microsoft.com/office/powerpoint/2015/main" val="1"/>
+              </p:ext>
+            </p:extLst>
+          </p:nvPr>
+        </p:nvSpPr>
+        <p:spPr>
+          <a:xfrm>
+            <a:off x="-4" y="0"/>
+            <a:ext cx="24384010" cy="13716000"/>
+          </a:xfrm>
+          <a:prstGeom prst="rect">
+            <a:avLst/>
+          </a:prstGeom>
+          <a:ln>
+            <a:noFill/>
+          </a:ln>
+        </p:spPr>
+        <p:style>
+          <a:lnRef idx="2">
+            <a:schemeClr val="accent1">
+              <a:shade val="50000"/>
+            </a:schemeClr>
+          </a:lnRef>
+          <a:fillRef idx="1">
+            <a:schemeClr val="accent1"/>
+          </a:fillRef>
+          <a:effectRef idx="0">
+            <a:schemeClr val="accent1"/>
+          </a:effectRef>
+          <a:fontRef idx="minor">
+            <a:schemeClr val="lt1"/>
+          </a:fontRef>
+        </p:style>
+        <p:txBody>
+          <a:bodyPr rtlCol="0" anchor="ctr"/>
+          <a:lstStyle/>
+          <a:p>
+            <a:pPr algn="ctr"/>
+            <a:endParaRPr lang="en-US"/>
+          </a:p>
+        </p:txBody>
+      </p:sp>
+      <p:pic>
+        <p:nvPicPr>
+          <p:cNvPr id="3" name="Picture 2" descr="Chart, bubble chart&#10;&#10;Description automatically generated">
+            <a:extLst>
+              <a:ext uri="{FF2B5EF4-FFF2-40B4-BE49-F238E27FC236}">
+                <a16:creationId xmlns:a16="http://schemas.microsoft.com/office/drawing/2014/main" id="{5C116FA5-3FF7-4695-8D7B-D42992BAC524}"/>
+              </a:ext>
+            </a:extLst>
+          </p:cNvPr>
+          <p:cNvPicPr>
+            <a:picLocks noChangeAspect="1"/>
+          </p:cNvPicPr>
+          <p:nvPr/>
+        </p:nvPicPr>
+        <p:blipFill rotWithShape="1">
+          <a:blip r:embed="rId3">
+            <a:extLst>
+              <a:ext uri="{28A0092B-C50C-407E-A947-70E740481C1C}">
+                <a14:useLocalDpi xmlns:a14="http://schemas.microsoft.com/office/drawing/2010/main" val="0"/>
+              </a:ext>
+            </a:extLst>
+          </a:blip>
+          <a:srcRect l="28733" r="31333" b="-1"/>
+          <a:stretch/>
+        </p:blipFill>
+        <p:spPr>
+          <a:xfrm>
+            <a:off x="14963234" y="1507680"/>
+            <a:ext cx="9420766" cy="12208320"/>
+          </a:xfrm>
+          <a:custGeom>
+            <a:avLst/>
+            <a:gdLst/>
+            <a:ahLst/>
+            <a:cxnLst/>
+            <a:rect l="l" t="t" r="r" b="b"/>
+            <a:pathLst>
+              <a:path w="4710383" h="6104160">
+                <a:moveTo>
+                  <a:pt x="2581213" y="5529271"/>
+                </a:moveTo>
+                <a:cubicBezTo>
+                  <a:pt x="2581213" y="5529271"/>
+                  <a:pt x="2581213" y="5529271"/>
+                  <a:pt x="4212052" y="5529271"/>
+                </a:cubicBezTo>
+                <a:cubicBezTo>
+                  <a:pt x="4314199" y="5529271"/>
+                  <a:pt x="4412824" y="5585421"/>
+                  <a:pt x="4462137" y="5676664"/>
+                </a:cubicBezTo>
+                <a:cubicBezTo>
+                  <a:pt x="4462137" y="5676664"/>
+                  <a:pt x="4462137" y="5676664"/>
+                  <a:pt x="4661644" y="6020228"/>
+                </a:cubicBezTo>
+                <a:lnTo>
+                  <a:pt x="4710383" y="6104160"/>
+                </a:lnTo>
+                <a:lnTo>
+                  <a:pt x="2080429" y="6104160"/>
+                </a:lnTo>
+                <a:lnTo>
+                  <a:pt x="2184381" y="5924374"/>
+                </a:lnTo>
+                <a:cubicBezTo>
+                  <a:pt x="2229076" y="5847072"/>
+                  <a:pt x="2276752" y="5764617"/>
+                  <a:pt x="2327605" y="5676664"/>
+                </a:cubicBezTo>
+                <a:cubicBezTo>
+                  <a:pt x="2380440" y="5585421"/>
+                  <a:pt x="2475543" y="5529271"/>
+                  <a:pt x="2581213" y="5529271"/>
+                </a:cubicBezTo>
+                <a:close/>
+                <a:moveTo>
+                  <a:pt x="2563539" y="4022432"/>
+                </a:moveTo>
+                <a:cubicBezTo>
+                  <a:pt x="2563539" y="4022432"/>
+                  <a:pt x="2563539" y="4022432"/>
+                  <a:pt x="3208691" y="4022432"/>
+                </a:cubicBezTo>
+                <a:cubicBezTo>
+                  <a:pt x="3249101" y="4022432"/>
+                  <a:pt x="3288116" y="4044644"/>
+                  <a:pt x="3307624" y="4080740"/>
+                </a:cubicBezTo>
+                <a:cubicBezTo>
+                  <a:pt x="3307624" y="4080740"/>
+                  <a:pt x="3307624" y="4080740"/>
+                  <a:pt x="3630897" y="4637438"/>
+                </a:cubicBezTo>
+                <a:cubicBezTo>
+                  <a:pt x="3651799" y="4672145"/>
+                  <a:pt x="3651799" y="4716569"/>
+                  <a:pt x="3630897" y="4751276"/>
+                </a:cubicBezTo>
+                <a:cubicBezTo>
+                  <a:pt x="3630897" y="4751276"/>
+                  <a:pt x="3630897" y="4751276"/>
+                  <a:pt x="3307624" y="5307975"/>
+                </a:cubicBezTo>
+                <a:cubicBezTo>
+                  <a:pt x="3288116" y="5344069"/>
+                  <a:pt x="3249101" y="5366282"/>
+                  <a:pt x="3208691" y="5366282"/>
+                </a:cubicBezTo>
+                <a:cubicBezTo>
+                  <a:pt x="3208691" y="5366282"/>
+                  <a:pt x="3208691" y="5366282"/>
+                  <a:pt x="2563539" y="5366282"/>
+                </a:cubicBezTo>
+                <a:cubicBezTo>
+                  <a:pt x="2521736" y="5366282"/>
+                  <a:pt x="2484114" y="5344069"/>
+                  <a:pt x="2463212" y="5307975"/>
+                </a:cubicBezTo>
+                <a:cubicBezTo>
+                  <a:pt x="2463212" y="5307975"/>
+                  <a:pt x="2463212" y="5307975"/>
+                  <a:pt x="2141332" y="4751276"/>
+                </a:cubicBezTo>
+                <a:cubicBezTo>
+                  <a:pt x="2120431" y="4716569"/>
+                  <a:pt x="2120431" y="4672145"/>
+                  <a:pt x="2141332" y="4637438"/>
+                </a:cubicBezTo>
+                <a:cubicBezTo>
+                  <a:pt x="2141332" y="4637438"/>
+                  <a:pt x="2141332" y="4637438"/>
+                  <a:pt x="2463212" y="4080740"/>
+                </a:cubicBezTo>
+                <a:cubicBezTo>
+                  <a:pt x="2484114" y="4044644"/>
+                  <a:pt x="2521736" y="4022432"/>
+                  <a:pt x="2563539" y="4022432"/>
+                </a:cubicBezTo>
+                <a:close/>
+                <a:moveTo>
+                  <a:pt x="2493311" y="3428754"/>
+                </a:moveTo>
+                <a:cubicBezTo>
+                  <a:pt x="2493311" y="3428754"/>
+                  <a:pt x="2493311" y="3428754"/>
+                  <a:pt x="2726177" y="3428754"/>
+                </a:cubicBezTo>
+                <a:cubicBezTo>
+                  <a:pt x="2740762" y="3428754"/>
+                  <a:pt x="2754844" y="3436772"/>
+                  <a:pt x="2761886" y="3449800"/>
+                </a:cubicBezTo>
+                <a:cubicBezTo>
+                  <a:pt x="2761886" y="3449800"/>
+                  <a:pt x="2761886" y="3449800"/>
+                  <a:pt x="2878570" y="3650739"/>
+                </a:cubicBezTo>
+                <a:cubicBezTo>
+                  <a:pt x="2886115" y="3663266"/>
+                  <a:pt x="2886115" y="3679301"/>
+                  <a:pt x="2878570" y="3691828"/>
+                </a:cubicBezTo>
+                <a:cubicBezTo>
+                  <a:pt x="2878570" y="3691828"/>
+                  <a:pt x="2878570" y="3691828"/>
+                  <a:pt x="2761886" y="3892766"/>
+                </a:cubicBezTo>
+                <a:cubicBezTo>
+                  <a:pt x="2754844" y="3905795"/>
+                  <a:pt x="2740762" y="3913812"/>
+                  <a:pt x="2726177" y="3913812"/>
+                </a:cubicBezTo>
+                <a:cubicBezTo>
+                  <a:pt x="2726177" y="3913812"/>
+                  <a:pt x="2726177" y="3913812"/>
+                  <a:pt x="2493311" y="3913812"/>
+                </a:cubicBezTo>
+                <a:cubicBezTo>
+                  <a:pt x="2478223" y="3913812"/>
+                  <a:pt x="2464643" y="3905795"/>
+                  <a:pt x="2457098" y="3892766"/>
+                </a:cubicBezTo>
+                <a:cubicBezTo>
+                  <a:pt x="2457098" y="3892766"/>
+                  <a:pt x="2457098" y="3892766"/>
+                  <a:pt x="2340917" y="3691828"/>
+                </a:cubicBezTo>
+                <a:cubicBezTo>
+                  <a:pt x="2333373" y="3679301"/>
+                  <a:pt x="2333373" y="3663266"/>
+                  <a:pt x="2340917" y="3650739"/>
+                </a:cubicBezTo>
+                <a:cubicBezTo>
+                  <a:pt x="2340917" y="3650739"/>
+                  <a:pt x="2340917" y="3650739"/>
+                  <a:pt x="2457098" y="3449800"/>
+                </a:cubicBezTo>
+                <a:cubicBezTo>
+                  <a:pt x="2464643" y="3436772"/>
+                  <a:pt x="2478223" y="3428754"/>
+                  <a:pt x="2493311" y="3428754"/>
+                </a:cubicBezTo>
+                <a:close/>
+                <a:moveTo>
+                  <a:pt x="1733609" y="2705264"/>
+                </a:moveTo>
+                <a:cubicBezTo>
+                  <a:pt x="1733609" y="2705264"/>
+                  <a:pt x="1733609" y="2705264"/>
+                  <a:pt x="2174613" y="2705264"/>
+                </a:cubicBezTo>
+                <a:cubicBezTo>
+                  <a:pt x="2202236" y="2705264"/>
+                  <a:pt x="2228906" y="2720447"/>
+                  <a:pt x="2242241" y="2745121"/>
+                </a:cubicBezTo>
+                <a:cubicBezTo>
+                  <a:pt x="2242241" y="2745121"/>
+                  <a:pt x="2242241" y="2745121"/>
+                  <a:pt x="2463220" y="3125661"/>
+                </a:cubicBezTo>
+                <a:cubicBezTo>
+                  <a:pt x="2477507" y="3149385"/>
+                  <a:pt x="2477507" y="3179753"/>
+                  <a:pt x="2463220" y="3203478"/>
+                </a:cubicBezTo>
+                <a:cubicBezTo>
+                  <a:pt x="2463220" y="3203478"/>
+                  <a:pt x="2463220" y="3203478"/>
+                  <a:pt x="2242241" y="3584017"/>
+                </a:cubicBezTo>
+                <a:cubicBezTo>
+                  <a:pt x="2228906" y="3608691"/>
+                  <a:pt x="2202236" y="3623874"/>
+                  <a:pt x="2174613" y="3623874"/>
+                </a:cubicBezTo>
+                <a:cubicBezTo>
+                  <a:pt x="2174613" y="3623874"/>
+                  <a:pt x="2174613" y="3623874"/>
+                  <a:pt x="1733609" y="3623874"/>
+                </a:cubicBezTo>
+                <a:cubicBezTo>
+                  <a:pt x="1705034" y="3623874"/>
+                  <a:pt x="1679316" y="3608691"/>
+                  <a:pt x="1665029" y="3584017"/>
+                </a:cubicBezTo>
+                <a:cubicBezTo>
+                  <a:pt x="1665029" y="3584017"/>
+                  <a:pt x="1665029" y="3584017"/>
+                  <a:pt x="1445004" y="3203478"/>
+                </a:cubicBezTo>
+                <a:cubicBezTo>
+                  <a:pt x="1430715" y="3179753"/>
+                  <a:pt x="1430715" y="3149385"/>
+                  <a:pt x="1445004" y="3125661"/>
+                </a:cubicBezTo>
+                <a:cubicBezTo>
+                  <a:pt x="1445004" y="3125661"/>
+                  <a:pt x="1445004" y="3125661"/>
+                  <a:pt x="1665029" y="2745121"/>
+                </a:cubicBezTo>
+                <a:cubicBezTo>
+                  <a:pt x="1679316" y="2720447"/>
+                  <a:pt x="1705034" y="2705264"/>
+                  <a:pt x="1733609" y="2705264"/>
+                </a:cubicBezTo>
+                <a:close/>
+                <a:moveTo>
+                  <a:pt x="3163744" y="1328911"/>
+                </a:moveTo>
+                <a:cubicBezTo>
+                  <a:pt x="3163744" y="1328911"/>
+                  <a:pt x="3163744" y="1328911"/>
+                  <a:pt x="3931865" y="1328911"/>
+                </a:cubicBezTo>
+                <a:cubicBezTo>
+                  <a:pt x="3979976" y="1328911"/>
+                  <a:pt x="4026428" y="1355357"/>
+                  <a:pt x="4049655" y="1398332"/>
+                </a:cubicBezTo>
+                <a:cubicBezTo>
+                  <a:pt x="4049655" y="1398332"/>
+                  <a:pt x="4049655" y="1398332"/>
+                  <a:pt x="4434545" y="2061138"/>
+                </a:cubicBezTo>
+                <a:cubicBezTo>
+                  <a:pt x="4459430" y="2102461"/>
+                  <a:pt x="4459430" y="2155353"/>
+                  <a:pt x="4434545" y="2196675"/>
+                </a:cubicBezTo>
+                <a:cubicBezTo>
+                  <a:pt x="4434545" y="2196675"/>
+                  <a:pt x="4434545" y="2196675"/>
+                  <a:pt x="4049655" y="2859481"/>
+                </a:cubicBezTo>
+                <a:cubicBezTo>
+                  <a:pt x="4026428" y="2902456"/>
+                  <a:pt x="3979976" y="2928902"/>
+                  <a:pt x="3931865" y="2928902"/>
+                </a:cubicBezTo>
+                <a:cubicBezTo>
+                  <a:pt x="3931865" y="2928902"/>
+                  <a:pt x="3931865" y="2928902"/>
+                  <a:pt x="3163744" y="2928902"/>
+                </a:cubicBezTo>
+                <a:cubicBezTo>
+                  <a:pt x="3113973" y="2928902"/>
+                  <a:pt x="3069180" y="2902456"/>
+                  <a:pt x="3044295" y="2859481"/>
+                </a:cubicBezTo>
+                <a:cubicBezTo>
+                  <a:pt x="3044295" y="2859481"/>
+                  <a:pt x="3044295" y="2859481"/>
+                  <a:pt x="2661065" y="2196675"/>
+                </a:cubicBezTo>
+                <a:cubicBezTo>
+                  <a:pt x="2636179" y="2155353"/>
+                  <a:pt x="2636179" y="2102461"/>
+                  <a:pt x="2661065" y="2061138"/>
+                </a:cubicBezTo>
+                <a:cubicBezTo>
+                  <a:pt x="2661065" y="2061138"/>
+                  <a:pt x="2661065" y="2061138"/>
+                  <a:pt x="3044295" y="1398332"/>
+                </a:cubicBezTo>
+                <a:cubicBezTo>
+                  <a:pt x="3069180" y="1355357"/>
+                  <a:pt x="3113973" y="1328911"/>
+                  <a:pt x="3163744" y="1328911"/>
+                </a:cubicBezTo>
+                <a:close/>
+                <a:moveTo>
+                  <a:pt x="841327" y="0"/>
+                </a:moveTo>
+                <a:cubicBezTo>
+                  <a:pt x="841327" y="0"/>
+                  <a:pt x="841327" y="0"/>
+                  <a:pt x="2080896" y="0"/>
+                </a:cubicBezTo>
+                <a:cubicBezTo>
+                  <a:pt x="2158536" y="0"/>
+                  <a:pt x="2233499" y="42678"/>
+                  <a:pt x="2270981" y="112029"/>
+                </a:cubicBezTo>
+                <a:cubicBezTo>
+                  <a:pt x="2270981" y="112029"/>
+                  <a:pt x="2270981" y="112029"/>
+                  <a:pt x="2892105" y="1181644"/>
+                </a:cubicBezTo>
+                <a:cubicBezTo>
+                  <a:pt x="2932263" y="1248329"/>
+                  <a:pt x="2932263" y="1333683"/>
+                  <a:pt x="2892105" y="1400367"/>
+                </a:cubicBezTo>
+                <a:cubicBezTo>
+                  <a:pt x="2892105" y="1400367"/>
+                  <a:pt x="2892105" y="1400367"/>
+                  <a:pt x="2270981" y="2469983"/>
+                </a:cubicBezTo>
+                <a:cubicBezTo>
+                  <a:pt x="2233499" y="2539334"/>
+                  <a:pt x="2158536" y="2582012"/>
+                  <a:pt x="2080896" y="2582012"/>
+                </a:cubicBezTo>
+                <a:cubicBezTo>
+                  <a:pt x="2080896" y="2582012"/>
+                  <a:pt x="2080896" y="2582012"/>
+                  <a:pt x="841327" y="2582012"/>
+                </a:cubicBezTo>
+                <a:cubicBezTo>
+                  <a:pt x="761010" y="2582012"/>
+                  <a:pt x="688724" y="2539334"/>
+                  <a:pt x="648565" y="2469983"/>
+                </a:cubicBezTo>
+                <a:cubicBezTo>
+                  <a:pt x="648565" y="2469983"/>
+                  <a:pt x="648565" y="2469983"/>
+                  <a:pt x="30120" y="1400367"/>
+                </a:cubicBezTo>
+                <a:cubicBezTo>
+                  <a:pt x="-10039" y="1333683"/>
+                  <a:pt x="-10039" y="1248329"/>
+                  <a:pt x="30120" y="1181644"/>
+                </a:cubicBezTo>
+                <a:cubicBezTo>
+                  <a:pt x="30120" y="1181644"/>
+                  <a:pt x="30120" y="1181644"/>
+                  <a:pt x="648565" y="112029"/>
+                </a:cubicBezTo>
+                <a:cubicBezTo>
+                  <a:pt x="688724" y="42678"/>
+                  <a:pt x="761010" y="0"/>
+                  <a:pt x="841327" y="0"/>
+                </a:cubicBezTo>
+                <a:close/>
+              </a:path>
+            </a:pathLst>
+          </a:custGeom>
+        </p:spPr>
+      </p:pic>
+      <p:pic>
+        <p:nvPicPr>
+          <p:cNvPr id="2" name="Picture 1">
+            <a:extLst>
+              <a:ext uri="{FF2B5EF4-FFF2-40B4-BE49-F238E27FC236}">
+                <a16:creationId xmlns:a16="http://schemas.microsoft.com/office/drawing/2014/main" id="{527DB7B3-5DCA-4062-882A-A741B9982BAF}"/>
+              </a:ext>
+            </a:extLst>
+          </p:cNvPr>
+          <p:cNvPicPr>
+            <a:picLocks noChangeAspect="1"/>
+          </p:cNvPicPr>
+          <p:nvPr/>
+        </p:nvPicPr>
+        <p:blipFill>
+          <a:blip r:embed="rId4"/>
+          <a:stretch>
+            <a:fillRect/>
+          </a:stretch>
+        </p:blipFill>
+        <p:spPr>
+          <a:xfrm>
+            <a:off x="604153" y="1912721"/>
+            <a:ext cx="5012452" cy="4311305"/>
+          </a:xfrm>
+          <a:prstGeom prst="rect">
+            <a:avLst/>
+          </a:prstGeom>
+        </p:spPr>
+      </p:pic>
+      <p:sp>
+        <p:nvSpPr>
+          <p:cNvPr id="7" name="Title 6">
+            <a:extLst>
+              <a:ext uri="{FF2B5EF4-FFF2-40B4-BE49-F238E27FC236}">
+                <a16:creationId xmlns:a16="http://schemas.microsoft.com/office/drawing/2014/main" id="{8CE7791B-2975-4C35-98EB-8B19B282F523}"/>
+              </a:ext>
+            </a:extLst>
+          </p:cNvPr>
+          <p:cNvSpPr>
+            <a:spLocks noGrp="1"/>
+          </p:cNvSpPr>
+          <p:nvPr>
+            <p:ph type="title"/>
+          </p:nvPr>
+        </p:nvSpPr>
+        <p:spPr/>
+        <p:txBody>
+          <a:bodyPr>
+            <a:normAutofit/>
+          </a:bodyPr>
+          <a:lstStyle/>
+          <a:p>
+            <a:r>
+              <a:rPr lang="en-US" sz="6000" b="1" dirty="0">
+                <a:solidFill>
+                  <a:schemeClr val="tx1"/>
+                </a:solidFill>
+                <a:effectLst>
+                  <a:outerShdw blurRad="38100" dist="38100" dir="2700000" algn="tl">
+                    <a:srgbClr val="000000">
+                      <a:alpha val="43137"/>
+                    </a:srgbClr>
+                  </a:outerShdw>
+                </a:effectLst>
+                <a:latin typeface="+mj-lt"/>
+                <a:ea typeface="+mj-ea"/>
+                <a:cs typeface="+mj-cs"/>
+              </a:rPr>
+              <a:t>Database Migration</a:t>
+            </a:r>
+            <a:endParaRPr lang="en-US" sz="6000" dirty="0"/>
+          </a:p>
+        </p:txBody>
+      </p:sp>
+    </p:spTree>
+    <p:extLst>
+      <p:ext uri="{BB962C8B-B14F-4D97-AF65-F5344CB8AC3E}">
+        <p14:creationId xmlns:p14="http://schemas.microsoft.com/office/powerpoint/2010/main" val="3149809871"/>
+      </p:ext>
+    </p:extLst>
+  </p:cSld>
+  <p:clrMapOvr>
+    <a:masterClrMapping/>
+  </p:clrMapOvr>
+</p:sld>
+</file>
+
+<file path=ppt/slides/slide11.xml><?xml version="1.0" encoding="utf-8"?>
+<p:sld xmlns:a="http://schemas.openxmlformats.org/drawingml/2006/main" xmlns:r="http://schemas.openxmlformats.org/officeDocument/2006/relationships" xmlns:p="http://schemas.openxmlformats.org/presentationml/2006/main">
+  <p:cSld>
     <p:spTree>
       <p:nvGrpSpPr>
         <p:cNvPr id="1" name=""/>
@@ -9894,6 +10469,27 @@
                 <a:latin typeface="+mj-lt"/>
                 <a:ea typeface="+mj-ea"/>
                 <a:cs typeface="+mj-cs"/>
+              </a:rPr>
+            </a:br>
+            <a:r>
+              <a:rPr lang="en-US" sz="3600" dirty="0">
+                <a:solidFill>
+                  <a:schemeClr val="tx1"/>
+                </a:solidFill>
+                <a:latin typeface="+mn-lt"/>
+                <a:ea typeface="+mn-ea"/>
+                <a:cs typeface="+mn-cs"/>
+              </a:rPr>
+              <a:t>- Struggles of the project</a:t>
+            </a:r>
+            <a:br>
+              <a:rPr lang="en-US" sz="3600" dirty="0">
+                <a:solidFill>
+                  <a:schemeClr val="tx1"/>
+                </a:solidFill>
+                <a:latin typeface="+mn-lt"/>
+                <a:ea typeface="+mn-ea"/>
+                <a:cs typeface="+mn-cs"/>
               </a:rPr>
             </a:br>
             <a:r>
@@ -11475,6 +12071,628 @@
           </a:p>
         </p:txBody>
       </p:sp>
+      <p:sp>
+        <p:nvSpPr>
+          <p:cNvPr id="2" name="TextBox 1">
+            <a:extLst>
+              <a:ext uri="{FF2B5EF4-FFF2-40B4-BE49-F238E27FC236}">
+                <a16:creationId xmlns:a16="http://schemas.microsoft.com/office/drawing/2014/main" id="{31E610BA-2445-48AC-8748-FC944DAA41F9}"/>
+              </a:ext>
+            </a:extLst>
+          </p:cNvPr>
+          <p:cNvSpPr txBox="1"/>
+          <p:nvPr/>
+        </p:nvSpPr>
+        <p:spPr>
+          <a:xfrm>
+            <a:off x="419099" y="2614963"/>
+            <a:ext cx="14502246" cy="3416320"/>
+          </a:xfrm>
+          <a:prstGeom prst="rect">
+            <a:avLst/>
+          </a:prstGeom>
+          <a:noFill/>
+        </p:spPr>
+        <p:txBody>
+          <a:bodyPr wrap="square" rtlCol="0">
+            <a:spAutoFit/>
+          </a:bodyPr>
+          <a:lstStyle/>
+          <a:p>
+            <a:pPr marL="914400" indent="-914400" algn="l">
+              <a:buFont typeface="+mj-lt"/>
+              <a:buAutoNum type="arabicPeriod"/>
+            </a:pPr>
+            <a:r>
+              <a:rPr lang="en-US" sz="3600" b="1" dirty="0">
+                <a:solidFill>
+                  <a:schemeClr val="tx1">
+                    <a:lumMod val="65000"/>
+                    <a:lumOff val="35000"/>
+                  </a:schemeClr>
+                </a:solidFill>
+                <a:latin typeface="+mj-lt"/>
+                <a:ea typeface="+mj-ea"/>
+                <a:cs typeface="+mj-cs"/>
+              </a:rPr>
+              <a:t>Bulk Data needs migration from local database to Azure</a:t>
+            </a:r>
+          </a:p>
+          <a:p>
+            <a:pPr marL="914400" indent="-914400" algn="l">
+              <a:buFont typeface="+mj-lt"/>
+              <a:buAutoNum type="arabicPeriod"/>
+            </a:pPr>
+            <a:r>
+              <a:rPr lang="en-US" sz="3600" b="1" dirty="0">
+                <a:solidFill>
+                  <a:schemeClr val="tx1">
+                    <a:lumMod val="65000"/>
+                    <a:lumOff val="35000"/>
+                  </a:schemeClr>
+                </a:solidFill>
+                <a:latin typeface="+mj-lt"/>
+                <a:ea typeface="+mj-ea"/>
+                <a:cs typeface="+mj-cs"/>
+              </a:rPr>
+              <a:t>Database Design has to be altered for coding convenience</a:t>
+            </a:r>
+          </a:p>
+          <a:p>
+            <a:pPr marL="914400" indent="-914400" algn="l">
+              <a:buFont typeface="+mj-lt"/>
+              <a:buAutoNum type="arabicPeriod"/>
+            </a:pPr>
+            <a:r>
+              <a:rPr lang="en-US" sz="3600" b="1" dirty="0">
+                <a:solidFill>
+                  <a:schemeClr val="tx1">
+                    <a:lumMod val="65000"/>
+                    <a:lumOff val="35000"/>
+                  </a:schemeClr>
+                </a:solidFill>
+                <a:latin typeface="+mj-lt"/>
+                <a:ea typeface="+mj-ea"/>
+                <a:cs typeface="+mj-cs"/>
+              </a:rPr>
+              <a:t>Database Validation conflicts with the one of Code Side</a:t>
+            </a:r>
+          </a:p>
+          <a:p>
+            <a:pPr marL="914400" indent="-914400" algn="l">
+              <a:buFont typeface="+mj-lt"/>
+              <a:buAutoNum type="arabicPeriod"/>
+            </a:pPr>
+            <a:r>
+              <a:rPr lang="en-US" sz="3600" b="1" dirty="0">
+                <a:solidFill>
+                  <a:schemeClr val="tx1">
+                    <a:lumMod val="65000"/>
+                    <a:lumOff val="35000"/>
+                  </a:schemeClr>
+                </a:solidFill>
+                <a:latin typeface="+mj-lt"/>
+                <a:ea typeface="+mj-ea"/>
+                <a:cs typeface="+mj-cs"/>
+              </a:rPr>
+              <a:t>MVVM is super for teamwork and Unit Test, but need time to get familiar</a:t>
+            </a:r>
+          </a:p>
+          <a:p>
+            <a:pPr marL="914400" indent="-914400" algn="l">
+              <a:buFont typeface="+mj-lt"/>
+              <a:buAutoNum type="arabicPeriod"/>
+            </a:pPr>
+            <a:r>
+              <a:rPr lang="en-US" sz="3600" b="1" dirty="0">
+                <a:solidFill>
+                  <a:schemeClr val="tx1">
+                    <a:lumMod val="65000"/>
+                    <a:lumOff val="35000"/>
+                  </a:schemeClr>
+                </a:solidFill>
+                <a:latin typeface="+mj-lt"/>
+                <a:ea typeface="+mj-ea"/>
+                <a:cs typeface="+mj-cs"/>
+              </a:rPr>
+              <a:t>Performance need further optimization</a:t>
+            </a:r>
+          </a:p>
+          <a:p>
+            <a:pPr marL="914400" indent="-914400" algn="l">
+              <a:buFont typeface="+mj-lt"/>
+              <a:buAutoNum type="arabicPeriod"/>
+            </a:pPr>
+            <a:r>
+              <a:rPr lang="en-US" sz="3600" b="1" dirty="0">
+                <a:solidFill>
+                  <a:schemeClr val="tx1">
+                    <a:lumMod val="65000"/>
+                    <a:lumOff val="35000"/>
+                  </a:schemeClr>
+                </a:solidFill>
+                <a:latin typeface="+mj-lt"/>
+                <a:ea typeface="+mj-ea"/>
+                <a:cs typeface="+mj-cs"/>
+              </a:rPr>
+              <a:t>How to integrate JS Payment Gateway with WPF desktop App</a:t>
+            </a:r>
+          </a:p>
+        </p:txBody>
+      </p:sp>
+      <p:sp>
+        <p:nvSpPr>
+          <p:cNvPr id="7" name="Title 6">
+            <a:extLst>
+              <a:ext uri="{FF2B5EF4-FFF2-40B4-BE49-F238E27FC236}">
+                <a16:creationId xmlns:a16="http://schemas.microsoft.com/office/drawing/2014/main" id="{B86906AC-5EF2-4E3E-B81D-6950BDD8E582}"/>
+              </a:ext>
+            </a:extLst>
+          </p:cNvPr>
+          <p:cNvSpPr txBox="1">
+            <a:spLocks/>
+          </p:cNvSpPr>
+          <p:nvPr/>
+        </p:nvSpPr>
+        <p:spPr>
+          <a:xfrm>
+            <a:off x="419099" y="269875"/>
+            <a:ext cx="15042573" cy="1655763"/>
+          </a:xfrm>
+          <a:prstGeom prst="rect">
+            <a:avLst/>
+          </a:prstGeom>
+        </p:spPr>
+        <p:txBody>
+          <a:bodyPr vert="horz" lIns="91440" tIns="45720" rIns="91440" bIns="45720" rtlCol="0" anchor="ctr">
+            <a:normAutofit/>
+          </a:bodyPr>
+          <a:lstStyle>
+            <a:lvl1pPr algn="l" defTabSz="914400" rtl="0" eaLnBrk="1" latinLnBrk="0" hangingPunct="1">
+              <a:lnSpc>
+                <a:spcPct val="90000"/>
+              </a:lnSpc>
+              <a:spcBef>
+                <a:spcPct val="0"/>
+              </a:spcBef>
+              <a:buNone/>
+              <a:defRPr sz="4400" b="0" i="0" kern="1200">
+                <a:solidFill>
+                  <a:schemeClr val="bg1"/>
+                </a:solidFill>
+                <a:latin typeface="Lato Thin" charset="0"/>
+                <a:ea typeface="Lato Thin" charset="0"/>
+                <a:cs typeface="Lato Thin" charset="0"/>
+              </a:defRPr>
+            </a:lvl1pPr>
+          </a:lstStyle>
+          <a:p>
+            <a:r>
+              <a:rPr lang="en-US" sz="6000" b="1" dirty="0">
+                <a:solidFill>
+                  <a:schemeClr val="tx1"/>
+                </a:solidFill>
+                <a:effectLst>
+                  <a:outerShdw blurRad="38100" dist="38100" dir="2700000" algn="tl">
+                    <a:srgbClr val="000000">
+                      <a:alpha val="43137"/>
+                    </a:srgbClr>
+                  </a:outerShdw>
+                </a:effectLst>
+                <a:latin typeface="+mj-lt"/>
+                <a:ea typeface="+mj-ea"/>
+                <a:cs typeface="+mj-cs"/>
+              </a:rPr>
+              <a:t>Struggles in the first Client-Server Project</a:t>
+            </a:r>
+            <a:endParaRPr lang="en-US" sz="6000" dirty="0"/>
+          </a:p>
+        </p:txBody>
+      </p:sp>
+    </p:spTree>
+    <p:extLst>
+      <p:ext uri="{BB962C8B-B14F-4D97-AF65-F5344CB8AC3E}">
+        <p14:creationId xmlns:p14="http://schemas.microsoft.com/office/powerpoint/2010/main" val="3783292667"/>
+      </p:ext>
+    </p:extLst>
+  </p:cSld>
+  <p:clrMapOvr>
+    <a:masterClrMapping/>
+  </p:clrMapOvr>
+</p:sld>
+</file>
+
+<file path=ppt/slides/slide5.xml><?xml version="1.0" encoding="utf-8"?>
+<p:sld xmlns:a="http://schemas.openxmlformats.org/drawingml/2006/main" xmlns:r="http://schemas.openxmlformats.org/officeDocument/2006/relationships" xmlns:p="http://schemas.openxmlformats.org/presentationml/2006/main">
+  <p:cSld>
+    <p:bg>
+      <p:bgPr>
+        <a:solidFill>
+          <a:schemeClr val="bg1"/>
+        </a:solidFill>
+        <a:effectLst/>
+      </p:bgPr>
+    </p:bg>
+    <p:spTree>
+      <p:nvGrpSpPr>
+        <p:cNvPr id="1" name=""/>
+        <p:cNvGrpSpPr/>
+        <p:nvPr/>
+      </p:nvGrpSpPr>
+      <p:grpSpPr>
+        <a:xfrm>
+          <a:off x="0" y="0"/>
+          <a:ext cx="0" cy="0"/>
+          <a:chOff x="0" y="0"/>
+          <a:chExt cx="0" cy="0"/>
+        </a:xfrm>
+      </p:grpSpPr>
+      <p:pic>
+        <p:nvPicPr>
+          <p:cNvPr id="3" name="Picture 2" descr="Chart, bubble chart&#10;&#10;Description automatically generated">
+            <a:extLst>
+              <a:ext uri="{FF2B5EF4-FFF2-40B4-BE49-F238E27FC236}">
+                <a16:creationId xmlns:a16="http://schemas.microsoft.com/office/drawing/2014/main" id="{5C116FA5-3FF7-4695-8D7B-D42992BAC524}"/>
+              </a:ext>
+            </a:extLst>
+          </p:cNvPr>
+          <p:cNvPicPr>
+            <a:picLocks noChangeAspect="1"/>
+          </p:cNvPicPr>
+          <p:nvPr/>
+        </p:nvPicPr>
+        <p:blipFill rotWithShape="1">
+          <a:blip r:embed="rId2">
+            <a:extLst>
+              <a:ext uri="{28A0092B-C50C-407E-A947-70E740481C1C}">
+                <a14:useLocalDpi xmlns:a14="http://schemas.microsoft.com/office/drawing/2010/main" val="0"/>
+              </a:ext>
+            </a:extLst>
+          </a:blip>
+          <a:srcRect l="10976" r="30151"/>
+          <a:stretch/>
+        </p:blipFill>
+        <p:spPr>
+          <a:xfrm>
+            <a:off x="12710884" y="10"/>
+            <a:ext cx="11673116" cy="10260818"/>
+          </a:xfrm>
+          <a:custGeom>
+            <a:avLst/>
+            <a:gdLst/>
+            <a:ahLst/>
+            <a:cxnLst/>
+            <a:rect l="l" t="t" r="r" b="b"/>
+            <a:pathLst>
+              <a:path w="5836558" h="5130414">
+                <a:moveTo>
+                  <a:pt x="2376055" y="0"/>
+                </a:moveTo>
+                <a:lnTo>
+                  <a:pt x="5836558" y="0"/>
+                </a:lnTo>
+                <a:lnTo>
+                  <a:pt x="5836558" y="5130414"/>
+                </a:lnTo>
+                <a:lnTo>
+                  <a:pt x="0" y="5130414"/>
+                </a:lnTo>
+                <a:close/>
+              </a:path>
+            </a:pathLst>
+          </a:custGeom>
+        </p:spPr>
+      </p:pic>
+      <p:sp>
+        <p:nvSpPr>
+          <p:cNvPr id="16" name="Freeform: Shape 15">
+            <a:extLst>
+              <a:ext uri="{FF2B5EF4-FFF2-40B4-BE49-F238E27FC236}">
+                <a16:creationId xmlns:a16="http://schemas.microsoft.com/office/drawing/2014/main" id="{5EB73228-F09B-409F-9EC1-7E853C4F5B43}"/>
+              </a:ext>
+              <a:ext uri="{C183D7F6-B498-43B3-948B-1728B52AA6E4}">
+                <adec:decorative xmlns:adec="http://schemas.microsoft.com/office/drawing/2017/decorative" val="1"/>
+              </a:ext>
+            </a:extLst>
+          </p:cNvPr>
+          <p:cNvSpPr>
+            <a:spLocks noGrp="1" noRot="1" noChangeAspect="1" noMove="1" noResize="1" noEditPoints="1" noAdjustHandles="1" noChangeArrowheads="1" noChangeShapeType="1" noTextEdit="1"/>
+          </p:cNvSpPr>
+          <p:nvPr>
+            <p:extLst>
+              <p:ext uri="{386F3935-93C4-4BCD-93E2-E3B085C9AB24}">
+                <p16:designElem xmlns:p16="http://schemas.microsoft.com/office/powerpoint/2015/main" val="1"/>
+              </p:ext>
+            </p:extLst>
+          </p:nvPr>
+        </p:nvSpPr>
+        <p:spPr>
+          <a:xfrm>
+            <a:off x="11163680" y="10585018"/>
+            <a:ext cx="13220320" cy="3130982"/>
+          </a:xfrm>
+          <a:custGeom>
+            <a:avLst/>
+            <a:gdLst>
+              <a:gd name="connsiteX0" fmla="*/ 1186806 w 6610160"/>
+              <a:gd name="connsiteY0" fmla="*/ 0 h 1565491"/>
+              <a:gd name="connsiteX1" fmla="*/ 1692132 w 6610160"/>
+              <a:gd name="connsiteY1" fmla="*/ 0 h 1565491"/>
+              <a:gd name="connsiteX2" fmla="*/ 6104834 w 6610160"/>
+              <a:gd name="connsiteY2" fmla="*/ 0 h 1565491"/>
+              <a:gd name="connsiteX3" fmla="*/ 6610160 w 6610160"/>
+              <a:gd name="connsiteY3" fmla="*/ 0 h 1565491"/>
+              <a:gd name="connsiteX4" fmla="*/ 6610160 w 6610160"/>
+              <a:gd name="connsiteY4" fmla="*/ 1565491 h 1565491"/>
+              <a:gd name="connsiteX5" fmla="*/ 0 w 6610160"/>
+              <a:gd name="connsiteY5" fmla="*/ 1565491 h 1565491"/>
+              <a:gd name="connsiteX6" fmla="*/ 724290 w 6610160"/>
+              <a:gd name="connsiteY6" fmla="*/ 1591 h 1565491"/>
+              <a:gd name="connsiteX7" fmla="*/ 1186070 w 6610160"/>
+              <a:gd name="connsiteY7" fmla="*/ 1591 h 1565491"/>
+            </a:gdLst>
+            <a:ahLst/>
+            <a:cxnLst>
+              <a:cxn ang="0">
+                <a:pos x="connsiteX0" y="connsiteY0"/>
+              </a:cxn>
+              <a:cxn ang="0">
+                <a:pos x="connsiteX1" y="connsiteY1"/>
+              </a:cxn>
+              <a:cxn ang="0">
+                <a:pos x="connsiteX2" y="connsiteY2"/>
+              </a:cxn>
+              <a:cxn ang="0">
+                <a:pos x="connsiteX3" y="connsiteY3"/>
+              </a:cxn>
+              <a:cxn ang="0">
+                <a:pos x="connsiteX4" y="connsiteY4"/>
+              </a:cxn>
+              <a:cxn ang="0">
+                <a:pos x="connsiteX5" y="connsiteY5"/>
+              </a:cxn>
+              <a:cxn ang="0">
+                <a:pos x="connsiteX6" y="connsiteY6"/>
+              </a:cxn>
+              <a:cxn ang="0">
+                <a:pos x="connsiteX7" y="connsiteY7"/>
+              </a:cxn>
+            </a:cxnLst>
+            <a:rect l="l" t="t" r="r" b="b"/>
+            <a:pathLst>
+              <a:path w="6610160" h="1565491">
+                <a:moveTo>
+                  <a:pt x="1186806" y="0"/>
+                </a:moveTo>
+                <a:lnTo>
+                  <a:pt x="1692132" y="0"/>
+                </a:lnTo>
+                <a:lnTo>
+                  <a:pt x="6104834" y="0"/>
+                </a:lnTo>
+                <a:lnTo>
+                  <a:pt x="6610160" y="0"/>
+                </a:lnTo>
+                <a:lnTo>
+                  <a:pt x="6610160" y="1565491"/>
+                </a:lnTo>
+                <a:lnTo>
+                  <a:pt x="0" y="1565491"/>
+                </a:lnTo>
+                <a:lnTo>
+                  <a:pt x="724290" y="1591"/>
+                </a:lnTo>
+                <a:lnTo>
+                  <a:pt x="1186070" y="1591"/>
+                </a:lnTo>
+                <a:close/>
+              </a:path>
+            </a:pathLst>
+          </a:custGeom>
+          <a:solidFill>
+            <a:srgbClr val="262626"/>
+          </a:solidFill>
+          <a:ln>
+            <a:noFill/>
+          </a:ln>
+        </p:spPr>
+        <p:style>
+          <a:lnRef idx="2">
+            <a:schemeClr val="accent1">
+              <a:shade val="50000"/>
+            </a:schemeClr>
+          </a:lnRef>
+          <a:fillRef idx="1">
+            <a:schemeClr val="accent1"/>
+          </a:fillRef>
+          <a:effectRef idx="0">
+            <a:schemeClr val="accent1"/>
+          </a:effectRef>
+          <a:fontRef idx="minor">
+            <a:schemeClr val="lt1"/>
+          </a:fontRef>
+        </p:style>
+        <p:txBody>
+          <a:bodyPr wrap="square" rtlCol="0" anchor="ctr">
+            <a:noAutofit/>
+          </a:bodyPr>
+          <a:lstStyle/>
+          <a:p>
+            <a:pPr marL="0" marR="0" lvl="0" indent="0" algn="ctr" defTabSz="825175" rtl="0" eaLnBrk="1" fontAlgn="auto" latinLnBrk="0" hangingPunct="0">
+              <a:lnSpc>
+                <a:spcPct val="100000"/>
+              </a:lnSpc>
+              <a:spcBef>
+                <a:spcPts val="0"/>
+              </a:spcBef>
+              <a:spcAft>
+                <a:spcPts val="0"/>
+              </a:spcAft>
+              <a:buClrTx/>
+              <a:buSzTx/>
+              <a:buFontTx/>
+              <a:buNone/>
+              <a:tabLst/>
+              <a:defRPr/>
+            </a:pPr>
+            <a:endParaRPr kumimoji="0" lang="en-US" sz="5000" b="0" i="0" u="none" strike="noStrike" kern="0" cap="none" spc="0" normalizeH="0" baseline="0" noProof="0">
+              <a:ln>
+                <a:noFill/>
+              </a:ln>
+              <a:solidFill>
+                <a:prstClr val="white"/>
+              </a:solidFill>
+              <a:effectLst/>
+              <a:uLnTx/>
+              <a:uFillTx/>
+              <a:latin typeface="Calibri"/>
+              <a:ea typeface="+mn-ea"/>
+              <a:cs typeface="+mn-cs"/>
+              <a:sym typeface="Helvetica Light"/>
+            </a:endParaRPr>
+          </a:p>
+        </p:txBody>
+      </p:sp>
+      <p:sp>
+        <p:nvSpPr>
+          <p:cNvPr id="18" name="Freeform: Shape 17">
+            <a:extLst>
+              <a:ext uri="{FF2B5EF4-FFF2-40B4-BE49-F238E27FC236}">
+                <a16:creationId xmlns:a16="http://schemas.microsoft.com/office/drawing/2014/main" id="{3150A4AE-7BE7-480D-BD8C-3951E6479910}"/>
+              </a:ext>
+              <a:ext uri="{C183D7F6-B498-43B3-948B-1728B52AA6E4}">
+                <adec:decorative xmlns:adec="http://schemas.microsoft.com/office/drawing/2017/decorative" val="1"/>
+              </a:ext>
+            </a:extLst>
+          </p:cNvPr>
+          <p:cNvSpPr>
+            <a:spLocks noGrp="1" noRot="1" noChangeAspect="1" noMove="1" noResize="1" noEditPoints="1" noAdjustHandles="1" noChangeArrowheads="1" noChangeShapeType="1" noTextEdit="1"/>
+          </p:cNvSpPr>
+          <p:nvPr>
+            <p:extLst>
+              <p:ext uri="{386F3935-93C4-4BCD-93E2-E3B085C9AB24}">
+                <p16:designElem xmlns:p16="http://schemas.microsoft.com/office/powerpoint/2015/main" val="1"/>
+              </p:ext>
+            </p:extLst>
+          </p:nvPr>
+        </p:nvSpPr>
+        <p:spPr>
+          <a:xfrm>
+            <a:off x="0" y="10585020"/>
+            <a:ext cx="12288740" cy="3130982"/>
+          </a:xfrm>
+          <a:custGeom>
+            <a:avLst/>
+            <a:gdLst>
+              <a:gd name="connsiteX0" fmla="*/ 0 w 6144370"/>
+              <a:gd name="connsiteY0" fmla="*/ 0 h 1565491"/>
+              <a:gd name="connsiteX1" fmla="*/ 6144370 w 6144370"/>
+              <a:gd name="connsiteY1" fmla="*/ 0 h 1565491"/>
+              <a:gd name="connsiteX2" fmla="*/ 5419344 w 6144370"/>
+              <a:gd name="connsiteY2" fmla="*/ 1565491 h 1565491"/>
+              <a:gd name="connsiteX3" fmla="*/ 0 w 6144370"/>
+              <a:gd name="connsiteY3" fmla="*/ 1565491 h 1565491"/>
+            </a:gdLst>
+            <a:ahLst/>
+            <a:cxnLst>
+              <a:cxn ang="0">
+                <a:pos x="connsiteX0" y="connsiteY0"/>
+              </a:cxn>
+              <a:cxn ang="0">
+                <a:pos x="connsiteX1" y="connsiteY1"/>
+              </a:cxn>
+              <a:cxn ang="0">
+                <a:pos x="connsiteX2" y="connsiteY2"/>
+              </a:cxn>
+              <a:cxn ang="0">
+                <a:pos x="connsiteX3" y="connsiteY3"/>
+              </a:cxn>
+            </a:cxnLst>
+            <a:rect l="l" t="t" r="r" b="b"/>
+            <a:pathLst>
+              <a:path w="6144370" h="1565491">
+                <a:moveTo>
+                  <a:pt x="0" y="0"/>
+                </a:moveTo>
+                <a:lnTo>
+                  <a:pt x="6144370" y="0"/>
+                </a:lnTo>
+                <a:lnTo>
+                  <a:pt x="5419344" y="1565491"/>
+                </a:lnTo>
+                <a:lnTo>
+                  <a:pt x="0" y="1565491"/>
+                </a:lnTo>
+                <a:close/>
+              </a:path>
+            </a:pathLst>
+          </a:custGeom>
+          <a:solidFill>
+            <a:srgbClr val="B4B4B4">
+              <a:alpha val="50000"/>
+            </a:srgbClr>
+          </a:solidFill>
+          <a:ln>
+            <a:noFill/>
+          </a:ln>
+        </p:spPr>
+        <p:style>
+          <a:lnRef idx="2">
+            <a:schemeClr val="accent1">
+              <a:shade val="50000"/>
+            </a:schemeClr>
+          </a:lnRef>
+          <a:fillRef idx="1">
+            <a:schemeClr val="accent1"/>
+          </a:fillRef>
+          <a:effectRef idx="0">
+            <a:schemeClr val="accent1"/>
+          </a:effectRef>
+          <a:fontRef idx="minor">
+            <a:schemeClr val="lt1"/>
+          </a:fontRef>
+        </p:style>
+        <p:txBody>
+          <a:bodyPr wrap="square" rtlCol="0" anchor="ctr">
+            <a:noAutofit/>
+          </a:bodyPr>
+          <a:lstStyle/>
+          <a:p>
+            <a:pPr marL="0" marR="0" lvl="0" indent="0" algn="ctr" defTabSz="825175" rtl="0" eaLnBrk="1" fontAlgn="auto" latinLnBrk="0" hangingPunct="0">
+              <a:lnSpc>
+                <a:spcPct val="100000"/>
+              </a:lnSpc>
+              <a:spcBef>
+                <a:spcPts val="0"/>
+              </a:spcBef>
+              <a:spcAft>
+                <a:spcPts val="0"/>
+              </a:spcAft>
+              <a:buClrTx/>
+              <a:buSzTx/>
+              <a:buFontTx/>
+              <a:buNone/>
+              <a:tabLst/>
+              <a:defRPr/>
+            </a:pPr>
+            <a:endParaRPr kumimoji="0" lang="en-US" sz="5000" b="0" i="0" u="none" strike="noStrike" kern="0" cap="none" spc="0" normalizeH="0" baseline="0" noProof="0">
+              <a:ln>
+                <a:noFill/>
+              </a:ln>
+              <a:solidFill>
+                <a:prstClr val="white"/>
+              </a:solidFill>
+              <a:effectLst/>
+              <a:uLnTx/>
+              <a:uFillTx/>
+              <a:latin typeface="Calibri"/>
+              <a:ea typeface="+mn-ea"/>
+              <a:cs typeface="+mn-cs"/>
+              <a:sym typeface="Helvetica Light"/>
+            </a:endParaRPr>
+          </a:p>
+        </p:txBody>
+      </p:sp>
       <p:pic>
         <p:nvPicPr>
           <p:cNvPr id="4" name="Picture 3" descr="A picture containing diagram&#10;&#10;Description automatically generated">
@@ -11736,7 +12954,7 @@
 </p:sld>
 </file>
 
-<file path=ppt/slides/slide5.xml><?xml version="1.0" encoding="utf-8"?>
+<file path=ppt/slides/slide6.xml><?xml version="1.0" encoding="utf-8"?>
 <p:sld xmlns:a="http://schemas.openxmlformats.org/drawingml/2006/main" xmlns:r="http://schemas.openxmlformats.org/officeDocument/2006/relationships" xmlns:p="http://schemas.openxmlformats.org/presentationml/2006/main">
   <p:cSld>
     <p:bg>
@@ -13328,7 +14546,7 @@
 </p:sld>
 </file>
 
-<file path=ppt/slides/slide6.xml><?xml version="1.0" encoding="utf-8"?>
+<file path=ppt/slides/slide7.xml><?xml version="1.0" encoding="utf-8"?>
 <p:sld xmlns:a="http://schemas.openxmlformats.org/drawingml/2006/main" xmlns:r="http://schemas.openxmlformats.org/officeDocument/2006/relationships" xmlns:p="http://schemas.openxmlformats.org/presentationml/2006/main">
   <p:cSld>
     <p:bg>
@@ -14676,6 +15894,114 @@
           </p:txBody>
         </p:sp>
       </p:grpSp>
+      <p:sp>
+        <p:nvSpPr>
+          <p:cNvPr id="2" name="Rectangle 1">
+            <a:extLst>
+              <a:ext uri="{FF2B5EF4-FFF2-40B4-BE49-F238E27FC236}">
+                <a16:creationId xmlns:a16="http://schemas.microsoft.com/office/drawing/2014/main" id="{F0D06716-9335-4441-87A0-6F5C1D2C3EFF}"/>
+              </a:ext>
+            </a:extLst>
+          </p:cNvPr>
+          <p:cNvSpPr/>
+          <p:nvPr/>
+        </p:nvSpPr>
+        <p:spPr>
+          <a:xfrm>
+            <a:off x="13874651" y="6446710"/>
+            <a:ext cx="881743" cy="230430"/>
+          </a:xfrm>
+          <a:prstGeom prst="rect">
+            <a:avLst/>
+          </a:prstGeom>
+          <a:solidFill>
+            <a:schemeClr val="bg1"/>
+          </a:solidFill>
+          <a:ln>
+            <a:solidFill>
+              <a:schemeClr val="bg1"/>
+            </a:solidFill>
+          </a:ln>
+        </p:spPr>
+        <p:style>
+          <a:lnRef idx="2">
+            <a:schemeClr val="accent1">
+              <a:shade val="50000"/>
+            </a:schemeClr>
+          </a:lnRef>
+          <a:fillRef idx="1">
+            <a:schemeClr val="accent1"/>
+          </a:fillRef>
+          <a:effectRef idx="0">
+            <a:schemeClr val="accent1"/>
+          </a:effectRef>
+          <a:fontRef idx="minor">
+            <a:schemeClr val="lt1"/>
+          </a:fontRef>
+        </p:style>
+        <p:txBody>
+          <a:bodyPr rtlCol="0" anchor="ctr"/>
+          <a:lstStyle/>
+          <a:p>
+            <a:pPr algn="ctr"/>
+            <a:endParaRPr lang="en-US"/>
+          </a:p>
+        </p:txBody>
+      </p:sp>
+      <p:sp>
+        <p:nvSpPr>
+          <p:cNvPr id="26" name="Rectangle 25">
+            <a:extLst>
+              <a:ext uri="{FF2B5EF4-FFF2-40B4-BE49-F238E27FC236}">
+                <a16:creationId xmlns:a16="http://schemas.microsoft.com/office/drawing/2014/main" id="{38E4668D-470A-4326-BAD9-9E6DE7291814}"/>
+              </a:ext>
+            </a:extLst>
+          </p:cNvPr>
+          <p:cNvSpPr/>
+          <p:nvPr/>
+        </p:nvSpPr>
+        <p:spPr>
+          <a:xfrm>
+            <a:off x="13890979" y="5835843"/>
+            <a:ext cx="881743" cy="230430"/>
+          </a:xfrm>
+          <a:prstGeom prst="rect">
+            <a:avLst/>
+          </a:prstGeom>
+          <a:solidFill>
+            <a:schemeClr val="bg1"/>
+          </a:solidFill>
+          <a:ln>
+            <a:solidFill>
+              <a:schemeClr val="bg1"/>
+            </a:solidFill>
+          </a:ln>
+        </p:spPr>
+        <p:style>
+          <a:lnRef idx="2">
+            <a:schemeClr val="accent1">
+              <a:shade val="50000"/>
+            </a:schemeClr>
+          </a:lnRef>
+          <a:fillRef idx="1">
+            <a:schemeClr val="accent1"/>
+          </a:fillRef>
+          <a:effectRef idx="0">
+            <a:schemeClr val="accent1"/>
+          </a:effectRef>
+          <a:fontRef idx="minor">
+            <a:schemeClr val="lt1"/>
+          </a:fontRef>
+        </p:style>
+        <p:txBody>
+          <a:bodyPr rtlCol="0" anchor="ctr"/>
+          <a:lstStyle/>
+          <a:p>
+            <a:pPr algn="ctr"/>
+            <a:endParaRPr lang="en-US"/>
+          </a:p>
+        </p:txBody>
+      </p:sp>
     </p:spTree>
     <p:extLst>
       <p:ext uri="{BB962C8B-B14F-4D97-AF65-F5344CB8AC3E}">
@@ -14689,7 +16015,7 @@
 </p:sld>
 </file>
 
-<file path=ppt/slides/slide7.xml><?xml version="1.0" encoding="utf-8"?>
+<file path=ppt/slides/slide8.xml><?xml version="1.0" encoding="utf-8"?>
 <p:sld xmlns:a="http://schemas.openxmlformats.org/drawingml/2006/main" xmlns:r="http://schemas.openxmlformats.org/officeDocument/2006/relationships" xmlns:p="http://schemas.openxmlformats.org/presentationml/2006/main">
   <p:cSld>
     <p:bg>
@@ -15270,7 +16596,7 @@
 </p:sld>
 </file>
 
-<file path=ppt/slides/slide8.xml><?xml version="1.0" encoding="utf-8"?>
+<file path=ppt/slides/slide9.xml><?xml version="1.0" encoding="utf-8"?>
 <p:sld xmlns:a="http://schemas.openxmlformats.org/drawingml/2006/main" xmlns:r="http://schemas.openxmlformats.org/officeDocument/2006/relationships" xmlns:p="http://schemas.openxmlformats.org/presentationml/2006/main">
   <p:cSld>
     <p:bg>
@@ -16414,580 +17740,6 @@
     <p:extLst>
       <p:ext uri="{BB962C8B-B14F-4D97-AF65-F5344CB8AC3E}">
         <p14:creationId xmlns:p14="http://schemas.microsoft.com/office/powerpoint/2010/main" val="2185895508"/>
-      </p:ext>
-    </p:extLst>
-  </p:cSld>
-  <p:clrMapOvr>
-    <a:masterClrMapping/>
-  </p:clrMapOvr>
-</p:sld>
-</file>
-
-<file path=ppt/slides/slide9.xml><?xml version="1.0" encoding="utf-8"?>
-<p:sld xmlns:a="http://schemas.openxmlformats.org/drawingml/2006/main" xmlns:r="http://schemas.openxmlformats.org/officeDocument/2006/relationships" xmlns:p="http://schemas.openxmlformats.org/presentationml/2006/main">
-  <p:cSld>
-    <p:bg>
-      <p:bgPr>
-        <a:solidFill>
-          <a:schemeClr val="bg1"/>
-        </a:solidFill>
-        <a:effectLst/>
-      </p:bgPr>
-    </p:bg>
-    <p:spTree>
-      <p:nvGrpSpPr>
-        <p:cNvPr id="1" name=""/>
-        <p:cNvGrpSpPr/>
-        <p:nvPr/>
-      </p:nvGrpSpPr>
-      <p:grpSpPr>
-        <a:xfrm>
-          <a:off x="0" y="0"/>
-          <a:ext cx="0" cy="0"/>
-          <a:chOff x="0" y="0"/>
-          <a:chExt cx="0" cy="0"/>
-        </a:xfrm>
-      </p:grpSpPr>
-      <p:sp useBgFill="1">
-        <p:nvSpPr>
-          <p:cNvPr id="30" name="Rectangle 29">
-            <a:extLst>
-              <a:ext uri="{FF2B5EF4-FFF2-40B4-BE49-F238E27FC236}">
-                <a16:creationId xmlns:a16="http://schemas.microsoft.com/office/drawing/2014/main" id="{38257DC7-C8AB-454B-9095-B5BE2C910D8B}"/>
-              </a:ext>
-              <a:ext uri="{C183D7F6-B498-43B3-948B-1728B52AA6E4}">
-                <adec:decorative xmlns:adec="http://schemas.microsoft.com/office/drawing/2017/decorative" val="1"/>
-              </a:ext>
-            </a:extLst>
-          </p:cNvPr>
-          <p:cNvSpPr>
-            <a:spLocks noGrp="1" noRot="1" noChangeAspect="1" noMove="1" noResize="1" noEditPoints="1" noAdjustHandles="1" noChangeArrowheads="1" noChangeShapeType="1" noTextEdit="1"/>
-          </p:cNvSpPr>
-          <p:nvPr>
-            <p:extLst>
-              <p:ext uri="{386F3935-93C4-4BCD-93E2-E3B085C9AB24}">
-                <p16:designElem xmlns:p16="http://schemas.microsoft.com/office/powerpoint/2015/main" val="1"/>
-              </p:ext>
-            </p:extLst>
-          </p:nvPr>
-        </p:nvSpPr>
-        <p:spPr>
-          <a:xfrm>
-            <a:off x="-4" y="0"/>
-            <a:ext cx="24384010" cy="13716000"/>
-          </a:xfrm>
-          <a:prstGeom prst="rect">
-            <a:avLst/>
-          </a:prstGeom>
-          <a:ln>
-            <a:noFill/>
-          </a:ln>
-        </p:spPr>
-        <p:style>
-          <a:lnRef idx="2">
-            <a:schemeClr val="accent1">
-              <a:shade val="50000"/>
-            </a:schemeClr>
-          </a:lnRef>
-          <a:fillRef idx="1">
-            <a:schemeClr val="accent1"/>
-          </a:fillRef>
-          <a:effectRef idx="0">
-            <a:schemeClr val="accent1"/>
-          </a:effectRef>
-          <a:fontRef idx="minor">
-            <a:schemeClr val="lt1"/>
-          </a:fontRef>
-        </p:style>
-        <p:txBody>
-          <a:bodyPr rtlCol="0" anchor="ctr"/>
-          <a:lstStyle/>
-          <a:p>
-            <a:pPr algn="ctr"/>
-            <a:endParaRPr lang="en-US"/>
-          </a:p>
-        </p:txBody>
-      </p:sp>
-      <p:pic>
-        <p:nvPicPr>
-          <p:cNvPr id="3" name="Picture 2" descr="Chart, bubble chart&#10;&#10;Description automatically generated">
-            <a:extLst>
-              <a:ext uri="{FF2B5EF4-FFF2-40B4-BE49-F238E27FC236}">
-                <a16:creationId xmlns:a16="http://schemas.microsoft.com/office/drawing/2014/main" id="{5C116FA5-3FF7-4695-8D7B-D42992BAC524}"/>
-              </a:ext>
-            </a:extLst>
-          </p:cNvPr>
-          <p:cNvPicPr>
-            <a:picLocks noChangeAspect="1"/>
-          </p:cNvPicPr>
-          <p:nvPr/>
-        </p:nvPicPr>
-        <p:blipFill rotWithShape="1">
-          <a:blip r:embed="rId3">
-            <a:extLst>
-              <a:ext uri="{28A0092B-C50C-407E-A947-70E740481C1C}">
-                <a14:useLocalDpi xmlns:a14="http://schemas.microsoft.com/office/drawing/2010/main" val="0"/>
-              </a:ext>
-            </a:extLst>
-          </a:blip>
-          <a:srcRect l="28733" r="31333" b="-1"/>
-          <a:stretch/>
-        </p:blipFill>
-        <p:spPr>
-          <a:xfrm>
-            <a:off x="14963234" y="1507680"/>
-            <a:ext cx="9420766" cy="12208320"/>
-          </a:xfrm>
-          <a:custGeom>
-            <a:avLst/>
-            <a:gdLst/>
-            <a:ahLst/>
-            <a:cxnLst/>
-            <a:rect l="l" t="t" r="r" b="b"/>
-            <a:pathLst>
-              <a:path w="4710383" h="6104160">
-                <a:moveTo>
-                  <a:pt x="2581213" y="5529271"/>
-                </a:moveTo>
-                <a:cubicBezTo>
-                  <a:pt x="2581213" y="5529271"/>
-                  <a:pt x="2581213" y="5529271"/>
-                  <a:pt x="4212052" y="5529271"/>
-                </a:cubicBezTo>
-                <a:cubicBezTo>
-                  <a:pt x="4314199" y="5529271"/>
-                  <a:pt x="4412824" y="5585421"/>
-                  <a:pt x="4462137" y="5676664"/>
-                </a:cubicBezTo>
-                <a:cubicBezTo>
-                  <a:pt x="4462137" y="5676664"/>
-                  <a:pt x="4462137" y="5676664"/>
-                  <a:pt x="4661644" y="6020228"/>
-                </a:cubicBezTo>
-                <a:lnTo>
-                  <a:pt x="4710383" y="6104160"/>
-                </a:lnTo>
-                <a:lnTo>
-                  <a:pt x="2080429" y="6104160"/>
-                </a:lnTo>
-                <a:lnTo>
-                  <a:pt x="2184381" y="5924374"/>
-                </a:lnTo>
-                <a:cubicBezTo>
-                  <a:pt x="2229076" y="5847072"/>
-                  <a:pt x="2276752" y="5764617"/>
-                  <a:pt x="2327605" y="5676664"/>
-                </a:cubicBezTo>
-                <a:cubicBezTo>
-                  <a:pt x="2380440" y="5585421"/>
-                  <a:pt x="2475543" y="5529271"/>
-                  <a:pt x="2581213" y="5529271"/>
-                </a:cubicBezTo>
-                <a:close/>
-                <a:moveTo>
-                  <a:pt x="2563539" y="4022432"/>
-                </a:moveTo>
-                <a:cubicBezTo>
-                  <a:pt x="2563539" y="4022432"/>
-                  <a:pt x="2563539" y="4022432"/>
-                  <a:pt x="3208691" y="4022432"/>
-                </a:cubicBezTo>
-                <a:cubicBezTo>
-                  <a:pt x="3249101" y="4022432"/>
-                  <a:pt x="3288116" y="4044644"/>
-                  <a:pt x="3307624" y="4080740"/>
-                </a:cubicBezTo>
-                <a:cubicBezTo>
-                  <a:pt x="3307624" y="4080740"/>
-                  <a:pt x="3307624" y="4080740"/>
-                  <a:pt x="3630897" y="4637438"/>
-                </a:cubicBezTo>
-                <a:cubicBezTo>
-                  <a:pt x="3651799" y="4672145"/>
-                  <a:pt x="3651799" y="4716569"/>
-                  <a:pt x="3630897" y="4751276"/>
-                </a:cubicBezTo>
-                <a:cubicBezTo>
-                  <a:pt x="3630897" y="4751276"/>
-                  <a:pt x="3630897" y="4751276"/>
-                  <a:pt x="3307624" y="5307975"/>
-                </a:cubicBezTo>
-                <a:cubicBezTo>
-                  <a:pt x="3288116" y="5344069"/>
-                  <a:pt x="3249101" y="5366282"/>
-                  <a:pt x="3208691" y="5366282"/>
-                </a:cubicBezTo>
-                <a:cubicBezTo>
-                  <a:pt x="3208691" y="5366282"/>
-                  <a:pt x="3208691" y="5366282"/>
-                  <a:pt x="2563539" y="5366282"/>
-                </a:cubicBezTo>
-                <a:cubicBezTo>
-                  <a:pt x="2521736" y="5366282"/>
-                  <a:pt x="2484114" y="5344069"/>
-                  <a:pt x="2463212" y="5307975"/>
-                </a:cubicBezTo>
-                <a:cubicBezTo>
-                  <a:pt x="2463212" y="5307975"/>
-                  <a:pt x="2463212" y="5307975"/>
-                  <a:pt x="2141332" y="4751276"/>
-                </a:cubicBezTo>
-                <a:cubicBezTo>
-                  <a:pt x="2120431" y="4716569"/>
-                  <a:pt x="2120431" y="4672145"/>
-                  <a:pt x="2141332" y="4637438"/>
-                </a:cubicBezTo>
-                <a:cubicBezTo>
-                  <a:pt x="2141332" y="4637438"/>
-                  <a:pt x="2141332" y="4637438"/>
-                  <a:pt x="2463212" y="4080740"/>
-                </a:cubicBezTo>
-                <a:cubicBezTo>
-                  <a:pt x="2484114" y="4044644"/>
-                  <a:pt x="2521736" y="4022432"/>
-                  <a:pt x="2563539" y="4022432"/>
-                </a:cubicBezTo>
-                <a:close/>
-                <a:moveTo>
-                  <a:pt x="2493311" y="3428754"/>
-                </a:moveTo>
-                <a:cubicBezTo>
-                  <a:pt x="2493311" y="3428754"/>
-                  <a:pt x="2493311" y="3428754"/>
-                  <a:pt x="2726177" y="3428754"/>
-                </a:cubicBezTo>
-                <a:cubicBezTo>
-                  <a:pt x="2740762" y="3428754"/>
-                  <a:pt x="2754844" y="3436772"/>
-                  <a:pt x="2761886" y="3449800"/>
-                </a:cubicBezTo>
-                <a:cubicBezTo>
-                  <a:pt x="2761886" y="3449800"/>
-                  <a:pt x="2761886" y="3449800"/>
-                  <a:pt x="2878570" y="3650739"/>
-                </a:cubicBezTo>
-                <a:cubicBezTo>
-                  <a:pt x="2886115" y="3663266"/>
-                  <a:pt x="2886115" y="3679301"/>
-                  <a:pt x="2878570" y="3691828"/>
-                </a:cubicBezTo>
-                <a:cubicBezTo>
-                  <a:pt x="2878570" y="3691828"/>
-                  <a:pt x="2878570" y="3691828"/>
-                  <a:pt x="2761886" y="3892766"/>
-                </a:cubicBezTo>
-                <a:cubicBezTo>
-                  <a:pt x="2754844" y="3905795"/>
-                  <a:pt x="2740762" y="3913812"/>
-                  <a:pt x="2726177" y="3913812"/>
-                </a:cubicBezTo>
-                <a:cubicBezTo>
-                  <a:pt x="2726177" y="3913812"/>
-                  <a:pt x="2726177" y="3913812"/>
-                  <a:pt x="2493311" y="3913812"/>
-                </a:cubicBezTo>
-                <a:cubicBezTo>
-                  <a:pt x="2478223" y="3913812"/>
-                  <a:pt x="2464643" y="3905795"/>
-                  <a:pt x="2457098" y="3892766"/>
-                </a:cubicBezTo>
-                <a:cubicBezTo>
-                  <a:pt x="2457098" y="3892766"/>
-                  <a:pt x="2457098" y="3892766"/>
-                  <a:pt x="2340917" y="3691828"/>
-                </a:cubicBezTo>
-                <a:cubicBezTo>
-                  <a:pt x="2333373" y="3679301"/>
-                  <a:pt x="2333373" y="3663266"/>
-                  <a:pt x="2340917" y="3650739"/>
-                </a:cubicBezTo>
-                <a:cubicBezTo>
-                  <a:pt x="2340917" y="3650739"/>
-                  <a:pt x="2340917" y="3650739"/>
-                  <a:pt x="2457098" y="3449800"/>
-                </a:cubicBezTo>
-                <a:cubicBezTo>
-                  <a:pt x="2464643" y="3436772"/>
-                  <a:pt x="2478223" y="3428754"/>
-                  <a:pt x="2493311" y="3428754"/>
-                </a:cubicBezTo>
-                <a:close/>
-                <a:moveTo>
-                  <a:pt x="1733609" y="2705264"/>
-                </a:moveTo>
-                <a:cubicBezTo>
-                  <a:pt x="1733609" y="2705264"/>
-                  <a:pt x="1733609" y="2705264"/>
-                  <a:pt x="2174613" y="2705264"/>
-                </a:cubicBezTo>
-                <a:cubicBezTo>
-                  <a:pt x="2202236" y="2705264"/>
-                  <a:pt x="2228906" y="2720447"/>
-                  <a:pt x="2242241" y="2745121"/>
-                </a:cubicBezTo>
-                <a:cubicBezTo>
-                  <a:pt x="2242241" y="2745121"/>
-                  <a:pt x="2242241" y="2745121"/>
-                  <a:pt x="2463220" y="3125661"/>
-                </a:cubicBezTo>
-                <a:cubicBezTo>
-                  <a:pt x="2477507" y="3149385"/>
-                  <a:pt x="2477507" y="3179753"/>
-                  <a:pt x="2463220" y="3203478"/>
-                </a:cubicBezTo>
-                <a:cubicBezTo>
-                  <a:pt x="2463220" y="3203478"/>
-                  <a:pt x="2463220" y="3203478"/>
-                  <a:pt x="2242241" y="3584017"/>
-                </a:cubicBezTo>
-                <a:cubicBezTo>
-                  <a:pt x="2228906" y="3608691"/>
-                  <a:pt x="2202236" y="3623874"/>
-                  <a:pt x="2174613" y="3623874"/>
-                </a:cubicBezTo>
-                <a:cubicBezTo>
-                  <a:pt x="2174613" y="3623874"/>
-                  <a:pt x="2174613" y="3623874"/>
-                  <a:pt x="1733609" y="3623874"/>
-                </a:cubicBezTo>
-                <a:cubicBezTo>
-                  <a:pt x="1705034" y="3623874"/>
-                  <a:pt x="1679316" y="3608691"/>
-                  <a:pt x="1665029" y="3584017"/>
-                </a:cubicBezTo>
-                <a:cubicBezTo>
-                  <a:pt x="1665029" y="3584017"/>
-                  <a:pt x="1665029" y="3584017"/>
-                  <a:pt x="1445004" y="3203478"/>
-                </a:cubicBezTo>
-                <a:cubicBezTo>
-                  <a:pt x="1430715" y="3179753"/>
-                  <a:pt x="1430715" y="3149385"/>
-                  <a:pt x="1445004" y="3125661"/>
-                </a:cubicBezTo>
-                <a:cubicBezTo>
-                  <a:pt x="1445004" y="3125661"/>
-                  <a:pt x="1445004" y="3125661"/>
-                  <a:pt x="1665029" y="2745121"/>
-                </a:cubicBezTo>
-                <a:cubicBezTo>
-                  <a:pt x="1679316" y="2720447"/>
-                  <a:pt x="1705034" y="2705264"/>
-                  <a:pt x="1733609" y="2705264"/>
-                </a:cubicBezTo>
-                <a:close/>
-                <a:moveTo>
-                  <a:pt x="3163744" y="1328911"/>
-                </a:moveTo>
-                <a:cubicBezTo>
-                  <a:pt x="3163744" y="1328911"/>
-                  <a:pt x="3163744" y="1328911"/>
-                  <a:pt x="3931865" y="1328911"/>
-                </a:cubicBezTo>
-                <a:cubicBezTo>
-                  <a:pt x="3979976" y="1328911"/>
-                  <a:pt x="4026428" y="1355357"/>
-                  <a:pt x="4049655" y="1398332"/>
-                </a:cubicBezTo>
-                <a:cubicBezTo>
-                  <a:pt x="4049655" y="1398332"/>
-                  <a:pt x="4049655" y="1398332"/>
-                  <a:pt x="4434545" y="2061138"/>
-                </a:cubicBezTo>
-                <a:cubicBezTo>
-                  <a:pt x="4459430" y="2102461"/>
-                  <a:pt x="4459430" y="2155353"/>
-                  <a:pt x="4434545" y="2196675"/>
-                </a:cubicBezTo>
-                <a:cubicBezTo>
-                  <a:pt x="4434545" y="2196675"/>
-                  <a:pt x="4434545" y="2196675"/>
-                  <a:pt x="4049655" y="2859481"/>
-                </a:cubicBezTo>
-                <a:cubicBezTo>
-                  <a:pt x="4026428" y="2902456"/>
-                  <a:pt x="3979976" y="2928902"/>
-                  <a:pt x="3931865" y="2928902"/>
-                </a:cubicBezTo>
-                <a:cubicBezTo>
-                  <a:pt x="3931865" y="2928902"/>
-                  <a:pt x="3931865" y="2928902"/>
-                  <a:pt x="3163744" y="2928902"/>
-                </a:cubicBezTo>
-                <a:cubicBezTo>
-                  <a:pt x="3113973" y="2928902"/>
-                  <a:pt x="3069180" y="2902456"/>
-                  <a:pt x="3044295" y="2859481"/>
-                </a:cubicBezTo>
-                <a:cubicBezTo>
-                  <a:pt x="3044295" y="2859481"/>
-                  <a:pt x="3044295" y="2859481"/>
-                  <a:pt x="2661065" y="2196675"/>
-                </a:cubicBezTo>
-                <a:cubicBezTo>
-                  <a:pt x="2636179" y="2155353"/>
-                  <a:pt x="2636179" y="2102461"/>
-                  <a:pt x="2661065" y="2061138"/>
-                </a:cubicBezTo>
-                <a:cubicBezTo>
-                  <a:pt x="2661065" y="2061138"/>
-                  <a:pt x="2661065" y="2061138"/>
-                  <a:pt x="3044295" y="1398332"/>
-                </a:cubicBezTo>
-                <a:cubicBezTo>
-                  <a:pt x="3069180" y="1355357"/>
-                  <a:pt x="3113973" y="1328911"/>
-                  <a:pt x="3163744" y="1328911"/>
-                </a:cubicBezTo>
-                <a:close/>
-                <a:moveTo>
-                  <a:pt x="841327" y="0"/>
-                </a:moveTo>
-                <a:cubicBezTo>
-                  <a:pt x="841327" y="0"/>
-                  <a:pt x="841327" y="0"/>
-                  <a:pt x="2080896" y="0"/>
-                </a:cubicBezTo>
-                <a:cubicBezTo>
-                  <a:pt x="2158536" y="0"/>
-                  <a:pt x="2233499" y="42678"/>
-                  <a:pt x="2270981" y="112029"/>
-                </a:cubicBezTo>
-                <a:cubicBezTo>
-                  <a:pt x="2270981" y="112029"/>
-                  <a:pt x="2270981" y="112029"/>
-                  <a:pt x="2892105" y="1181644"/>
-                </a:cubicBezTo>
-                <a:cubicBezTo>
-                  <a:pt x="2932263" y="1248329"/>
-                  <a:pt x="2932263" y="1333683"/>
-                  <a:pt x="2892105" y="1400367"/>
-                </a:cubicBezTo>
-                <a:cubicBezTo>
-                  <a:pt x="2892105" y="1400367"/>
-                  <a:pt x="2892105" y="1400367"/>
-                  <a:pt x="2270981" y="2469983"/>
-                </a:cubicBezTo>
-                <a:cubicBezTo>
-                  <a:pt x="2233499" y="2539334"/>
-                  <a:pt x="2158536" y="2582012"/>
-                  <a:pt x="2080896" y="2582012"/>
-                </a:cubicBezTo>
-                <a:cubicBezTo>
-                  <a:pt x="2080896" y="2582012"/>
-                  <a:pt x="2080896" y="2582012"/>
-                  <a:pt x="841327" y="2582012"/>
-                </a:cubicBezTo>
-                <a:cubicBezTo>
-                  <a:pt x="761010" y="2582012"/>
-                  <a:pt x="688724" y="2539334"/>
-                  <a:pt x="648565" y="2469983"/>
-                </a:cubicBezTo>
-                <a:cubicBezTo>
-                  <a:pt x="648565" y="2469983"/>
-                  <a:pt x="648565" y="2469983"/>
-                  <a:pt x="30120" y="1400367"/>
-                </a:cubicBezTo>
-                <a:cubicBezTo>
-                  <a:pt x="-10039" y="1333683"/>
-                  <a:pt x="-10039" y="1248329"/>
-                  <a:pt x="30120" y="1181644"/>
-                </a:cubicBezTo>
-                <a:cubicBezTo>
-                  <a:pt x="30120" y="1181644"/>
-                  <a:pt x="30120" y="1181644"/>
-                  <a:pt x="648565" y="112029"/>
-                </a:cubicBezTo>
-                <a:cubicBezTo>
-                  <a:pt x="688724" y="42678"/>
-                  <a:pt x="761010" y="0"/>
-                  <a:pt x="841327" y="0"/>
-                </a:cubicBezTo>
-                <a:close/>
-              </a:path>
-            </a:pathLst>
-          </a:custGeom>
-        </p:spPr>
-      </p:pic>
-      <p:pic>
-        <p:nvPicPr>
-          <p:cNvPr id="2" name="Picture 1">
-            <a:extLst>
-              <a:ext uri="{FF2B5EF4-FFF2-40B4-BE49-F238E27FC236}">
-                <a16:creationId xmlns:a16="http://schemas.microsoft.com/office/drawing/2014/main" id="{527DB7B3-5DCA-4062-882A-A741B9982BAF}"/>
-              </a:ext>
-            </a:extLst>
-          </p:cNvPr>
-          <p:cNvPicPr>
-            <a:picLocks noChangeAspect="1"/>
-          </p:cNvPicPr>
-          <p:nvPr/>
-        </p:nvPicPr>
-        <p:blipFill>
-          <a:blip r:embed="rId4"/>
-          <a:stretch>
-            <a:fillRect/>
-          </a:stretch>
-        </p:blipFill>
-        <p:spPr>
-          <a:xfrm>
-            <a:off x="604153" y="1912721"/>
-            <a:ext cx="5012452" cy="4311305"/>
-          </a:xfrm>
-          <a:prstGeom prst="rect">
-            <a:avLst/>
-          </a:prstGeom>
-        </p:spPr>
-      </p:pic>
-      <p:sp>
-        <p:nvSpPr>
-          <p:cNvPr id="7" name="Title 6">
-            <a:extLst>
-              <a:ext uri="{FF2B5EF4-FFF2-40B4-BE49-F238E27FC236}">
-                <a16:creationId xmlns:a16="http://schemas.microsoft.com/office/drawing/2014/main" id="{8CE7791B-2975-4C35-98EB-8B19B282F523}"/>
-              </a:ext>
-            </a:extLst>
-          </p:cNvPr>
-          <p:cNvSpPr>
-            <a:spLocks noGrp="1"/>
-          </p:cNvSpPr>
-          <p:nvPr>
-            <p:ph type="title"/>
-          </p:nvPr>
-        </p:nvSpPr>
-        <p:spPr/>
-        <p:txBody>
-          <a:bodyPr>
-            <a:normAutofit/>
-          </a:bodyPr>
-          <a:lstStyle/>
-          <a:p>
-            <a:r>
-              <a:rPr lang="en-US" sz="6000" b="1" dirty="0">
-                <a:solidFill>
-                  <a:schemeClr val="tx1"/>
-                </a:solidFill>
-                <a:effectLst>
-                  <a:outerShdw blurRad="38100" dist="38100" dir="2700000" algn="tl">
-                    <a:srgbClr val="000000">
-                      <a:alpha val="43137"/>
-                    </a:srgbClr>
-                  </a:outerShdw>
-                </a:effectLst>
-                <a:latin typeface="+mj-lt"/>
-                <a:ea typeface="+mj-ea"/>
-                <a:cs typeface="+mj-cs"/>
-              </a:rPr>
-              <a:t>Database Migration</a:t>
-            </a:r>
-            <a:endParaRPr lang="en-US" sz="6000" dirty="0"/>
-          </a:p>
-        </p:txBody>
-      </p:sp>
-    </p:spTree>
-    <p:extLst>
-      <p:ext uri="{BB962C8B-B14F-4D97-AF65-F5344CB8AC3E}">
-        <p14:creationId xmlns:p14="http://schemas.microsoft.com/office/powerpoint/2010/main" val="3149809871"/>
       </p:ext>
     </p:extLst>
   </p:cSld>

</xml_diff>

<commit_message>
ppt - re-org as Mr. G requested
</commit_message>
<xml_diff>
--- a/doc/YZY Language School Final Report.pptx
+++ b/doc/YZY Language School Final Report.pptx
@@ -7,20 +7,23 @@
     <p:sldMasterId id="2147483809" r:id="rId3"/>
   </p:sldMasterIdLst>
   <p:notesMasterIdLst>
-    <p:notesMasterId r:id="rId15"/>
+    <p:notesMasterId r:id="rId18"/>
   </p:notesMasterIdLst>
   <p:sldIdLst>
     <p:sldId id="460" r:id="rId4"/>
     <p:sldId id="467" r:id="rId5"/>
-    <p:sldId id="463" r:id="rId6"/>
-    <p:sldId id="473" r:id="rId7"/>
-    <p:sldId id="468" r:id="rId8"/>
-    <p:sldId id="469" r:id="rId9"/>
-    <p:sldId id="470" r:id="rId10"/>
-    <p:sldId id="466" r:id="rId11"/>
-    <p:sldId id="471" r:id="rId12"/>
-    <p:sldId id="464" r:id="rId13"/>
-    <p:sldId id="472" r:id="rId14"/>
+    <p:sldId id="462" r:id="rId6"/>
+    <p:sldId id="476" r:id="rId7"/>
+    <p:sldId id="473" r:id="rId8"/>
+    <p:sldId id="468" r:id="rId9"/>
+    <p:sldId id="469" r:id="rId10"/>
+    <p:sldId id="470" r:id="rId11"/>
+    <p:sldId id="466" r:id="rId12"/>
+    <p:sldId id="471" r:id="rId13"/>
+    <p:sldId id="464" r:id="rId14"/>
+    <p:sldId id="474" r:id="rId15"/>
+    <p:sldId id="475" r:id="rId16"/>
+    <p:sldId id="472" r:id="rId17"/>
   </p:sldIdLst>
   <p:sldSz cx="24384000" cy="13716000"/>
   <p:notesSz cx="6858000" cy="9144000"/>
@@ -7794,7 +7797,7 @@
           </a:ln>
           <a:extLst>
             <a:ext uri="{C572A759-6A51-4108-AA02-DFA0A04FC94B}">
-              <ma14:wrappingTextBoxFlag xmlns:ma14="http://schemas.microsoft.com/office/mac/drawingml/2011/main" xmlns="" val="1"/>
+              <ma14:wrappingTextBoxFlag xmlns="" xmlns:ma14="http://schemas.microsoft.com/office/mac/drawingml/2011/main" val="1"/>
             </a:ext>
           </a:extLst>
         </p:spPr>
@@ -7834,7 +7837,7 @@
           </a:ln>
           <a:extLst>
             <a:ext uri="{C572A759-6A51-4108-AA02-DFA0A04FC94B}">
-              <ma14:wrappingTextBoxFlag xmlns:ma14="http://schemas.microsoft.com/office/mac/drawingml/2011/main" xmlns="" val="1"/>
+              <ma14:wrappingTextBoxFlag xmlns="" xmlns:ma14="http://schemas.microsoft.com/office/mac/drawingml/2011/main" val="1"/>
             </a:ext>
           </a:extLst>
         </p:spPr>
@@ -9729,6 +9732,1159 @@
           <a:bodyPr rtlCol="0" anchor="ctr"/>
           <a:lstStyle/>
           <a:p>
+            <a:pPr marL="0" marR="0" lvl="0" indent="0" algn="ctr" defTabSz="825175" rtl="0" eaLnBrk="1" fontAlgn="auto" latinLnBrk="0" hangingPunct="0">
+              <a:lnSpc>
+                <a:spcPct val="100000"/>
+              </a:lnSpc>
+              <a:spcBef>
+                <a:spcPts val="0"/>
+              </a:spcBef>
+              <a:spcAft>
+                <a:spcPts val="0"/>
+              </a:spcAft>
+              <a:buClrTx/>
+              <a:buSzTx/>
+              <a:buFontTx/>
+              <a:buNone/>
+              <a:tabLst/>
+              <a:defRPr/>
+            </a:pPr>
+            <a:endParaRPr kumimoji="0" lang="en-US" sz="5000" b="0" i="0" u="none" strike="noStrike" kern="0" cap="none" spc="0" normalizeH="0" baseline="0" noProof="0">
+              <a:ln>
+                <a:noFill/>
+              </a:ln>
+              <a:solidFill>
+                <a:prstClr val="white"/>
+              </a:solidFill>
+              <a:effectLst/>
+              <a:uLnTx/>
+              <a:uFillTx/>
+              <a:latin typeface="Calibri"/>
+              <a:ea typeface="+mn-ea"/>
+              <a:cs typeface="+mn-cs"/>
+              <a:sym typeface="Helvetica Light"/>
+            </a:endParaRPr>
+          </a:p>
+        </p:txBody>
+      </p:sp>
+      <p:pic>
+        <p:nvPicPr>
+          <p:cNvPr id="3" name="Picture 2" descr="Chart, bubble chart&#10;&#10;Description automatically generated">
+            <a:extLst>
+              <a:ext uri="{FF2B5EF4-FFF2-40B4-BE49-F238E27FC236}">
+                <a16:creationId xmlns:a16="http://schemas.microsoft.com/office/drawing/2014/main" id="{5C116FA5-3FF7-4695-8D7B-D42992BAC524}"/>
+              </a:ext>
+            </a:extLst>
+          </p:cNvPr>
+          <p:cNvPicPr>
+            <a:picLocks noChangeAspect="1"/>
+          </p:cNvPicPr>
+          <p:nvPr/>
+        </p:nvPicPr>
+        <p:blipFill rotWithShape="1">
+          <a:blip r:embed="rId3">
+            <a:extLst>
+              <a:ext uri="{28A0092B-C50C-407E-A947-70E740481C1C}">
+                <a14:useLocalDpi xmlns:a14="http://schemas.microsoft.com/office/drawing/2010/main" val="0"/>
+              </a:ext>
+            </a:extLst>
+          </a:blip>
+          <a:srcRect l="28733" r="31333" b="-1"/>
+          <a:stretch/>
+        </p:blipFill>
+        <p:spPr>
+          <a:xfrm>
+            <a:off x="14963234" y="1507680"/>
+            <a:ext cx="9420766" cy="12208320"/>
+          </a:xfrm>
+          <a:custGeom>
+            <a:avLst/>
+            <a:gdLst/>
+            <a:ahLst/>
+            <a:cxnLst/>
+            <a:rect l="l" t="t" r="r" b="b"/>
+            <a:pathLst>
+              <a:path w="4710383" h="6104160">
+                <a:moveTo>
+                  <a:pt x="2581213" y="5529271"/>
+                </a:moveTo>
+                <a:cubicBezTo>
+                  <a:pt x="2581213" y="5529271"/>
+                  <a:pt x="2581213" y="5529271"/>
+                  <a:pt x="4212052" y="5529271"/>
+                </a:cubicBezTo>
+                <a:cubicBezTo>
+                  <a:pt x="4314199" y="5529271"/>
+                  <a:pt x="4412824" y="5585421"/>
+                  <a:pt x="4462137" y="5676664"/>
+                </a:cubicBezTo>
+                <a:cubicBezTo>
+                  <a:pt x="4462137" y="5676664"/>
+                  <a:pt x="4462137" y="5676664"/>
+                  <a:pt x="4661644" y="6020228"/>
+                </a:cubicBezTo>
+                <a:lnTo>
+                  <a:pt x="4710383" y="6104160"/>
+                </a:lnTo>
+                <a:lnTo>
+                  <a:pt x="2080429" y="6104160"/>
+                </a:lnTo>
+                <a:lnTo>
+                  <a:pt x="2184381" y="5924374"/>
+                </a:lnTo>
+                <a:cubicBezTo>
+                  <a:pt x="2229076" y="5847072"/>
+                  <a:pt x="2276752" y="5764617"/>
+                  <a:pt x="2327605" y="5676664"/>
+                </a:cubicBezTo>
+                <a:cubicBezTo>
+                  <a:pt x="2380440" y="5585421"/>
+                  <a:pt x="2475543" y="5529271"/>
+                  <a:pt x="2581213" y="5529271"/>
+                </a:cubicBezTo>
+                <a:close/>
+                <a:moveTo>
+                  <a:pt x="2563539" y="4022432"/>
+                </a:moveTo>
+                <a:cubicBezTo>
+                  <a:pt x="2563539" y="4022432"/>
+                  <a:pt x="2563539" y="4022432"/>
+                  <a:pt x="3208691" y="4022432"/>
+                </a:cubicBezTo>
+                <a:cubicBezTo>
+                  <a:pt x="3249101" y="4022432"/>
+                  <a:pt x="3288116" y="4044644"/>
+                  <a:pt x="3307624" y="4080740"/>
+                </a:cubicBezTo>
+                <a:cubicBezTo>
+                  <a:pt x="3307624" y="4080740"/>
+                  <a:pt x="3307624" y="4080740"/>
+                  <a:pt x="3630897" y="4637438"/>
+                </a:cubicBezTo>
+                <a:cubicBezTo>
+                  <a:pt x="3651799" y="4672145"/>
+                  <a:pt x="3651799" y="4716569"/>
+                  <a:pt x="3630897" y="4751276"/>
+                </a:cubicBezTo>
+                <a:cubicBezTo>
+                  <a:pt x="3630897" y="4751276"/>
+                  <a:pt x="3630897" y="4751276"/>
+                  <a:pt x="3307624" y="5307975"/>
+                </a:cubicBezTo>
+                <a:cubicBezTo>
+                  <a:pt x="3288116" y="5344069"/>
+                  <a:pt x="3249101" y="5366282"/>
+                  <a:pt x="3208691" y="5366282"/>
+                </a:cubicBezTo>
+                <a:cubicBezTo>
+                  <a:pt x="3208691" y="5366282"/>
+                  <a:pt x="3208691" y="5366282"/>
+                  <a:pt x="2563539" y="5366282"/>
+                </a:cubicBezTo>
+                <a:cubicBezTo>
+                  <a:pt x="2521736" y="5366282"/>
+                  <a:pt x="2484114" y="5344069"/>
+                  <a:pt x="2463212" y="5307975"/>
+                </a:cubicBezTo>
+                <a:cubicBezTo>
+                  <a:pt x="2463212" y="5307975"/>
+                  <a:pt x="2463212" y="5307975"/>
+                  <a:pt x="2141332" y="4751276"/>
+                </a:cubicBezTo>
+                <a:cubicBezTo>
+                  <a:pt x="2120431" y="4716569"/>
+                  <a:pt x="2120431" y="4672145"/>
+                  <a:pt x="2141332" y="4637438"/>
+                </a:cubicBezTo>
+                <a:cubicBezTo>
+                  <a:pt x="2141332" y="4637438"/>
+                  <a:pt x="2141332" y="4637438"/>
+                  <a:pt x="2463212" y="4080740"/>
+                </a:cubicBezTo>
+                <a:cubicBezTo>
+                  <a:pt x="2484114" y="4044644"/>
+                  <a:pt x="2521736" y="4022432"/>
+                  <a:pt x="2563539" y="4022432"/>
+                </a:cubicBezTo>
+                <a:close/>
+                <a:moveTo>
+                  <a:pt x="2493311" y="3428754"/>
+                </a:moveTo>
+                <a:cubicBezTo>
+                  <a:pt x="2493311" y="3428754"/>
+                  <a:pt x="2493311" y="3428754"/>
+                  <a:pt x="2726177" y="3428754"/>
+                </a:cubicBezTo>
+                <a:cubicBezTo>
+                  <a:pt x="2740762" y="3428754"/>
+                  <a:pt x="2754844" y="3436772"/>
+                  <a:pt x="2761886" y="3449800"/>
+                </a:cubicBezTo>
+                <a:cubicBezTo>
+                  <a:pt x="2761886" y="3449800"/>
+                  <a:pt x="2761886" y="3449800"/>
+                  <a:pt x="2878570" y="3650739"/>
+                </a:cubicBezTo>
+                <a:cubicBezTo>
+                  <a:pt x="2886115" y="3663266"/>
+                  <a:pt x="2886115" y="3679301"/>
+                  <a:pt x="2878570" y="3691828"/>
+                </a:cubicBezTo>
+                <a:cubicBezTo>
+                  <a:pt x="2878570" y="3691828"/>
+                  <a:pt x="2878570" y="3691828"/>
+                  <a:pt x="2761886" y="3892766"/>
+                </a:cubicBezTo>
+                <a:cubicBezTo>
+                  <a:pt x="2754844" y="3905795"/>
+                  <a:pt x="2740762" y="3913812"/>
+                  <a:pt x="2726177" y="3913812"/>
+                </a:cubicBezTo>
+                <a:cubicBezTo>
+                  <a:pt x="2726177" y="3913812"/>
+                  <a:pt x="2726177" y="3913812"/>
+                  <a:pt x="2493311" y="3913812"/>
+                </a:cubicBezTo>
+                <a:cubicBezTo>
+                  <a:pt x="2478223" y="3913812"/>
+                  <a:pt x="2464643" y="3905795"/>
+                  <a:pt x="2457098" y="3892766"/>
+                </a:cubicBezTo>
+                <a:cubicBezTo>
+                  <a:pt x="2457098" y="3892766"/>
+                  <a:pt x="2457098" y="3892766"/>
+                  <a:pt x="2340917" y="3691828"/>
+                </a:cubicBezTo>
+                <a:cubicBezTo>
+                  <a:pt x="2333373" y="3679301"/>
+                  <a:pt x="2333373" y="3663266"/>
+                  <a:pt x="2340917" y="3650739"/>
+                </a:cubicBezTo>
+                <a:cubicBezTo>
+                  <a:pt x="2340917" y="3650739"/>
+                  <a:pt x="2340917" y="3650739"/>
+                  <a:pt x="2457098" y="3449800"/>
+                </a:cubicBezTo>
+                <a:cubicBezTo>
+                  <a:pt x="2464643" y="3436772"/>
+                  <a:pt x="2478223" y="3428754"/>
+                  <a:pt x="2493311" y="3428754"/>
+                </a:cubicBezTo>
+                <a:close/>
+                <a:moveTo>
+                  <a:pt x="1733609" y="2705264"/>
+                </a:moveTo>
+                <a:cubicBezTo>
+                  <a:pt x="1733609" y="2705264"/>
+                  <a:pt x="1733609" y="2705264"/>
+                  <a:pt x="2174613" y="2705264"/>
+                </a:cubicBezTo>
+                <a:cubicBezTo>
+                  <a:pt x="2202236" y="2705264"/>
+                  <a:pt x="2228906" y="2720447"/>
+                  <a:pt x="2242241" y="2745121"/>
+                </a:cubicBezTo>
+                <a:cubicBezTo>
+                  <a:pt x="2242241" y="2745121"/>
+                  <a:pt x="2242241" y="2745121"/>
+                  <a:pt x="2463220" y="3125661"/>
+                </a:cubicBezTo>
+                <a:cubicBezTo>
+                  <a:pt x="2477507" y="3149385"/>
+                  <a:pt x="2477507" y="3179753"/>
+                  <a:pt x="2463220" y="3203478"/>
+                </a:cubicBezTo>
+                <a:cubicBezTo>
+                  <a:pt x="2463220" y="3203478"/>
+                  <a:pt x="2463220" y="3203478"/>
+                  <a:pt x="2242241" y="3584017"/>
+                </a:cubicBezTo>
+                <a:cubicBezTo>
+                  <a:pt x="2228906" y="3608691"/>
+                  <a:pt x="2202236" y="3623874"/>
+                  <a:pt x="2174613" y="3623874"/>
+                </a:cubicBezTo>
+                <a:cubicBezTo>
+                  <a:pt x="2174613" y="3623874"/>
+                  <a:pt x="2174613" y="3623874"/>
+                  <a:pt x="1733609" y="3623874"/>
+                </a:cubicBezTo>
+                <a:cubicBezTo>
+                  <a:pt x="1705034" y="3623874"/>
+                  <a:pt x="1679316" y="3608691"/>
+                  <a:pt x="1665029" y="3584017"/>
+                </a:cubicBezTo>
+                <a:cubicBezTo>
+                  <a:pt x="1665029" y="3584017"/>
+                  <a:pt x="1665029" y="3584017"/>
+                  <a:pt x="1445004" y="3203478"/>
+                </a:cubicBezTo>
+                <a:cubicBezTo>
+                  <a:pt x="1430715" y="3179753"/>
+                  <a:pt x="1430715" y="3149385"/>
+                  <a:pt x="1445004" y="3125661"/>
+                </a:cubicBezTo>
+                <a:cubicBezTo>
+                  <a:pt x="1445004" y="3125661"/>
+                  <a:pt x="1445004" y="3125661"/>
+                  <a:pt x="1665029" y="2745121"/>
+                </a:cubicBezTo>
+                <a:cubicBezTo>
+                  <a:pt x="1679316" y="2720447"/>
+                  <a:pt x="1705034" y="2705264"/>
+                  <a:pt x="1733609" y="2705264"/>
+                </a:cubicBezTo>
+                <a:close/>
+                <a:moveTo>
+                  <a:pt x="3163744" y="1328911"/>
+                </a:moveTo>
+                <a:cubicBezTo>
+                  <a:pt x="3163744" y="1328911"/>
+                  <a:pt x="3163744" y="1328911"/>
+                  <a:pt x="3931865" y="1328911"/>
+                </a:cubicBezTo>
+                <a:cubicBezTo>
+                  <a:pt x="3979976" y="1328911"/>
+                  <a:pt x="4026428" y="1355357"/>
+                  <a:pt x="4049655" y="1398332"/>
+                </a:cubicBezTo>
+                <a:cubicBezTo>
+                  <a:pt x="4049655" y="1398332"/>
+                  <a:pt x="4049655" y="1398332"/>
+                  <a:pt x="4434545" y="2061138"/>
+                </a:cubicBezTo>
+                <a:cubicBezTo>
+                  <a:pt x="4459430" y="2102461"/>
+                  <a:pt x="4459430" y="2155353"/>
+                  <a:pt x="4434545" y="2196675"/>
+                </a:cubicBezTo>
+                <a:cubicBezTo>
+                  <a:pt x="4434545" y="2196675"/>
+                  <a:pt x="4434545" y="2196675"/>
+                  <a:pt x="4049655" y="2859481"/>
+                </a:cubicBezTo>
+                <a:cubicBezTo>
+                  <a:pt x="4026428" y="2902456"/>
+                  <a:pt x="3979976" y="2928902"/>
+                  <a:pt x="3931865" y="2928902"/>
+                </a:cubicBezTo>
+                <a:cubicBezTo>
+                  <a:pt x="3931865" y="2928902"/>
+                  <a:pt x="3931865" y="2928902"/>
+                  <a:pt x="3163744" y="2928902"/>
+                </a:cubicBezTo>
+                <a:cubicBezTo>
+                  <a:pt x="3113973" y="2928902"/>
+                  <a:pt x="3069180" y="2902456"/>
+                  <a:pt x="3044295" y="2859481"/>
+                </a:cubicBezTo>
+                <a:cubicBezTo>
+                  <a:pt x="3044295" y="2859481"/>
+                  <a:pt x="3044295" y="2859481"/>
+                  <a:pt x="2661065" y="2196675"/>
+                </a:cubicBezTo>
+                <a:cubicBezTo>
+                  <a:pt x="2636179" y="2155353"/>
+                  <a:pt x="2636179" y="2102461"/>
+                  <a:pt x="2661065" y="2061138"/>
+                </a:cubicBezTo>
+                <a:cubicBezTo>
+                  <a:pt x="2661065" y="2061138"/>
+                  <a:pt x="2661065" y="2061138"/>
+                  <a:pt x="3044295" y="1398332"/>
+                </a:cubicBezTo>
+                <a:cubicBezTo>
+                  <a:pt x="3069180" y="1355357"/>
+                  <a:pt x="3113973" y="1328911"/>
+                  <a:pt x="3163744" y="1328911"/>
+                </a:cubicBezTo>
+                <a:close/>
+                <a:moveTo>
+                  <a:pt x="841327" y="0"/>
+                </a:moveTo>
+                <a:cubicBezTo>
+                  <a:pt x="841327" y="0"/>
+                  <a:pt x="841327" y="0"/>
+                  <a:pt x="2080896" y="0"/>
+                </a:cubicBezTo>
+                <a:cubicBezTo>
+                  <a:pt x="2158536" y="0"/>
+                  <a:pt x="2233499" y="42678"/>
+                  <a:pt x="2270981" y="112029"/>
+                </a:cubicBezTo>
+                <a:cubicBezTo>
+                  <a:pt x="2270981" y="112029"/>
+                  <a:pt x="2270981" y="112029"/>
+                  <a:pt x="2892105" y="1181644"/>
+                </a:cubicBezTo>
+                <a:cubicBezTo>
+                  <a:pt x="2932263" y="1248329"/>
+                  <a:pt x="2932263" y="1333683"/>
+                  <a:pt x="2892105" y="1400367"/>
+                </a:cubicBezTo>
+                <a:cubicBezTo>
+                  <a:pt x="2892105" y="1400367"/>
+                  <a:pt x="2892105" y="1400367"/>
+                  <a:pt x="2270981" y="2469983"/>
+                </a:cubicBezTo>
+                <a:cubicBezTo>
+                  <a:pt x="2233499" y="2539334"/>
+                  <a:pt x="2158536" y="2582012"/>
+                  <a:pt x="2080896" y="2582012"/>
+                </a:cubicBezTo>
+                <a:cubicBezTo>
+                  <a:pt x="2080896" y="2582012"/>
+                  <a:pt x="2080896" y="2582012"/>
+                  <a:pt x="841327" y="2582012"/>
+                </a:cubicBezTo>
+                <a:cubicBezTo>
+                  <a:pt x="761010" y="2582012"/>
+                  <a:pt x="688724" y="2539334"/>
+                  <a:pt x="648565" y="2469983"/>
+                </a:cubicBezTo>
+                <a:cubicBezTo>
+                  <a:pt x="648565" y="2469983"/>
+                  <a:pt x="648565" y="2469983"/>
+                  <a:pt x="30120" y="1400367"/>
+                </a:cubicBezTo>
+                <a:cubicBezTo>
+                  <a:pt x="-10039" y="1333683"/>
+                  <a:pt x="-10039" y="1248329"/>
+                  <a:pt x="30120" y="1181644"/>
+                </a:cubicBezTo>
+                <a:cubicBezTo>
+                  <a:pt x="30120" y="1181644"/>
+                  <a:pt x="30120" y="1181644"/>
+                  <a:pt x="648565" y="112029"/>
+                </a:cubicBezTo>
+                <a:cubicBezTo>
+                  <a:pt x="688724" y="42678"/>
+                  <a:pt x="761010" y="0"/>
+                  <a:pt x="841327" y="0"/>
+                </a:cubicBezTo>
+                <a:close/>
+              </a:path>
+            </a:pathLst>
+          </a:custGeom>
+        </p:spPr>
+      </p:pic>
+      <p:sp>
+        <p:nvSpPr>
+          <p:cNvPr id="7" name="Title 6">
+            <a:extLst>
+              <a:ext uri="{FF2B5EF4-FFF2-40B4-BE49-F238E27FC236}">
+                <a16:creationId xmlns:a16="http://schemas.microsoft.com/office/drawing/2014/main" id="{8CE7791B-2975-4C35-98EB-8B19B282F523}"/>
+              </a:ext>
+            </a:extLst>
+          </p:cNvPr>
+          <p:cNvSpPr>
+            <a:spLocks noGrp="1"/>
+          </p:cNvSpPr>
+          <p:nvPr>
+            <p:ph type="title"/>
+          </p:nvPr>
+        </p:nvSpPr>
+        <p:spPr/>
+        <p:txBody>
+          <a:bodyPr>
+            <a:normAutofit/>
+          </a:bodyPr>
+          <a:lstStyle/>
+          <a:p>
+            <a:r>
+              <a:rPr lang="en-US" sz="6000" b="1" dirty="0">
+                <a:solidFill>
+                  <a:schemeClr val="tx1"/>
+                </a:solidFill>
+                <a:effectLst>
+                  <a:outerShdw blurRad="38100" dist="38100" dir="2700000" algn="tl">
+                    <a:srgbClr val="000000">
+                      <a:alpha val="43137"/>
+                    </a:srgbClr>
+                  </a:outerShdw>
+                </a:effectLst>
+                <a:latin typeface="+mj-lt"/>
+                <a:ea typeface="+mj-ea"/>
+                <a:cs typeface="+mj-cs"/>
+              </a:rPr>
+              <a:t>String Translation</a:t>
+            </a:r>
+            <a:endParaRPr lang="en-US" sz="6000" dirty="0"/>
+          </a:p>
+        </p:txBody>
+      </p:sp>
+      <p:pic>
+        <p:nvPicPr>
+          <p:cNvPr id="4" name="Picture 3" descr="Graphical user interface, application&#10;&#10;Description automatically generated">
+            <a:extLst>
+              <a:ext uri="{FF2B5EF4-FFF2-40B4-BE49-F238E27FC236}">
+                <a16:creationId xmlns:a16="http://schemas.microsoft.com/office/drawing/2014/main" id="{A1690D3C-20C3-4846-8E28-8140AC4937D2}"/>
+              </a:ext>
+            </a:extLst>
+          </p:cNvPr>
+          <p:cNvPicPr>
+            <a:picLocks noChangeAspect="1"/>
+          </p:cNvPicPr>
+          <p:nvPr/>
+        </p:nvPicPr>
+        <p:blipFill>
+          <a:blip r:embed="rId4" cstate="print">
+            <a:extLst>
+              <a:ext uri="{28A0092B-C50C-407E-A947-70E740481C1C}">
+                <a14:useLocalDpi xmlns:a14="http://schemas.microsoft.com/office/drawing/2010/main" val="0"/>
+              </a:ext>
+            </a:extLst>
+          </a:blip>
+          <a:stretch>
+            <a:fillRect/>
+          </a:stretch>
+        </p:blipFill>
+        <p:spPr>
+          <a:xfrm>
+            <a:off x="65314" y="5565620"/>
+            <a:ext cx="15342599" cy="8150380"/>
+          </a:xfrm>
+          <a:prstGeom prst="rect">
+            <a:avLst/>
+          </a:prstGeom>
+        </p:spPr>
+      </p:pic>
+      <p:sp>
+        <p:nvSpPr>
+          <p:cNvPr id="5" name="Oval 4">
+            <a:extLst>
+              <a:ext uri="{FF2B5EF4-FFF2-40B4-BE49-F238E27FC236}">
+                <a16:creationId xmlns:a16="http://schemas.microsoft.com/office/drawing/2014/main" id="{7F04C021-2A99-4FE9-8D8F-BC7366BED46B}"/>
+              </a:ext>
+            </a:extLst>
+          </p:cNvPr>
+          <p:cNvSpPr/>
+          <p:nvPr/>
+        </p:nvSpPr>
+        <p:spPr>
+          <a:xfrm>
+            <a:off x="930728" y="6915150"/>
+            <a:ext cx="2326822" cy="228600"/>
+          </a:xfrm>
+          <a:prstGeom prst="ellipse">
+            <a:avLst/>
+          </a:prstGeom>
+          <a:noFill/>
+          <a:ln w="38100">
+            <a:solidFill>
+              <a:srgbClr val="C00000"/>
+            </a:solidFill>
+          </a:ln>
+        </p:spPr>
+        <p:style>
+          <a:lnRef idx="2">
+            <a:schemeClr val="accent2"/>
+          </a:lnRef>
+          <a:fillRef idx="1">
+            <a:schemeClr val="lt1"/>
+          </a:fillRef>
+          <a:effectRef idx="0">
+            <a:schemeClr val="accent2"/>
+          </a:effectRef>
+          <a:fontRef idx="minor">
+            <a:schemeClr val="dk1"/>
+          </a:fontRef>
+        </p:style>
+        <p:txBody>
+          <a:bodyPr rtlCol="0" anchor="ctr"/>
+          <a:lstStyle/>
+          <a:p>
+            <a:pPr algn="ctr"/>
+            <a:endParaRPr lang="en-US"/>
+          </a:p>
+        </p:txBody>
+      </p:sp>
+      <p:sp>
+        <p:nvSpPr>
+          <p:cNvPr id="8" name="Oval 7">
+            <a:extLst>
+              <a:ext uri="{FF2B5EF4-FFF2-40B4-BE49-F238E27FC236}">
+                <a16:creationId xmlns:a16="http://schemas.microsoft.com/office/drawing/2014/main" id="{64FA3919-9524-4474-94D4-3AC707C1CC60}"/>
+              </a:ext>
+            </a:extLst>
+          </p:cNvPr>
+          <p:cNvSpPr/>
+          <p:nvPr/>
+        </p:nvSpPr>
+        <p:spPr>
+          <a:xfrm>
+            <a:off x="930728" y="7537521"/>
+            <a:ext cx="2326822" cy="228600"/>
+          </a:xfrm>
+          <a:prstGeom prst="ellipse">
+            <a:avLst/>
+          </a:prstGeom>
+          <a:noFill/>
+          <a:ln w="38100">
+            <a:solidFill>
+              <a:srgbClr val="C00000"/>
+            </a:solidFill>
+          </a:ln>
+        </p:spPr>
+        <p:style>
+          <a:lnRef idx="2">
+            <a:schemeClr val="accent2"/>
+          </a:lnRef>
+          <a:fillRef idx="1">
+            <a:schemeClr val="lt1"/>
+          </a:fillRef>
+          <a:effectRef idx="0">
+            <a:schemeClr val="accent2"/>
+          </a:effectRef>
+          <a:fontRef idx="minor">
+            <a:schemeClr val="dk1"/>
+          </a:fontRef>
+        </p:style>
+        <p:txBody>
+          <a:bodyPr rtlCol="0" anchor="ctr"/>
+          <a:lstStyle/>
+          <a:p>
+            <a:pPr algn="ctr"/>
+            <a:endParaRPr lang="en-US"/>
+          </a:p>
+        </p:txBody>
+      </p:sp>
+      <p:sp>
+        <p:nvSpPr>
+          <p:cNvPr id="9" name="Oval 8">
+            <a:extLst>
+              <a:ext uri="{FF2B5EF4-FFF2-40B4-BE49-F238E27FC236}">
+                <a16:creationId xmlns:a16="http://schemas.microsoft.com/office/drawing/2014/main" id="{36AF0699-FEA5-4BA8-AC89-21F88FABE9C5}"/>
+              </a:ext>
+            </a:extLst>
+          </p:cNvPr>
+          <p:cNvSpPr/>
+          <p:nvPr/>
+        </p:nvSpPr>
+        <p:spPr>
+          <a:xfrm>
+            <a:off x="5304062" y="7559291"/>
+            <a:ext cx="2762251" cy="417215"/>
+          </a:xfrm>
+          <a:prstGeom prst="ellipse">
+            <a:avLst/>
+          </a:prstGeom>
+          <a:noFill/>
+          <a:ln w="38100">
+            <a:solidFill>
+              <a:srgbClr val="C00000"/>
+            </a:solidFill>
+          </a:ln>
+        </p:spPr>
+        <p:style>
+          <a:lnRef idx="2">
+            <a:schemeClr val="accent2"/>
+          </a:lnRef>
+          <a:fillRef idx="1">
+            <a:schemeClr val="lt1"/>
+          </a:fillRef>
+          <a:effectRef idx="0">
+            <a:schemeClr val="accent2"/>
+          </a:effectRef>
+          <a:fontRef idx="minor">
+            <a:schemeClr val="dk1"/>
+          </a:fontRef>
+        </p:style>
+        <p:txBody>
+          <a:bodyPr rtlCol="0" anchor="ctr"/>
+          <a:lstStyle/>
+          <a:p>
+            <a:pPr algn="ctr"/>
+            <a:endParaRPr lang="en-US"/>
+          </a:p>
+        </p:txBody>
+      </p:sp>
+      <p:sp>
+        <p:nvSpPr>
+          <p:cNvPr id="10" name="Oval 9">
+            <a:extLst>
+              <a:ext uri="{FF2B5EF4-FFF2-40B4-BE49-F238E27FC236}">
+                <a16:creationId xmlns:a16="http://schemas.microsoft.com/office/drawing/2014/main" id="{08FA1E1F-5911-4586-831C-FE2FD1ECFEBA}"/>
+              </a:ext>
+            </a:extLst>
+          </p:cNvPr>
+          <p:cNvSpPr/>
+          <p:nvPr/>
+        </p:nvSpPr>
+        <p:spPr>
+          <a:xfrm>
+            <a:off x="8735786" y="7515750"/>
+            <a:ext cx="3943350" cy="667585"/>
+          </a:xfrm>
+          <a:prstGeom prst="ellipse">
+            <a:avLst/>
+          </a:prstGeom>
+          <a:noFill/>
+          <a:ln w="38100">
+            <a:solidFill>
+              <a:srgbClr val="C00000"/>
+            </a:solidFill>
+          </a:ln>
+        </p:spPr>
+        <p:style>
+          <a:lnRef idx="2">
+            <a:schemeClr val="accent2"/>
+          </a:lnRef>
+          <a:fillRef idx="1">
+            <a:schemeClr val="lt1"/>
+          </a:fillRef>
+          <a:effectRef idx="0">
+            <a:schemeClr val="accent2"/>
+          </a:effectRef>
+          <a:fontRef idx="minor">
+            <a:schemeClr val="dk1"/>
+          </a:fontRef>
+        </p:style>
+        <p:txBody>
+          <a:bodyPr rtlCol="0" anchor="ctr"/>
+          <a:lstStyle/>
+          <a:p>
+            <a:pPr algn="ctr"/>
+            <a:endParaRPr lang="en-US"/>
+          </a:p>
+        </p:txBody>
+      </p:sp>
+      <p:sp>
+        <p:nvSpPr>
+          <p:cNvPr id="6" name="Speech Bubble: Rectangle with Corners Rounded 5">
+            <a:extLst>
+              <a:ext uri="{FF2B5EF4-FFF2-40B4-BE49-F238E27FC236}">
+                <a16:creationId xmlns:a16="http://schemas.microsoft.com/office/drawing/2014/main" id="{EFB0916B-2CF6-41D3-AACD-612396471B83}"/>
+              </a:ext>
+            </a:extLst>
+          </p:cNvPr>
+          <p:cNvSpPr/>
+          <p:nvPr/>
+        </p:nvSpPr>
+        <p:spPr>
+          <a:xfrm>
+            <a:off x="314325" y="2571749"/>
+            <a:ext cx="3559628" cy="2530929"/>
+          </a:xfrm>
+          <a:prstGeom prst="wedgeRoundRectCallout">
+            <a:avLst>
+              <a:gd name="adj1" fmla="val -12347"/>
+              <a:gd name="adj2" fmla="val 115403"/>
+              <a:gd name="adj3" fmla="val 16667"/>
+            </a:avLst>
+          </a:prstGeom>
+        </p:spPr>
+        <p:style>
+          <a:lnRef idx="2">
+            <a:schemeClr val="accent1">
+              <a:shade val="50000"/>
+            </a:schemeClr>
+          </a:lnRef>
+          <a:fillRef idx="1">
+            <a:schemeClr val="accent1"/>
+          </a:fillRef>
+          <a:effectRef idx="0">
+            <a:schemeClr val="accent1"/>
+          </a:effectRef>
+          <a:fontRef idx="minor">
+            <a:schemeClr val="lt1"/>
+          </a:fontRef>
+        </p:style>
+        <p:txBody>
+          <a:bodyPr rtlCol="0" anchor="ctr"/>
+          <a:lstStyle/>
+          <a:p>
+            <a:pPr algn="ctr"/>
+            <a:r>
+              <a:rPr lang="en-CA" sz="2800" dirty="0"/>
+              <a:t>Use translation resources in </a:t>
+            </a:r>
+            <a:r>
+              <a:rPr lang="en-CA" sz="2800" dirty="0">
+                <a:solidFill>
+                  <a:schemeClr val="bg1">
+                    <a:lumMod val="85000"/>
+                  </a:schemeClr>
+                </a:solidFill>
+              </a:rPr>
+              <a:t>XAML</a:t>
+            </a:r>
+            <a:endParaRPr lang="en-US" sz="2800" dirty="0">
+              <a:solidFill>
+                <a:schemeClr val="bg1">
+                  <a:lumMod val="85000"/>
+                </a:schemeClr>
+              </a:solidFill>
+            </a:endParaRPr>
+          </a:p>
+        </p:txBody>
+      </p:sp>
+      <p:sp>
+        <p:nvSpPr>
+          <p:cNvPr id="12" name="Speech Bubble: Rectangle with Corners Rounded 11">
+            <a:extLst>
+              <a:ext uri="{FF2B5EF4-FFF2-40B4-BE49-F238E27FC236}">
+                <a16:creationId xmlns:a16="http://schemas.microsoft.com/office/drawing/2014/main" id="{09F3B65E-BC46-4A20-B61E-28A0CE5062CD}"/>
+              </a:ext>
+            </a:extLst>
+          </p:cNvPr>
+          <p:cNvSpPr/>
+          <p:nvPr/>
+        </p:nvSpPr>
+        <p:spPr>
+          <a:xfrm>
+            <a:off x="4378237" y="2571748"/>
+            <a:ext cx="3559628" cy="2530929"/>
+          </a:xfrm>
+          <a:prstGeom prst="wedgeRoundRectCallout">
+            <a:avLst>
+              <a:gd name="adj1" fmla="val -8448"/>
+              <a:gd name="adj2" fmla="val 155080"/>
+              <a:gd name="adj3" fmla="val 16667"/>
+            </a:avLst>
+          </a:prstGeom>
+        </p:spPr>
+        <p:style>
+          <a:lnRef idx="2">
+            <a:schemeClr val="accent1">
+              <a:shade val="50000"/>
+            </a:schemeClr>
+          </a:lnRef>
+          <a:fillRef idx="1">
+            <a:schemeClr val="accent1"/>
+          </a:fillRef>
+          <a:effectRef idx="0">
+            <a:schemeClr val="accent1"/>
+          </a:effectRef>
+          <a:fontRef idx="minor">
+            <a:schemeClr val="lt1"/>
+          </a:fontRef>
+        </p:style>
+        <p:txBody>
+          <a:bodyPr rtlCol="0" anchor="ctr"/>
+          <a:lstStyle/>
+          <a:p>
+            <a:pPr algn="ctr"/>
+            <a:r>
+              <a:rPr lang="en-CA" sz="2800" dirty="0"/>
+              <a:t>Use translation resources in </a:t>
+            </a:r>
+            <a:r>
+              <a:rPr lang="en-CA" sz="2800" dirty="0" err="1">
+                <a:solidFill>
+                  <a:schemeClr val="bg1">
+                    <a:lumMod val="85000"/>
+                  </a:schemeClr>
+                </a:solidFill>
+              </a:rPr>
+              <a:t>c#</a:t>
+            </a:r>
+            <a:r>
+              <a:rPr lang="en-CA" sz="2800" dirty="0">
+                <a:solidFill>
+                  <a:schemeClr val="bg1">
+                    <a:lumMod val="85000"/>
+                  </a:schemeClr>
+                </a:solidFill>
+              </a:rPr>
+              <a:t> code</a:t>
+            </a:r>
+            <a:endParaRPr lang="en-US" sz="2800" dirty="0">
+              <a:solidFill>
+                <a:schemeClr val="bg1">
+                  <a:lumMod val="85000"/>
+                </a:schemeClr>
+              </a:solidFill>
+            </a:endParaRPr>
+          </a:p>
+        </p:txBody>
+      </p:sp>
+      <p:sp>
+        <p:nvSpPr>
+          <p:cNvPr id="13" name="Speech Bubble: Rectangle with Corners Rounded 12">
+            <a:extLst>
+              <a:ext uri="{FF2B5EF4-FFF2-40B4-BE49-F238E27FC236}">
+                <a16:creationId xmlns:a16="http://schemas.microsoft.com/office/drawing/2014/main" id="{71D3D2EF-54B2-4833-97F8-B3590056C5BF}"/>
+              </a:ext>
+            </a:extLst>
+          </p:cNvPr>
+          <p:cNvSpPr/>
+          <p:nvPr/>
+        </p:nvSpPr>
+        <p:spPr>
+          <a:xfrm>
+            <a:off x="8442149" y="2571747"/>
+            <a:ext cx="3559628" cy="2530929"/>
+          </a:xfrm>
+          <a:prstGeom prst="wedgeRoundRectCallout">
+            <a:avLst>
+              <a:gd name="adj1" fmla="val 1873"/>
+              <a:gd name="adj2" fmla="val 149274"/>
+              <a:gd name="adj3" fmla="val 16667"/>
+            </a:avLst>
+          </a:prstGeom>
+        </p:spPr>
+        <p:style>
+          <a:lnRef idx="2">
+            <a:schemeClr val="accent1">
+              <a:shade val="50000"/>
+            </a:schemeClr>
+          </a:lnRef>
+          <a:fillRef idx="1">
+            <a:schemeClr val="accent1"/>
+          </a:fillRef>
+          <a:effectRef idx="0">
+            <a:schemeClr val="accent1"/>
+          </a:effectRef>
+          <a:fontRef idx="minor">
+            <a:schemeClr val="lt1"/>
+          </a:fontRef>
+        </p:style>
+        <p:txBody>
+          <a:bodyPr rtlCol="0" anchor="ctr"/>
+          <a:lstStyle/>
+          <a:p>
+            <a:pPr algn="ctr"/>
+            <a:r>
+              <a:rPr lang="en-CA" sz="2800" dirty="0"/>
+              <a:t>Set language culture (configuration) before </a:t>
+            </a:r>
+            <a:r>
+              <a:rPr lang="en-US" sz="2800" dirty="0" err="1">
+                <a:solidFill>
+                  <a:schemeClr val="bg1">
+                    <a:lumMod val="85000"/>
+                  </a:schemeClr>
+                </a:solidFill>
+              </a:rPr>
+              <a:t>InitializeComponent</a:t>
+            </a:r>
+            <a:r>
+              <a:rPr lang="en-US" sz="2800" dirty="0">
+                <a:solidFill>
+                  <a:schemeClr val="bg1">
+                    <a:lumMod val="85000"/>
+                  </a:schemeClr>
+                </a:solidFill>
+              </a:rPr>
+              <a:t>()</a:t>
+            </a:r>
+          </a:p>
+        </p:txBody>
+      </p:sp>
+      <p:sp>
+        <p:nvSpPr>
+          <p:cNvPr id="14" name="Oval 13">
+            <a:extLst>
+              <a:ext uri="{FF2B5EF4-FFF2-40B4-BE49-F238E27FC236}">
+                <a16:creationId xmlns:a16="http://schemas.microsoft.com/office/drawing/2014/main" id="{00D65003-EE98-476B-9574-E2DCD96FCCA7}"/>
+              </a:ext>
+            </a:extLst>
+          </p:cNvPr>
+          <p:cNvSpPr/>
+          <p:nvPr/>
+        </p:nvSpPr>
+        <p:spPr>
+          <a:xfrm>
+            <a:off x="12645662" y="6838949"/>
+            <a:ext cx="2762251" cy="667585"/>
+          </a:xfrm>
+          <a:prstGeom prst="ellipse">
+            <a:avLst/>
+          </a:prstGeom>
+          <a:noFill/>
+          <a:ln w="38100">
+            <a:solidFill>
+              <a:srgbClr val="C00000"/>
+            </a:solidFill>
+          </a:ln>
+        </p:spPr>
+        <p:style>
+          <a:lnRef idx="2">
+            <a:schemeClr val="accent2"/>
+          </a:lnRef>
+          <a:fillRef idx="1">
+            <a:schemeClr val="lt1"/>
+          </a:fillRef>
+          <a:effectRef idx="0">
+            <a:schemeClr val="accent2"/>
+          </a:effectRef>
+          <a:fontRef idx="minor">
+            <a:schemeClr val="dk1"/>
+          </a:fontRef>
+        </p:style>
+        <p:txBody>
+          <a:bodyPr rtlCol="0" anchor="ctr"/>
+          <a:lstStyle/>
+          <a:p>
+            <a:pPr algn="ctr"/>
+            <a:endParaRPr lang="en-US"/>
+          </a:p>
+        </p:txBody>
+      </p:sp>
+      <p:sp>
+        <p:nvSpPr>
+          <p:cNvPr id="15" name="Speech Bubble: Rectangle with Corners Rounded 14">
+            <a:extLst>
+              <a:ext uri="{FF2B5EF4-FFF2-40B4-BE49-F238E27FC236}">
+                <a16:creationId xmlns:a16="http://schemas.microsoft.com/office/drawing/2014/main" id="{BA20947C-FBCE-45E8-98EF-07A83E44D4E6}"/>
+              </a:ext>
+            </a:extLst>
+          </p:cNvPr>
+          <p:cNvSpPr/>
+          <p:nvPr/>
+        </p:nvSpPr>
+        <p:spPr>
+          <a:xfrm>
+            <a:off x="15473231" y="9129557"/>
+            <a:ext cx="3559628" cy="2530929"/>
+          </a:xfrm>
+          <a:prstGeom prst="wedgeRoundRectCallout">
+            <a:avLst>
+              <a:gd name="adj1" fmla="val -72668"/>
+              <a:gd name="adj2" fmla="val -117178"/>
+              <a:gd name="adj3" fmla="val 16667"/>
+            </a:avLst>
+          </a:prstGeom>
+        </p:spPr>
+        <p:style>
+          <a:lnRef idx="2">
+            <a:schemeClr val="accent1">
+              <a:shade val="50000"/>
+            </a:schemeClr>
+          </a:lnRef>
+          <a:fillRef idx="1">
+            <a:schemeClr val="accent1"/>
+          </a:fillRef>
+          <a:effectRef idx="0">
+            <a:schemeClr val="accent1"/>
+          </a:effectRef>
+          <a:fontRef idx="minor">
+            <a:schemeClr val="lt1"/>
+          </a:fontRef>
+        </p:style>
+        <p:txBody>
+          <a:bodyPr rtlCol="0" anchor="ctr"/>
+          <a:lstStyle/>
+          <a:p>
+            <a:pPr algn="ctr"/>
+            <a:r>
+              <a:rPr lang="en-CA" sz="2800" dirty="0"/>
+              <a:t>Resources in </a:t>
+            </a:r>
+            <a:r>
+              <a:rPr lang="en-CA" sz="2800" dirty="0">
+                <a:solidFill>
+                  <a:schemeClr val="bg1">
+                    <a:lumMod val="85000"/>
+                  </a:schemeClr>
+                </a:solidFill>
+              </a:rPr>
+              <a:t>Properties</a:t>
+            </a:r>
+            <a:endParaRPr lang="en-US" sz="2800" dirty="0">
+              <a:solidFill>
+                <a:schemeClr val="bg1">
+                  <a:lumMod val="85000"/>
+                </a:schemeClr>
+              </a:solidFill>
+            </a:endParaRPr>
+          </a:p>
+        </p:txBody>
+      </p:sp>
+    </p:spTree>
+    <p:extLst>
+      <p:ext uri="{BB962C8B-B14F-4D97-AF65-F5344CB8AC3E}">
+        <p14:creationId xmlns:p14="http://schemas.microsoft.com/office/powerpoint/2010/main" val="2185895508"/>
+      </p:ext>
+    </p:extLst>
+  </p:cSld>
+  <p:clrMapOvr>
+    <a:masterClrMapping/>
+  </p:clrMapOvr>
+</p:sld>
+</file>
+
+<file path=ppt/slides/slide11.xml><?xml version="1.0" encoding="utf-8"?>
+<p:sld xmlns:a="http://schemas.openxmlformats.org/drawingml/2006/main" xmlns:r="http://schemas.openxmlformats.org/officeDocument/2006/relationships" xmlns:p="http://schemas.openxmlformats.org/presentationml/2006/main">
+  <p:cSld>
+    <p:bg>
+      <p:bgPr>
+        <a:solidFill>
+          <a:schemeClr val="bg1"/>
+        </a:solidFill>
+        <a:effectLst/>
+      </p:bgPr>
+    </p:bg>
+    <p:spTree>
+      <p:nvGrpSpPr>
+        <p:cNvPr id="1" name=""/>
+        <p:cNvGrpSpPr/>
+        <p:nvPr/>
+      </p:nvGrpSpPr>
+      <p:grpSpPr>
+        <a:xfrm>
+          <a:off x="0" y="0"/>
+          <a:ext cx="0" cy="0"/>
+          <a:chOff x="0" y="0"/>
+          <a:chExt cx="0" cy="0"/>
+        </a:xfrm>
+      </p:grpSpPr>
+      <p:sp useBgFill="1">
+        <p:nvSpPr>
+          <p:cNvPr id="30" name="Rectangle 29">
+            <a:extLst>
+              <a:ext uri="{FF2B5EF4-FFF2-40B4-BE49-F238E27FC236}">
+                <a16:creationId xmlns:a16="http://schemas.microsoft.com/office/drawing/2014/main" id="{38257DC7-C8AB-454B-9095-B5BE2C910D8B}"/>
+              </a:ext>
+              <a:ext uri="{C183D7F6-B498-43B3-948B-1728B52AA6E4}">
+                <adec:decorative xmlns:adec="http://schemas.microsoft.com/office/drawing/2017/decorative" val="1"/>
+              </a:ext>
+            </a:extLst>
+          </p:cNvPr>
+          <p:cNvSpPr>
+            <a:spLocks noGrp="1" noRot="1" noChangeAspect="1" noMove="1" noResize="1" noEditPoints="1" noAdjustHandles="1" noChangeArrowheads="1" noChangeShapeType="1" noTextEdit="1"/>
+          </p:cNvSpPr>
+          <p:nvPr>
+            <p:extLst>
+              <p:ext uri="{386F3935-93C4-4BCD-93E2-E3B085C9AB24}">
+                <p16:designElem xmlns:p16="http://schemas.microsoft.com/office/powerpoint/2015/main" val="1"/>
+              </p:ext>
+            </p:extLst>
+          </p:nvPr>
+        </p:nvSpPr>
+        <p:spPr>
+          <a:xfrm>
+            <a:off x="-4" y="0"/>
+            <a:ext cx="24384010" cy="13716000"/>
+          </a:xfrm>
+          <a:prstGeom prst="rect">
+            <a:avLst/>
+          </a:prstGeom>
+          <a:ln>
+            <a:noFill/>
+          </a:ln>
+        </p:spPr>
+        <p:style>
+          <a:lnRef idx="2">
+            <a:schemeClr val="accent1">
+              <a:shade val="50000"/>
+            </a:schemeClr>
+          </a:lnRef>
+          <a:fillRef idx="1">
+            <a:schemeClr val="accent1"/>
+          </a:fillRef>
+          <a:effectRef idx="0">
+            <a:schemeClr val="accent1"/>
+          </a:effectRef>
+          <a:fontRef idx="minor">
+            <a:schemeClr val="lt1"/>
+          </a:fontRef>
+        </p:style>
+        <p:txBody>
+          <a:bodyPr rtlCol="0" anchor="ctr"/>
+          <a:lstStyle/>
+          <a:p>
             <a:pPr algn="ctr"/>
             <a:endParaRPr lang="en-US"/>
           </a:p>
@@ -10223,7 +11379,1201 @@
 </p:sld>
 </file>
 
-<file path=ppt/slides/slide11.xml><?xml version="1.0" encoding="utf-8"?>
+<file path=ppt/slides/slide12.xml><?xml version="1.0" encoding="utf-8"?>
+<p:sld xmlns:a="http://schemas.openxmlformats.org/drawingml/2006/main" xmlns:r="http://schemas.openxmlformats.org/officeDocument/2006/relationships" xmlns:p="http://schemas.openxmlformats.org/presentationml/2006/main">
+  <p:cSld>
+    <p:bg>
+      <p:bgPr>
+        <a:solidFill>
+          <a:schemeClr val="bg1"/>
+        </a:solidFill>
+        <a:effectLst/>
+      </p:bgPr>
+    </p:bg>
+    <p:spTree>
+      <p:nvGrpSpPr>
+        <p:cNvPr id="1" name=""/>
+        <p:cNvGrpSpPr/>
+        <p:nvPr/>
+      </p:nvGrpSpPr>
+      <p:grpSpPr>
+        <a:xfrm>
+          <a:off x="0" y="0"/>
+          <a:ext cx="0" cy="0"/>
+          <a:chOff x="0" y="0"/>
+          <a:chExt cx="0" cy="0"/>
+        </a:xfrm>
+      </p:grpSpPr>
+      <p:pic>
+        <p:nvPicPr>
+          <p:cNvPr id="3" name="Picture 2" descr="Chart, bubble chart&#10;&#10;Description automatically generated">
+            <a:extLst>
+              <a:ext uri="{FF2B5EF4-FFF2-40B4-BE49-F238E27FC236}">
+                <a16:creationId xmlns:a16="http://schemas.microsoft.com/office/drawing/2014/main" id="{5C116FA5-3FF7-4695-8D7B-D42992BAC524}"/>
+              </a:ext>
+            </a:extLst>
+          </p:cNvPr>
+          <p:cNvPicPr>
+            <a:picLocks noChangeAspect="1"/>
+          </p:cNvPicPr>
+          <p:nvPr/>
+        </p:nvPicPr>
+        <p:blipFill rotWithShape="1">
+          <a:blip r:embed="rId2">
+            <a:extLst>
+              <a:ext uri="{28A0092B-C50C-407E-A947-70E740481C1C}">
+                <a14:useLocalDpi xmlns:a14="http://schemas.microsoft.com/office/drawing/2010/main" val="0"/>
+              </a:ext>
+            </a:extLst>
+          </a:blip>
+          <a:srcRect l="10976" r="30151"/>
+          <a:stretch/>
+        </p:blipFill>
+        <p:spPr>
+          <a:xfrm>
+            <a:off x="12710884" y="10"/>
+            <a:ext cx="11673116" cy="10260818"/>
+          </a:xfrm>
+          <a:custGeom>
+            <a:avLst/>
+            <a:gdLst/>
+            <a:ahLst/>
+            <a:cxnLst/>
+            <a:rect l="l" t="t" r="r" b="b"/>
+            <a:pathLst>
+              <a:path w="5836558" h="5130414">
+                <a:moveTo>
+                  <a:pt x="2376055" y="0"/>
+                </a:moveTo>
+                <a:lnTo>
+                  <a:pt x="5836558" y="0"/>
+                </a:lnTo>
+                <a:lnTo>
+                  <a:pt x="5836558" y="5130414"/>
+                </a:lnTo>
+                <a:lnTo>
+                  <a:pt x="0" y="5130414"/>
+                </a:lnTo>
+                <a:close/>
+              </a:path>
+            </a:pathLst>
+          </a:custGeom>
+        </p:spPr>
+      </p:pic>
+      <p:sp>
+        <p:nvSpPr>
+          <p:cNvPr id="16" name="Freeform: Shape 15">
+            <a:extLst>
+              <a:ext uri="{FF2B5EF4-FFF2-40B4-BE49-F238E27FC236}">
+                <a16:creationId xmlns:a16="http://schemas.microsoft.com/office/drawing/2014/main" id="{5EB73228-F09B-409F-9EC1-7E853C4F5B43}"/>
+              </a:ext>
+              <a:ext uri="{C183D7F6-B498-43B3-948B-1728B52AA6E4}">
+                <adec:decorative xmlns:adec="http://schemas.microsoft.com/office/drawing/2017/decorative" val="1"/>
+              </a:ext>
+            </a:extLst>
+          </p:cNvPr>
+          <p:cNvSpPr>
+            <a:spLocks noGrp="1" noRot="1" noChangeAspect="1" noMove="1" noResize="1" noEditPoints="1" noAdjustHandles="1" noChangeArrowheads="1" noChangeShapeType="1" noTextEdit="1"/>
+          </p:cNvSpPr>
+          <p:nvPr>
+            <p:extLst>
+              <p:ext uri="{386F3935-93C4-4BCD-93E2-E3B085C9AB24}">
+                <p16:designElem xmlns:p16="http://schemas.microsoft.com/office/powerpoint/2015/main" val="1"/>
+              </p:ext>
+            </p:extLst>
+          </p:nvPr>
+        </p:nvSpPr>
+        <p:spPr>
+          <a:xfrm>
+            <a:off x="11163680" y="10585018"/>
+            <a:ext cx="13220320" cy="3130982"/>
+          </a:xfrm>
+          <a:custGeom>
+            <a:avLst/>
+            <a:gdLst>
+              <a:gd name="connsiteX0" fmla="*/ 1186806 w 6610160"/>
+              <a:gd name="connsiteY0" fmla="*/ 0 h 1565491"/>
+              <a:gd name="connsiteX1" fmla="*/ 1692132 w 6610160"/>
+              <a:gd name="connsiteY1" fmla="*/ 0 h 1565491"/>
+              <a:gd name="connsiteX2" fmla="*/ 6104834 w 6610160"/>
+              <a:gd name="connsiteY2" fmla="*/ 0 h 1565491"/>
+              <a:gd name="connsiteX3" fmla="*/ 6610160 w 6610160"/>
+              <a:gd name="connsiteY3" fmla="*/ 0 h 1565491"/>
+              <a:gd name="connsiteX4" fmla="*/ 6610160 w 6610160"/>
+              <a:gd name="connsiteY4" fmla="*/ 1565491 h 1565491"/>
+              <a:gd name="connsiteX5" fmla="*/ 0 w 6610160"/>
+              <a:gd name="connsiteY5" fmla="*/ 1565491 h 1565491"/>
+              <a:gd name="connsiteX6" fmla="*/ 724290 w 6610160"/>
+              <a:gd name="connsiteY6" fmla="*/ 1591 h 1565491"/>
+              <a:gd name="connsiteX7" fmla="*/ 1186070 w 6610160"/>
+              <a:gd name="connsiteY7" fmla="*/ 1591 h 1565491"/>
+            </a:gdLst>
+            <a:ahLst/>
+            <a:cxnLst>
+              <a:cxn ang="0">
+                <a:pos x="connsiteX0" y="connsiteY0"/>
+              </a:cxn>
+              <a:cxn ang="0">
+                <a:pos x="connsiteX1" y="connsiteY1"/>
+              </a:cxn>
+              <a:cxn ang="0">
+                <a:pos x="connsiteX2" y="connsiteY2"/>
+              </a:cxn>
+              <a:cxn ang="0">
+                <a:pos x="connsiteX3" y="connsiteY3"/>
+              </a:cxn>
+              <a:cxn ang="0">
+                <a:pos x="connsiteX4" y="connsiteY4"/>
+              </a:cxn>
+              <a:cxn ang="0">
+                <a:pos x="connsiteX5" y="connsiteY5"/>
+              </a:cxn>
+              <a:cxn ang="0">
+                <a:pos x="connsiteX6" y="connsiteY6"/>
+              </a:cxn>
+              <a:cxn ang="0">
+                <a:pos x="connsiteX7" y="connsiteY7"/>
+              </a:cxn>
+            </a:cxnLst>
+            <a:rect l="l" t="t" r="r" b="b"/>
+            <a:pathLst>
+              <a:path w="6610160" h="1565491">
+                <a:moveTo>
+                  <a:pt x="1186806" y="0"/>
+                </a:moveTo>
+                <a:lnTo>
+                  <a:pt x="1692132" y="0"/>
+                </a:lnTo>
+                <a:lnTo>
+                  <a:pt x="6104834" y="0"/>
+                </a:lnTo>
+                <a:lnTo>
+                  <a:pt x="6610160" y="0"/>
+                </a:lnTo>
+                <a:lnTo>
+                  <a:pt x="6610160" y="1565491"/>
+                </a:lnTo>
+                <a:lnTo>
+                  <a:pt x="0" y="1565491"/>
+                </a:lnTo>
+                <a:lnTo>
+                  <a:pt x="724290" y="1591"/>
+                </a:lnTo>
+                <a:lnTo>
+                  <a:pt x="1186070" y="1591"/>
+                </a:lnTo>
+                <a:close/>
+              </a:path>
+            </a:pathLst>
+          </a:custGeom>
+          <a:solidFill>
+            <a:srgbClr val="262626"/>
+          </a:solidFill>
+          <a:ln>
+            <a:noFill/>
+          </a:ln>
+        </p:spPr>
+        <p:style>
+          <a:lnRef idx="2">
+            <a:schemeClr val="accent1">
+              <a:shade val="50000"/>
+            </a:schemeClr>
+          </a:lnRef>
+          <a:fillRef idx="1">
+            <a:schemeClr val="accent1"/>
+          </a:fillRef>
+          <a:effectRef idx="0">
+            <a:schemeClr val="accent1"/>
+          </a:effectRef>
+          <a:fontRef idx="minor">
+            <a:schemeClr val="lt1"/>
+          </a:fontRef>
+        </p:style>
+        <p:txBody>
+          <a:bodyPr wrap="square" rtlCol="0" anchor="ctr">
+            <a:noAutofit/>
+          </a:bodyPr>
+          <a:lstStyle/>
+          <a:p>
+            <a:pPr marL="0" marR="0" lvl="0" indent="0" algn="ctr" defTabSz="825175" rtl="0" eaLnBrk="1" fontAlgn="auto" latinLnBrk="0" hangingPunct="0">
+              <a:lnSpc>
+                <a:spcPct val="100000"/>
+              </a:lnSpc>
+              <a:spcBef>
+                <a:spcPts val="0"/>
+              </a:spcBef>
+              <a:spcAft>
+                <a:spcPts val="0"/>
+              </a:spcAft>
+              <a:buClrTx/>
+              <a:buSzTx/>
+              <a:buFontTx/>
+              <a:buNone/>
+              <a:tabLst/>
+              <a:defRPr/>
+            </a:pPr>
+            <a:endParaRPr kumimoji="0" lang="en-US" sz="5000" b="0" i="0" u="none" strike="noStrike" kern="0" cap="none" spc="0" normalizeH="0" baseline="0" noProof="0">
+              <a:ln>
+                <a:noFill/>
+              </a:ln>
+              <a:solidFill>
+                <a:prstClr val="white"/>
+              </a:solidFill>
+              <a:effectLst/>
+              <a:uLnTx/>
+              <a:uFillTx/>
+              <a:latin typeface="Calibri"/>
+              <a:ea typeface="+mn-ea"/>
+              <a:cs typeface="+mn-cs"/>
+              <a:sym typeface="Helvetica Light"/>
+            </a:endParaRPr>
+          </a:p>
+        </p:txBody>
+      </p:sp>
+      <p:sp>
+        <p:nvSpPr>
+          <p:cNvPr id="18" name="Freeform: Shape 17">
+            <a:extLst>
+              <a:ext uri="{FF2B5EF4-FFF2-40B4-BE49-F238E27FC236}">
+                <a16:creationId xmlns:a16="http://schemas.microsoft.com/office/drawing/2014/main" id="{3150A4AE-7BE7-480D-BD8C-3951E6479910}"/>
+              </a:ext>
+              <a:ext uri="{C183D7F6-B498-43B3-948B-1728B52AA6E4}">
+                <adec:decorative xmlns:adec="http://schemas.microsoft.com/office/drawing/2017/decorative" val="1"/>
+              </a:ext>
+            </a:extLst>
+          </p:cNvPr>
+          <p:cNvSpPr>
+            <a:spLocks noGrp="1" noRot="1" noChangeAspect="1" noMove="1" noResize="1" noEditPoints="1" noAdjustHandles="1" noChangeArrowheads="1" noChangeShapeType="1" noTextEdit="1"/>
+          </p:cNvSpPr>
+          <p:nvPr>
+            <p:extLst>
+              <p:ext uri="{386F3935-93C4-4BCD-93E2-E3B085C9AB24}">
+                <p16:designElem xmlns:p16="http://schemas.microsoft.com/office/powerpoint/2015/main" val="1"/>
+              </p:ext>
+            </p:extLst>
+          </p:nvPr>
+        </p:nvSpPr>
+        <p:spPr>
+          <a:xfrm>
+            <a:off x="0" y="10585020"/>
+            <a:ext cx="12288740" cy="3130982"/>
+          </a:xfrm>
+          <a:custGeom>
+            <a:avLst/>
+            <a:gdLst>
+              <a:gd name="connsiteX0" fmla="*/ 0 w 6144370"/>
+              <a:gd name="connsiteY0" fmla="*/ 0 h 1565491"/>
+              <a:gd name="connsiteX1" fmla="*/ 6144370 w 6144370"/>
+              <a:gd name="connsiteY1" fmla="*/ 0 h 1565491"/>
+              <a:gd name="connsiteX2" fmla="*/ 5419344 w 6144370"/>
+              <a:gd name="connsiteY2" fmla="*/ 1565491 h 1565491"/>
+              <a:gd name="connsiteX3" fmla="*/ 0 w 6144370"/>
+              <a:gd name="connsiteY3" fmla="*/ 1565491 h 1565491"/>
+            </a:gdLst>
+            <a:ahLst/>
+            <a:cxnLst>
+              <a:cxn ang="0">
+                <a:pos x="connsiteX0" y="connsiteY0"/>
+              </a:cxn>
+              <a:cxn ang="0">
+                <a:pos x="connsiteX1" y="connsiteY1"/>
+              </a:cxn>
+              <a:cxn ang="0">
+                <a:pos x="connsiteX2" y="connsiteY2"/>
+              </a:cxn>
+              <a:cxn ang="0">
+                <a:pos x="connsiteX3" y="connsiteY3"/>
+              </a:cxn>
+            </a:cxnLst>
+            <a:rect l="l" t="t" r="r" b="b"/>
+            <a:pathLst>
+              <a:path w="6144370" h="1565491">
+                <a:moveTo>
+                  <a:pt x="0" y="0"/>
+                </a:moveTo>
+                <a:lnTo>
+                  <a:pt x="6144370" y="0"/>
+                </a:lnTo>
+                <a:lnTo>
+                  <a:pt x="5419344" y="1565491"/>
+                </a:lnTo>
+                <a:lnTo>
+                  <a:pt x="0" y="1565491"/>
+                </a:lnTo>
+                <a:close/>
+              </a:path>
+            </a:pathLst>
+          </a:custGeom>
+          <a:solidFill>
+            <a:srgbClr val="B4B4B4">
+              <a:alpha val="50000"/>
+            </a:srgbClr>
+          </a:solidFill>
+          <a:ln>
+            <a:noFill/>
+          </a:ln>
+        </p:spPr>
+        <p:style>
+          <a:lnRef idx="2">
+            <a:schemeClr val="accent1">
+              <a:shade val="50000"/>
+            </a:schemeClr>
+          </a:lnRef>
+          <a:fillRef idx="1">
+            <a:schemeClr val="accent1"/>
+          </a:fillRef>
+          <a:effectRef idx="0">
+            <a:schemeClr val="accent1"/>
+          </a:effectRef>
+          <a:fontRef idx="minor">
+            <a:schemeClr val="lt1"/>
+          </a:fontRef>
+        </p:style>
+        <p:txBody>
+          <a:bodyPr wrap="square" rtlCol="0" anchor="ctr">
+            <a:noAutofit/>
+          </a:bodyPr>
+          <a:lstStyle/>
+          <a:p>
+            <a:pPr marL="0" marR="0" lvl="0" indent="0" algn="ctr" defTabSz="825175" rtl="0" eaLnBrk="1" fontAlgn="auto" latinLnBrk="0" hangingPunct="0">
+              <a:lnSpc>
+                <a:spcPct val="100000"/>
+              </a:lnSpc>
+              <a:spcBef>
+                <a:spcPts val="0"/>
+              </a:spcBef>
+              <a:spcAft>
+                <a:spcPts val="0"/>
+              </a:spcAft>
+              <a:buClrTx/>
+              <a:buSzTx/>
+              <a:buFontTx/>
+              <a:buNone/>
+              <a:tabLst/>
+              <a:defRPr/>
+            </a:pPr>
+            <a:endParaRPr kumimoji="0" lang="en-US" sz="5000" b="0" i="0" u="none" strike="noStrike" kern="0" cap="none" spc="0" normalizeH="0" baseline="0" noProof="0">
+              <a:ln>
+                <a:noFill/>
+              </a:ln>
+              <a:solidFill>
+                <a:prstClr val="white"/>
+              </a:solidFill>
+              <a:effectLst/>
+              <a:uLnTx/>
+              <a:uFillTx/>
+              <a:latin typeface="Calibri"/>
+              <a:ea typeface="+mn-ea"/>
+              <a:cs typeface="+mn-cs"/>
+              <a:sym typeface="Helvetica Light"/>
+            </a:endParaRPr>
+          </a:p>
+        </p:txBody>
+      </p:sp>
+      <p:sp>
+        <p:nvSpPr>
+          <p:cNvPr id="2" name="TextBox 1">
+            <a:extLst>
+              <a:ext uri="{FF2B5EF4-FFF2-40B4-BE49-F238E27FC236}">
+                <a16:creationId xmlns:a16="http://schemas.microsoft.com/office/drawing/2014/main" id="{31E610BA-2445-48AC-8748-FC944DAA41F9}"/>
+              </a:ext>
+            </a:extLst>
+          </p:cNvPr>
+          <p:cNvSpPr txBox="1"/>
+          <p:nvPr/>
+        </p:nvSpPr>
+        <p:spPr>
+          <a:xfrm>
+            <a:off x="419099" y="2614963"/>
+            <a:ext cx="14502246" cy="1200329"/>
+          </a:xfrm>
+          <a:prstGeom prst="rect">
+            <a:avLst/>
+          </a:prstGeom>
+          <a:noFill/>
+        </p:spPr>
+        <p:txBody>
+          <a:bodyPr wrap="square" rtlCol="0">
+            <a:spAutoFit/>
+          </a:bodyPr>
+          <a:lstStyle/>
+          <a:p>
+            <a:pPr marL="914400" marR="0" lvl="0" indent="-914400" algn="l" defTabSz="825175" rtl="0" eaLnBrk="1" fontAlgn="auto" latinLnBrk="0" hangingPunct="0">
+              <a:lnSpc>
+                <a:spcPct val="100000"/>
+              </a:lnSpc>
+              <a:spcBef>
+                <a:spcPts val="0"/>
+              </a:spcBef>
+              <a:spcAft>
+                <a:spcPts val="0"/>
+              </a:spcAft>
+              <a:buClrTx/>
+              <a:buSzTx/>
+              <a:buFont typeface="+mj-lt"/>
+              <a:buAutoNum type="arabicPeriod"/>
+              <a:tabLst/>
+              <a:defRPr/>
+            </a:pPr>
+            <a:r>
+              <a:rPr kumimoji="0" lang="en-US" sz="3600" b="1" i="0" u="none" strike="noStrike" kern="0" cap="none" spc="0" normalizeH="0" baseline="0" noProof="0" dirty="0">
+                <a:ln>
+                  <a:noFill/>
+                </a:ln>
+                <a:solidFill>
+                  <a:prstClr val="black">
+                    <a:lumMod val="65000"/>
+                    <a:lumOff val="35000"/>
+                  </a:prstClr>
+                </a:solidFill>
+                <a:effectLst/>
+                <a:uLnTx/>
+                <a:uFillTx/>
+                <a:latin typeface="Calibri Light"/>
+                <a:ea typeface="+mn-ea"/>
+                <a:cs typeface="+mn-cs"/>
+                <a:sym typeface="Helvetica Light"/>
+              </a:rPr>
+              <a:t>Performance need further optimization</a:t>
+            </a:r>
+          </a:p>
+          <a:p>
+            <a:pPr marL="914400" marR="0" lvl="0" indent="-914400" algn="l" defTabSz="825175" rtl="0" eaLnBrk="1" fontAlgn="auto" latinLnBrk="0" hangingPunct="0">
+              <a:lnSpc>
+                <a:spcPct val="100000"/>
+              </a:lnSpc>
+              <a:spcBef>
+                <a:spcPts val="0"/>
+              </a:spcBef>
+              <a:spcAft>
+                <a:spcPts val="0"/>
+              </a:spcAft>
+              <a:buClrTx/>
+              <a:buSzTx/>
+              <a:buFont typeface="+mj-lt"/>
+              <a:buAutoNum type="arabicPeriod"/>
+              <a:tabLst/>
+              <a:defRPr/>
+            </a:pPr>
+            <a:r>
+              <a:rPr kumimoji="0" lang="en-US" sz="3600" b="1" i="0" u="none" strike="noStrike" kern="0" cap="none" spc="0" normalizeH="0" baseline="0" noProof="0" dirty="0">
+                <a:ln>
+                  <a:noFill/>
+                </a:ln>
+                <a:solidFill>
+                  <a:prstClr val="black">
+                    <a:lumMod val="65000"/>
+                    <a:lumOff val="35000"/>
+                  </a:prstClr>
+                </a:solidFill>
+                <a:effectLst/>
+                <a:uLnTx/>
+                <a:uFillTx/>
+                <a:latin typeface="Calibri Light"/>
+                <a:ea typeface="+mn-ea"/>
+                <a:cs typeface="+mn-cs"/>
+                <a:sym typeface="Helvetica Light"/>
+              </a:rPr>
+              <a:t>How to integrate JS Payment Gateway with WPF desktop App</a:t>
+            </a:r>
+          </a:p>
+        </p:txBody>
+      </p:sp>
+      <p:sp>
+        <p:nvSpPr>
+          <p:cNvPr id="7" name="Title 6">
+            <a:extLst>
+              <a:ext uri="{FF2B5EF4-FFF2-40B4-BE49-F238E27FC236}">
+                <a16:creationId xmlns:a16="http://schemas.microsoft.com/office/drawing/2014/main" id="{B86906AC-5EF2-4E3E-B81D-6950BDD8E582}"/>
+              </a:ext>
+            </a:extLst>
+          </p:cNvPr>
+          <p:cNvSpPr txBox="1">
+            <a:spLocks/>
+          </p:cNvSpPr>
+          <p:nvPr/>
+        </p:nvSpPr>
+        <p:spPr>
+          <a:xfrm>
+            <a:off x="419099" y="269875"/>
+            <a:ext cx="15042573" cy="1655763"/>
+          </a:xfrm>
+          <a:prstGeom prst="rect">
+            <a:avLst/>
+          </a:prstGeom>
+        </p:spPr>
+        <p:txBody>
+          <a:bodyPr vert="horz" lIns="91440" tIns="45720" rIns="91440" bIns="45720" rtlCol="0" anchor="ctr">
+            <a:normAutofit/>
+          </a:bodyPr>
+          <a:lstStyle>
+            <a:lvl1pPr algn="l" defTabSz="914400" rtl="0" eaLnBrk="1" latinLnBrk="0" hangingPunct="1">
+              <a:lnSpc>
+                <a:spcPct val="90000"/>
+              </a:lnSpc>
+              <a:spcBef>
+                <a:spcPct val="0"/>
+              </a:spcBef>
+              <a:buNone/>
+              <a:defRPr sz="4400" b="0" i="0" kern="1200">
+                <a:solidFill>
+                  <a:schemeClr val="bg1"/>
+                </a:solidFill>
+                <a:latin typeface="Lato Thin" charset="0"/>
+                <a:ea typeface="Lato Thin" charset="0"/>
+                <a:cs typeface="Lato Thin" charset="0"/>
+              </a:defRPr>
+            </a:lvl1pPr>
+          </a:lstStyle>
+          <a:p>
+            <a:pPr marL="0" marR="0" lvl="0" indent="0" algn="l" defTabSz="914400" rtl="0" eaLnBrk="1" fontAlgn="auto" latinLnBrk="0" hangingPunct="1">
+              <a:lnSpc>
+                <a:spcPct val="90000"/>
+              </a:lnSpc>
+              <a:spcBef>
+                <a:spcPct val="0"/>
+              </a:spcBef>
+              <a:spcAft>
+                <a:spcPts val="0"/>
+              </a:spcAft>
+              <a:buClrTx/>
+              <a:buSzTx/>
+              <a:buFontTx/>
+              <a:buNone/>
+              <a:tabLst/>
+              <a:defRPr/>
+            </a:pPr>
+            <a:r>
+              <a:rPr kumimoji="0" lang="en-US" sz="6000" b="1" i="0" u="none" strike="noStrike" kern="1200" cap="none" spc="0" normalizeH="0" baseline="0" noProof="0" dirty="0">
+                <a:ln>
+                  <a:noFill/>
+                </a:ln>
+                <a:solidFill>
+                  <a:prstClr val="black"/>
+                </a:solidFill>
+                <a:effectLst>
+                  <a:outerShdw blurRad="38100" dist="38100" dir="2700000" algn="tl">
+                    <a:srgbClr val="000000">
+                      <a:alpha val="43137"/>
+                    </a:srgbClr>
+                  </a:outerShdw>
+                </a:effectLst>
+                <a:uLnTx/>
+                <a:uFillTx/>
+                <a:latin typeface="Calibri Light"/>
+                <a:ea typeface="+mj-ea"/>
+                <a:cs typeface="+mj-cs"/>
+                <a:sym typeface="Helvetica Light"/>
+              </a:rPr>
+              <a:t>Future Work</a:t>
+            </a:r>
+            <a:endParaRPr kumimoji="0" lang="en-US" sz="6000" b="0" i="0" u="none" strike="noStrike" kern="1200" cap="none" spc="0" normalizeH="0" baseline="0" noProof="0" dirty="0">
+              <a:ln>
+                <a:noFill/>
+              </a:ln>
+              <a:solidFill>
+                <a:prstClr val="white"/>
+              </a:solidFill>
+              <a:effectLst/>
+              <a:uLnTx/>
+              <a:uFillTx/>
+              <a:latin typeface="Lato Thin" charset="0"/>
+              <a:sym typeface="Helvetica Light"/>
+            </a:endParaRPr>
+          </a:p>
+        </p:txBody>
+      </p:sp>
+    </p:spTree>
+    <p:extLst>
+      <p:ext uri="{BB962C8B-B14F-4D97-AF65-F5344CB8AC3E}">
+        <p14:creationId xmlns:p14="http://schemas.microsoft.com/office/powerpoint/2010/main" val="944613800"/>
+      </p:ext>
+    </p:extLst>
+  </p:cSld>
+  <p:clrMapOvr>
+    <a:masterClrMapping/>
+  </p:clrMapOvr>
+</p:sld>
+</file>
+
+<file path=ppt/slides/slide13.xml><?xml version="1.0" encoding="utf-8"?>
+<p:sld xmlns:a="http://schemas.openxmlformats.org/drawingml/2006/main" xmlns:r="http://schemas.openxmlformats.org/officeDocument/2006/relationships" xmlns:p="http://schemas.openxmlformats.org/presentationml/2006/main">
+  <p:cSld>
+    <p:bg>
+      <p:bgPr>
+        <a:solidFill>
+          <a:schemeClr val="bg1"/>
+        </a:solidFill>
+        <a:effectLst/>
+      </p:bgPr>
+    </p:bg>
+    <p:spTree>
+      <p:nvGrpSpPr>
+        <p:cNvPr id="1" name=""/>
+        <p:cNvGrpSpPr/>
+        <p:nvPr/>
+      </p:nvGrpSpPr>
+      <p:grpSpPr>
+        <a:xfrm>
+          <a:off x="0" y="0"/>
+          <a:ext cx="0" cy="0"/>
+          <a:chOff x="0" y="0"/>
+          <a:chExt cx="0" cy="0"/>
+        </a:xfrm>
+      </p:grpSpPr>
+      <p:pic>
+        <p:nvPicPr>
+          <p:cNvPr id="3" name="Picture 2" descr="Chart, bubble chart&#10;&#10;Description automatically generated">
+            <a:extLst>
+              <a:ext uri="{FF2B5EF4-FFF2-40B4-BE49-F238E27FC236}">
+                <a16:creationId xmlns:a16="http://schemas.microsoft.com/office/drawing/2014/main" id="{5C116FA5-3FF7-4695-8D7B-D42992BAC524}"/>
+              </a:ext>
+            </a:extLst>
+          </p:cNvPr>
+          <p:cNvPicPr>
+            <a:picLocks noChangeAspect="1"/>
+          </p:cNvPicPr>
+          <p:nvPr/>
+        </p:nvPicPr>
+        <p:blipFill rotWithShape="1">
+          <a:blip r:embed="rId2">
+            <a:extLst>
+              <a:ext uri="{28A0092B-C50C-407E-A947-70E740481C1C}">
+                <a14:useLocalDpi xmlns:a14="http://schemas.microsoft.com/office/drawing/2010/main" val="0"/>
+              </a:ext>
+            </a:extLst>
+          </a:blip>
+          <a:srcRect l="10976" r="30151"/>
+          <a:stretch/>
+        </p:blipFill>
+        <p:spPr>
+          <a:xfrm>
+            <a:off x="12710884" y="10"/>
+            <a:ext cx="11673116" cy="10260818"/>
+          </a:xfrm>
+          <a:custGeom>
+            <a:avLst/>
+            <a:gdLst/>
+            <a:ahLst/>
+            <a:cxnLst/>
+            <a:rect l="l" t="t" r="r" b="b"/>
+            <a:pathLst>
+              <a:path w="5836558" h="5130414">
+                <a:moveTo>
+                  <a:pt x="2376055" y="0"/>
+                </a:moveTo>
+                <a:lnTo>
+                  <a:pt x="5836558" y="0"/>
+                </a:lnTo>
+                <a:lnTo>
+                  <a:pt x="5836558" y="5130414"/>
+                </a:lnTo>
+                <a:lnTo>
+                  <a:pt x="0" y="5130414"/>
+                </a:lnTo>
+                <a:close/>
+              </a:path>
+            </a:pathLst>
+          </a:custGeom>
+        </p:spPr>
+      </p:pic>
+      <p:sp>
+        <p:nvSpPr>
+          <p:cNvPr id="16" name="Freeform: Shape 15">
+            <a:extLst>
+              <a:ext uri="{FF2B5EF4-FFF2-40B4-BE49-F238E27FC236}">
+                <a16:creationId xmlns:a16="http://schemas.microsoft.com/office/drawing/2014/main" id="{5EB73228-F09B-409F-9EC1-7E853C4F5B43}"/>
+              </a:ext>
+              <a:ext uri="{C183D7F6-B498-43B3-948B-1728B52AA6E4}">
+                <adec:decorative xmlns:adec="http://schemas.microsoft.com/office/drawing/2017/decorative" val="1"/>
+              </a:ext>
+            </a:extLst>
+          </p:cNvPr>
+          <p:cNvSpPr>
+            <a:spLocks noGrp="1" noRot="1" noChangeAspect="1" noMove="1" noResize="1" noEditPoints="1" noAdjustHandles="1" noChangeArrowheads="1" noChangeShapeType="1" noTextEdit="1"/>
+          </p:cNvSpPr>
+          <p:nvPr>
+            <p:extLst>
+              <p:ext uri="{386F3935-93C4-4BCD-93E2-E3B085C9AB24}">
+                <p16:designElem xmlns:p16="http://schemas.microsoft.com/office/powerpoint/2015/main" val="1"/>
+              </p:ext>
+            </p:extLst>
+          </p:nvPr>
+        </p:nvSpPr>
+        <p:spPr>
+          <a:xfrm>
+            <a:off x="11163680" y="10585018"/>
+            <a:ext cx="13220320" cy="3130982"/>
+          </a:xfrm>
+          <a:custGeom>
+            <a:avLst/>
+            <a:gdLst>
+              <a:gd name="connsiteX0" fmla="*/ 1186806 w 6610160"/>
+              <a:gd name="connsiteY0" fmla="*/ 0 h 1565491"/>
+              <a:gd name="connsiteX1" fmla="*/ 1692132 w 6610160"/>
+              <a:gd name="connsiteY1" fmla="*/ 0 h 1565491"/>
+              <a:gd name="connsiteX2" fmla="*/ 6104834 w 6610160"/>
+              <a:gd name="connsiteY2" fmla="*/ 0 h 1565491"/>
+              <a:gd name="connsiteX3" fmla="*/ 6610160 w 6610160"/>
+              <a:gd name="connsiteY3" fmla="*/ 0 h 1565491"/>
+              <a:gd name="connsiteX4" fmla="*/ 6610160 w 6610160"/>
+              <a:gd name="connsiteY4" fmla="*/ 1565491 h 1565491"/>
+              <a:gd name="connsiteX5" fmla="*/ 0 w 6610160"/>
+              <a:gd name="connsiteY5" fmla="*/ 1565491 h 1565491"/>
+              <a:gd name="connsiteX6" fmla="*/ 724290 w 6610160"/>
+              <a:gd name="connsiteY6" fmla="*/ 1591 h 1565491"/>
+              <a:gd name="connsiteX7" fmla="*/ 1186070 w 6610160"/>
+              <a:gd name="connsiteY7" fmla="*/ 1591 h 1565491"/>
+            </a:gdLst>
+            <a:ahLst/>
+            <a:cxnLst>
+              <a:cxn ang="0">
+                <a:pos x="connsiteX0" y="connsiteY0"/>
+              </a:cxn>
+              <a:cxn ang="0">
+                <a:pos x="connsiteX1" y="connsiteY1"/>
+              </a:cxn>
+              <a:cxn ang="0">
+                <a:pos x="connsiteX2" y="connsiteY2"/>
+              </a:cxn>
+              <a:cxn ang="0">
+                <a:pos x="connsiteX3" y="connsiteY3"/>
+              </a:cxn>
+              <a:cxn ang="0">
+                <a:pos x="connsiteX4" y="connsiteY4"/>
+              </a:cxn>
+              <a:cxn ang="0">
+                <a:pos x="connsiteX5" y="connsiteY5"/>
+              </a:cxn>
+              <a:cxn ang="0">
+                <a:pos x="connsiteX6" y="connsiteY6"/>
+              </a:cxn>
+              <a:cxn ang="0">
+                <a:pos x="connsiteX7" y="connsiteY7"/>
+              </a:cxn>
+            </a:cxnLst>
+            <a:rect l="l" t="t" r="r" b="b"/>
+            <a:pathLst>
+              <a:path w="6610160" h="1565491">
+                <a:moveTo>
+                  <a:pt x="1186806" y="0"/>
+                </a:moveTo>
+                <a:lnTo>
+                  <a:pt x="1692132" y="0"/>
+                </a:lnTo>
+                <a:lnTo>
+                  <a:pt x="6104834" y="0"/>
+                </a:lnTo>
+                <a:lnTo>
+                  <a:pt x="6610160" y="0"/>
+                </a:lnTo>
+                <a:lnTo>
+                  <a:pt x="6610160" y="1565491"/>
+                </a:lnTo>
+                <a:lnTo>
+                  <a:pt x="0" y="1565491"/>
+                </a:lnTo>
+                <a:lnTo>
+                  <a:pt x="724290" y="1591"/>
+                </a:lnTo>
+                <a:lnTo>
+                  <a:pt x="1186070" y="1591"/>
+                </a:lnTo>
+                <a:close/>
+              </a:path>
+            </a:pathLst>
+          </a:custGeom>
+          <a:solidFill>
+            <a:srgbClr val="262626"/>
+          </a:solidFill>
+          <a:ln>
+            <a:noFill/>
+          </a:ln>
+        </p:spPr>
+        <p:style>
+          <a:lnRef idx="2">
+            <a:schemeClr val="accent1">
+              <a:shade val="50000"/>
+            </a:schemeClr>
+          </a:lnRef>
+          <a:fillRef idx="1">
+            <a:schemeClr val="accent1"/>
+          </a:fillRef>
+          <a:effectRef idx="0">
+            <a:schemeClr val="accent1"/>
+          </a:effectRef>
+          <a:fontRef idx="minor">
+            <a:schemeClr val="lt1"/>
+          </a:fontRef>
+        </p:style>
+        <p:txBody>
+          <a:bodyPr wrap="square" rtlCol="0" anchor="ctr">
+            <a:noAutofit/>
+          </a:bodyPr>
+          <a:lstStyle/>
+          <a:p>
+            <a:pPr marL="0" marR="0" lvl="0" indent="0" algn="ctr" defTabSz="825175" rtl="0" eaLnBrk="1" fontAlgn="auto" latinLnBrk="0" hangingPunct="0">
+              <a:lnSpc>
+                <a:spcPct val="100000"/>
+              </a:lnSpc>
+              <a:spcBef>
+                <a:spcPts val="0"/>
+              </a:spcBef>
+              <a:spcAft>
+                <a:spcPts val="0"/>
+              </a:spcAft>
+              <a:buClrTx/>
+              <a:buSzTx/>
+              <a:buFontTx/>
+              <a:buNone/>
+              <a:tabLst/>
+              <a:defRPr/>
+            </a:pPr>
+            <a:endParaRPr kumimoji="0" lang="en-US" sz="5000" b="0" i="0" u="none" strike="noStrike" kern="0" cap="none" spc="0" normalizeH="0" baseline="0" noProof="0">
+              <a:ln>
+                <a:noFill/>
+              </a:ln>
+              <a:solidFill>
+                <a:prstClr val="white"/>
+              </a:solidFill>
+              <a:effectLst/>
+              <a:uLnTx/>
+              <a:uFillTx/>
+              <a:latin typeface="Calibri"/>
+              <a:ea typeface="+mn-ea"/>
+              <a:cs typeface="+mn-cs"/>
+              <a:sym typeface="Helvetica Light"/>
+            </a:endParaRPr>
+          </a:p>
+        </p:txBody>
+      </p:sp>
+      <p:sp>
+        <p:nvSpPr>
+          <p:cNvPr id="18" name="Freeform: Shape 17">
+            <a:extLst>
+              <a:ext uri="{FF2B5EF4-FFF2-40B4-BE49-F238E27FC236}">
+                <a16:creationId xmlns:a16="http://schemas.microsoft.com/office/drawing/2014/main" id="{3150A4AE-7BE7-480D-BD8C-3951E6479910}"/>
+              </a:ext>
+              <a:ext uri="{C183D7F6-B498-43B3-948B-1728B52AA6E4}">
+                <adec:decorative xmlns:adec="http://schemas.microsoft.com/office/drawing/2017/decorative" val="1"/>
+              </a:ext>
+            </a:extLst>
+          </p:cNvPr>
+          <p:cNvSpPr>
+            <a:spLocks noGrp="1" noRot="1" noChangeAspect="1" noMove="1" noResize="1" noEditPoints="1" noAdjustHandles="1" noChangeArrowheads="1" noChangeShapeType="1" noTextEdit="1"/>
+          </p:cNvSpPr>
+          <p:nvPr>
+            <p:extLst>
+              <p:ext uri="{386F3935-93C4-4BCD-93E2-E3B085C9AB24}">
+                <p16:designElem xmlns:p16="http://schemas.microsoft.com/office/powerpoint/2015/main" val="1"/>
+              </p:ext>
+            </p:extLst>
+          </p:nvPr>
+        </p:nvSpPr>
+        <p:spPr>
+          <a:xfrm>
+            <a:off x="0" y="10585020"/>
+            <a:ext cx="12288740" cy="3130982"/>
+          </a:xfrm>
+          <a:custGeom>
+            <a:avLst/>
+            <a:gdLst>
+              <a:gd name="connsiteX0" fmla="*/ 0 w 6144370"/>
+              <a:gd name="connsiteY0" fmla="*/ 0 h 1565491"/>
+              <a:gd name="connsiteX1" fmla="*/ 6144370 w 6144370"/>
+              <a:gd name="connsiteY1" fmla="*/ 0 h 1565491"/>
+              <a:gd name="connsiteX2" fmla="*/ 5419344 w 6144370"/>
+              <a:gd name="connsiteY2" fmla="*/ 1565491 h 1565491"/>
+              <a:gd name="connsiteX3" fmla="*/ 0 w 6144370"/>
+              <a:gd name="connsiteY3" fmla="*/ 1565491 h 1565491"/>
+            </a:gdLst>
+            <a:ahLst/>
+            <a:cxnLst>
+              <a:cxn ang="0">
+                <a:pos x="connsiteX0" y="connsiteY0"/>
+              </a:cxn>
+              <a:cxn ang="0">
+                <a:pos x="connsiteX1" y="connsiteY1"/>
+              </a:cxn>
+              <a:cxn ang="0">
+                <a:pos x="connsiteX2" y="connsiteY2"/>
+              </a:cxn>
+              <a:cxn ang="0">
+                <a:pos x="connsiteX3" y="connsiteY3"/>
+              </a:cxn>
+            </a:cxnLst>
+            <a:rect l="l" t="t" r="r" b="b"/>
+            <a:pathLst>
+              <a:path w="6144370" h="1565491">
+                <a:moveTo>
+                  <a:pt x="0" y="0"/>
+                </a:moveTo>
+                <a:lnTo>
+                  <a:pt x="6144370" y="0"/>
+                </a:lnTo>
+                <a:lnTo>
+                  <a:pt x="5419344" y="1565491"/>
+                </a:lnTo>
+                <a:lnTo>
+                  <a:pt x="0" y="1565491"/>
+                </a:lnTo>
+                <a:close/>
+              </a:path>
+            </a:pathLst>
+          </a:custGeom>
+          <a:solidFill>
+            <a:srgbClr val="B4B4B4">
+              <a:alpha val="50000"/>
+            </a:srgbClr>
+          </a:solidFill>
+          <a:ln>
+            <a:noFill/>
+          </a:ln>
+        </p:spPr>
+        <p:style>
+          <a:lnRef idx="2">
+            <a:schemeClr val="accent1">
+              <a:shade val="50000"/>
+            </a:schemeClr>
+          </a:lnRef>
+          <a:fillRef idx="1">
+            <a:schemeClr val="accent1"/>
+          </a:fillRef>
+          <a:effectRef idx="0">
+            <a:schemeClr val="accent1"/>
+          </a:effectRef>
+          <a:fontRef idx="minor">
+            <a:schemeClr val="lt1"/>
+          </a:fontRef>
+        </p:style>
+        <p:txBody>
+          <a:bodyPr wrap="square" rtlCol="0" anchor="ctr">
+            <a:noAutofit/>
+          </a:bodyPr>
+          <a:lstStyle/>
+          <a:p>
+            <a:pPr marL="0" marR="0" lvl="0" indent="0" algn="ctr" defTabSz="825175" rtl="0" eaLnBrk="1" fontAlgn="auto" latinLnBrk="0" hangingPunct="0">
+              <a:lnSpc>
+                <a:spcPct val="100000"/>
+              </a:lnSpc>
+              <a:spcBef>
+                <a:spcPts val="0"/>
+              </a:spcBef>
+              <a:spcAft>
+                <a:spcPts val="0"/>
+              </a:spcAft>
+              <a:buClrTx/>
+              <a:buSzTx/>
+              <a:buFontTx/>
+              <a:buNone/>
+              <a:tabLst/>
+              <a:defRPr/>
+            </a:pPr>
+            <a:endParaRPr kumimoji="0" lang="en-US" sz="5000" b="0" i="0" u="none" strike="noStrike" kern="0" cap="none" spc="0" normalizeH="0" baseline="0" noProof="0">
+              <a:ln>
+                <a:noFill/>
+              </a:ln>
+              <a:solidFill>
+                <a:prstClr val="white"/>
+              </a:solidFill>
+              <a:effectLst/>
+              <a:uLnTx/>
+              <a:uFillTx/>
+              <a:latin typeface="Calibri"/>
+              <a:ea typeface="+mn-ea"/>
+              <a:cs typeface="+mn-cs"/>
+              <a:sym typeface="Helvetica Light"/>
+            </a:endParaRPr>
+          </a:p>
+        </p:txBody>
+      </p:sp>
+      <p:sp>
+        <p:nvSpPr>
+          <p:cNvPr id="2" name="TextBox 1">
+            <a:extLst>
+              <a:ext uri="{FF2B5EF4-FFF2-40B4-BE49-F238E27FC236}">
+                <a16:creationId xmlns:a16="http://schemas.microsoft.com/office/drawing/2014/main" id="{31E610BA-2445-48AC-8748-FC944DAA41F9}"/>
+              </a:ext>
+            </a:extLst>
+          </p:cNvPr>
+          <p:cNvSpPr txBox="1"/>
+          <p:nvPr/>
+        </p:nvSpPr>
+        <p:spPr>
+          <a:xfrm>
+            <a:off x="419099" y="2614963"/>
+            <a:ext cx="14502246" cy="646331"/>
+          </a:xfrm>
+          <a:prstGeom prst="rect">
+            <a:avLst/>
+          </a:prstGeom>
+          <a:noFill/>
+        </p:spPr>
+        <p:txBody>
+          <a:bodyPr wrap="square" rtlCol="0">
+            <a:spAutoFit/>
+          </a:bodyPr>
+          <a:lstStyle/>
+          <a:p>
+            <a:pPr marL="914400" marR="0" lvl="0" indent="-914400" algn="l" defTabSz="825175" rtl="0" eaLnBrk="1" fontAlgn="auto" latinLnBrk="0" hangingPunct="0">
+              <a:lnSpc>
+                <a:spcPct val="100000"/>
+              </a:lnSpc>
+              <a:spcBef>
+                <a:spcPts val="0"/>
+              </a:spcBef>
+              <a:spcAft>
+                <a:spcPts val="0"/>
+              </a:spcAft>
+              <a:buClrTx/>
+              <a:buSzTx/>
+              <a:buFont typeface="+mj-lt"/>
+              <a:buAutoNum type="arabicPeriod"/>
+              <a:tabLst/>
+              <a:defRPr/>
+            </a:pPr>
+            <a:r>
+              <a:rPr kumimoji="0" lang="en-US" sz="3600" b="1" i="0" u="none" strike="noStrike" kern="0" cap="none" spc="0" normalizeH="0" baseline="0" noProof="0" dirty="0">
+                <a:ln>
+                  <a:noFill/>
+                </a:ln>
+                <a:solidFill>
+                  <a:prstClr val="black">
+                    <a:lumMod val="65000"/>
+                    <a:lumOff val="35000"/>
+                  </a:prstClr>
+                </a:solidFill>
+                <a:effectLst/>
+                <a:uLnTx/>
+                <a:uFillTx/>
+                <a:latin typeface="Calibri Light"/>
+                <a:ea typeface="+mn-ea"/>
+                <a:cs typeface="+mn-cs"/>
+                <a:sym typeface="Helvetica Light"/>
+              </a:rPr>
+              <a:t>…</a:t>
+            </a:r>
+          </a:p>
+        </p:txBody>
+      </p:sp>
+      <p:sp>
+        <p:nvSpPr>
+          <p:cNvPr id="7" name="Title 6">
+            <a:extLst>
+              <a:ext uri="{FF2B5EF4-FFF2-40B4-BE49-F238E27FC236}">
+                <a16:creationId xmlns:a16="http://schemas.microsoft.com/office/drawing/2014/main" id="{B86906AC-5EF2-4E3E-B81D-6950BDD8E582}"/>
+              </a:ext>
+            </a:extLst>
+          </p:cNvPr>
+          <p:cNvSpPr txBox="1">
+            <a:spLocks/>
+          </p:cNvSpPr>
+          <p:nvPr/>
+        </p:nvSpPr>
+        <p:spPr>
+          <a:xfrm>
+            <a:off x="419099" y="269875"/>
+            <a:ext cx="15042573" cy="1655763"/>
+          </a:xfrm>
+          <a:prstGeom prst="rect">
+            <a:avLst/>
+          </a:prstGeom>
+        </p:spPr>
+        <p:txBody>
+          <a:bodyPr vert="horz" lIns="91440" tIns="45720" rIns="91440" bIns="45720" rtlCol="0" anchor="ctr">
+            <a:normAutofit/>
+          </a:bodyPr>
+          <a:lstStyle>
+            <a:lvl1pPr algn="l" defTabSz="914400" rtl="0" eaLnBrk="1" latinLnBrk="0" hangingPunct="1">
+              <a:lnSpc>
+                <a:spcPct val="90000"/>
+              </a:lnSpc>
+              <a:spcBef>
+                <a:spcPct val="0"/>
+              </a:spcBef>
+              <a:buNone/>
+              <a:defRPr sz="4400" b="0" i="0" kern="1200">
+                <a:solidFill>
+                  <a:schemeClr val="bg1"/>
+                </a:solidFill>
+                <a:latin typeface="Lato Thin" charset="0"/>
+                <a:ea typeface="Lato Thin" charset="0"/>
+                <a:cs typeface="Lato Thin" charset="0"/>
+              </a:defRPr>
+            </a:lvl1pPr>
+          </a:lstStyle>
+          <a:p>
+            <a:pPr marL="0" marR="0" lvl="0" indent="0" algn="l" defTabSz="914400" rtl="0" eaLnBrk="1" fontAlgn="auto" latinLnBrk="0" hangingPunct="1">
+              <a:lnSpc>
+                <a:spcPct val="90000"/>
+              </a:lnSpc>
+              <a:spcBef>
+                <a:spcPct val="0"/>
+              </a:spcBef>
+              <a:spcAft>
+                <a:spcPts val="0"/>
+              </a:spcAft>
+              <a:buClrTx/>
+              <a:buSzTx/>
+              <a:buFontTx/>
+              <a:buNone/>
+              <a:tabLst/>
+              <a:defRPr/>
+            </a:pPr>
+            <a:r>
+              <a:rPr kumimoji="0" lang="en-US" sz="6000" b="1" i="0" u="none" strike="noStrike" kern="1200" cap="none" spc="0" normalizeH="0" baseline="0" noProof="0" dirty="0">
+                <a:ln>
+                  <a:noFill/>
+                </a:ln>
+                <a:solidFill>
+                  <a:prstClr val="black"/>
+                </a:solidFill>
+                <a:effectLst>
+                  <a:outerShdw blurRad="38100" dist="38100" dir="2700000" algn="tl">
+                    <a:srgbClr val="000000">
+                      <a:alpha val="43137"/>
+                    </a:srgbClr>
+                  </a:outerShdw>
+                </a:effectLst>
+                <a:uLnTx/>
+                <a:uFillTx/>
+                <a:latin typeface="Calibri Light"/>
+                <a:ea typeface="+mj-ea"/>
+                <a:cs typeface="+mj-cs"/>
+                <a:sym typeface="Helvetica Light"/>
+              </a:rPr>
+              <a:t>Summary</a:t>
+            </a:r>
+            <a:endParaRPr kumimoji="0" lang="en-US" sz="6000" b="0" i="0" u="none" strike="noStrike" kern="1200" cap="none" spc="0" normalizeH="0" baseline="0" noProof="0" dirty="0">
+              <a:ln>
+                <a:noFill/>
+              </a:ln>
+              <a:solidFill>
+                <a:prstClr val="white"/>
+              </a:solidFill>
+              <a:effectLst/>
+              <a:uLnTx/>
+              <a:uFillTx/>
+              <a:latin typeface="Lato Thin" charset="0"/>
+              <a:sym typeface="Helvetica Light"/>
+            </a:endParaRPr>
+          </a:p>
+        </p:txBody>
+      </p:sp>
+    </p:spTree>
+    <p:extLst>
+      <p:ext uri="{BB962C8B-B14F-4D97-AF65-F5344CB8AC3E}">
+        <p14:creationId xmlns:p14="http://schemas.microsoft.com/office/powerpoint/2010/main" val="3100742841"/>
+      </p:ext>
+    </p:extLst>
+  </p:cSld>
+  <p:clrMapOvr>
+    <a:masterClrMapping/>
+  </p:clrMapOvr>
+</p:sld>
+</file>
+
+<file path=ppt/slides/slide14.xml><?xml version="1.0" encoding="utf-8"?>
 <p:sld xmlns:a="http://schemas.openxmlformats.org/drawingml/2006/main" xmlns:r="http://schemas.openxmlformats.org/officeDocument/2006/relationships" xmlns:p="http://schemas.openxmlformats.org/presentationml/2006/main">
   <p:cSld>
     <p:spTree>
@@ -10313,7 +12663,7 @@
 </file>
 
 <file path=ppt/slides/slide2.xml><?xml version="1.0" encoding="utf-8"?>
-<p:sld xmlns:a="http://schemas.openxmlformats.org/drawingml/2006/main" xmlns:r="http://schemas.openxmlformats.org/officeDocument/2006/relationships" xmlns:p="http://schemas.openxmlformats.org/presentationml/2006/main">
+<p:sld xmlns:a="http://schemas.openxmlformats.org/drawingml/2006/main" xmlns:r="http://schemas.openxmlformats.org/officeDocument/2006/relationships" xmlns:p="http://schemas.openxmlformats.org/presentationml/2006/main" show="0">
   <p:cSld>
     <p:bg>
       <p:bgPr>
@@ -10480,7 +12830,49 @@
                 <a:ea typeface="+mn-ea"/>
                 <a:cs typeface="+mn-cs"/>
               </a:rPr>
-              <a:t>- Struggles of the project</a:t>
+              <a:t>- Purpose of the System</a:t>
+            </a:r>
+            <a:br>
+              <a:rPr lang="en-US" sz="3600" dirty="0">
+                <a:solidFill>
+                  <a:schemeClr val="tx1"/>
+                </a:solidFill>
+                <a:latin typeface="+mn-lt"/>
+                <a:ea typeface="+mn-ea"/>
+                <a:cs typeface="+mn-cs"/>
+              </a:rPr>
+            </a:br>
+            <a:r>
+              <a:rPr lang="en-US" sz="3600" dirty="0">
+                <a:solidFill>
+                  <a:schemeClr val="tx1"/>
+                </a:solidFill>
+                <a:latin typeface="+mn-lt"/>
+                <a:ea typeface="+mn-ea"/>
+                <a:cs typeface="+mn-cs"/>
+              </a:rPr>
+              <a:t>- Solution Overview</a:t>
+            </a:r>
+            <a:br>
+              <a:rPr lang="en-US" sz="3600" dirty="0">
+                <a:solidFill>
+                  <a:schemeClr val="tx1"/>
+                </a:solidFill>
+                <a:latin typeface="+mn-lt"/>
+                <a:ea typeface="+mn-ea"/>
+                <a:cs typeface="+mn-cs"/>
+              </a:rPr>
+            </a:br>
+            <a:r>
+              <a:rPr lang="en-US" sz="3600" dirty="0">
+                <a:solidFill>
+                  <a:schemeClr val="tx1"/>
+                </a:solidFill>
+                <a:latin typeface="+mn-lt"/>
+                <a:ea typeface="+mn-ea"/>
+                <a:cs typeface="+mn-cs"/>
+              </a:rPr>
+              <a:t>- Challenges of the project</a:t>
             </a:r>
             <a:br>
               <a:rPr lang="en-US" sz="3600" dirty="0">
@@ -10523,6 +12915,27 @@
                 <a:cs typeface="+mn-cs"/>
               </a:rPr>
               <a:t>- Multiple Validations</a:t>
+            </a:r>
+            <a:br>
+              <a:rPr lang="en-US" sz="3600" dirty="0">
+                <a:solidFill>
+                  <a:schemeClr val="tx1"/>
+                </a:solidFill>
+                <a:latin typeface="+mn-lt"/>
+                <a:ea typeface="+mn-ea"/>
+                <a:cs typeface="+mn-cs"/>
+              </a:rPr>
+            </a:br>
+            <a:r>
+              <a:rPr lang="en-US" sz="3600" dirty="0">
+                <a:solidFill>
+                  <a:schemeClr val="tx1"/>
+                </a:solidFill>
+                <a:latin typeface="+mn-lt"/>
+                <a:ea typeface="+mn-ea"/>
+                <a:cs typeface="+mn-cs"/>
+              </a:rPr>
+              <a:t>- Unit Test</a:t>
             </a:r>
             <a:br>
               <a:rPr lang="en-US" sz="3600" dirty="0">
@@ -10607,6 +13020,27 @@
                 <a:cs typeface="+mn-cs"/>
               </a:rPr>
               <a:t>- Database Migration</a:t>
+            </a:r>
+            <a:br>
+              <a:rPr lang="en-US" sz="3600" dirty="0">
+                <a:solidFill>
+                  <a:schemeClr val="tx1"/>
+                </a:solidFill>
+                <a:latin typeface="+mn-lt"/>
+                <a:ea typeface="+mn-ea"/>
+                <a:cs typeface="+mn-cs"/>
+              </a:rPr>
+            </a:br>
+            <a:r>
+              <a:rPr lang="en-US" sz="3600" dirty="0">
+                <a:solidFill>
+                  <a:schemeClr val="tx1"/>
+                </a:solidFill>
+                <a:latin typeface="+mn-lt"/>
+                <a:ea typeface="+mn-ea"/>
+                <a:cs typeface="+mn-cs"/>
+              </a:rPr>
+              <a:t>- Future Work</a:t>
             </a:r>
           </a:p>
         </p:txBody>
@@ -10935,7 +13369,7 @@
 </file>
 
 <file path=ppt/slides/slide3.xml><?xml version="1.0" encoding="utf-8"?>
-<p:sld xmlns:a="http://schemas.openxmlformats.org/drawingml/2006/main" xmlns:r="http://schemas.openxmlformats.org/officeDocument/2006/relationships" xmlns:p="http://schemas.openxmlformats.org/presentationml/2006/main" show="0">
+<p:sld xmlns:a="http://schemas.openxmlformats.org/drawingml/2006/main" xmlns:r="http://schemas.openxmlformats.org/officeDocument/2006/relationships" xmlns:p="http://schemas.openxmlformats.org/presentationml/2006/main">
   <p:cSld>
     <p:bg>
       <p:bgPr>
@@ -11033,13 +13467,13 @@
         </p:nvSpPr>
         <p:spPr>
           <a:xfrm>
-            <a:off x="775607" y="685800"/>
-            <a:ext cx="12123964" cy="9119507"/>
+            <a:off x="1110996" y="1098700"/>
+            <a:ext cx="11796930" cy="8264400"/>
           </a:xfrm>
         </p:spPr>
         <p:txBody>
           <a:bodyPr vert="horz" lIns="91440" tIns="45720" rIns="91440" bIns="45720" rtlCol="0" anchor="ctr">
-            <a:normAutofit/>
+            <a:noAutofit/>
           </a:bodyPr>
           <a:lstStyle/>
           <a:p>
@@ -11059,28 +13493,7 @@
                 <a:ea typeface="+mj-ea"/>
                 <a:cs typeface="+mj-cs"/>
               </a:rPr>
-              <a:t>Technologies</a:t>
-            </a:r>
-            <a:br>
-              <a:rPr lang="en-US" sz="3600" b="1" dirty="0">
-                <a:solidFill>
-                  <a:schemeClr val="tx1"/>
-                </a:solidFill>
-                <a:latin typeface="+mj-lt"/>
-                <a:ea typeface="+mj-ea"/>
-                <a:cs typeface="+mj-cs"/>
-              </a:rPr>
-            </a:br>
-            <a:r>
-              <a:rPr lang="en-US" sz="2800" dirty="0">
-                <a:solidFill>
-                  <a:schemeClr val="tx1"/>
-                </a:solidFill>
-                <a:latin typeface="+mj-lt"/>
-                <a:ea typeface="+mj-ea"/>
-                <a:cs typeface="+mj-cs"/>
-              </a:rPr>
-              <a:t>- MVVM Architecture </a:t>
+              <a:t>Purpose of the System</a:t>
             </a:r>
             <a:br>
               <a:rPr lang="en-US" sz="2800" dirty="0">
@@ -11101,7 +13514,7 @@
                 <a:ea typeface="+mj-ea"/>
                 <a:cs typeface="+mj-cs"/>
               </a:rPr>
-              <a:t>- C# / WPF </a:t>
+              <a:t>- Multi-Language Support: English, French, Mandarin</a:t>
             </a:r>
             <a:br>
               <a:rPr lang="en-US" sz="2800" dirty="0">
@@ -11122,7 +13535,7 @@
                 <a:ea typeface="+mj-ea"/>
                 <a:cs typeface="+mj-cs"/>
               </a:rPr>
-              <a:t>- Entity Framework (DB First)</a:t>
+              <a:t>- Register/Cancel Courses</a:t>
             </a:r>
             <a:br>
               <a:rPr lang="en-US" sz="2800" dirty="0">
@@ -11143,7 +13556,7 @@
                 <a:ea typeface="+mj-ea"/>
                 <a:cs typeface="+mj-cs"/>
               </a:rPr>
-              <a:t>- RDBMS</a:t>
+              <a:t>- Manage assignment and grade</a:t>
             </a:r>
             <a:br>
               <a:rPr lang="en-US" sz="2800" dirty="0">
@@ -11164,7 +13577,49 @@
                 <a:ea typeface="+mj-ea"/>
                 <a:cs typeface="+mj-cs"/>
               </a:rPr>
-              <a:t>- 2D drawing (chart)</a:t>
+              <a:t>- Search by key-words/time/language: course, teacher</a:t>
+            </a:r>
+            <a:br>
+              <a:rPr lang="en-US" sz="2800" dirty="0">
+                <a:solidFill>
+                  <a:schemeClr val="tx1"/>
+                </a:solidFill>
+                <a:latin typeface="+mj-lt"/>
+                <a:ea typeface="+mj-ea"/>
+                <a:cs typeface="+mj-cs"/>
+              </a:rPr>
+            </a:br>
+            <a:r>
+              <a:rPr lang="en-US" sz="2400" dirty="0">
+                <a:solidFill>
+                  <a:schemeClr val="tx1"/>
+                </a:solidFill>
+                <a:latin typeface="+mj-lt"/>
+                <a:ea typeface="+mj-ea"/>
+                <a:cs typeface="+mj-cs"/>
+              </a:rPr>
+              <a:t>	- Course Time: day or night of weekdays, weekends, summer camp, etc.</a:t>
+            </a:r>
+            <a:br>
+              <a:rPr lang="en-US" sz="2400" dirty="0">
+                <a:solidFill>
+                  <a:schemeClr val="tx1"/>
+                </a:solidFill>
+                <a:latin typeface="+mj-lt"/>
+                <a:ea typeface="+mj-ea"/>
+                <a:cs typeface="+mj-cs"/>
+              </a:rPr>
+            </a:br>
+            <a:r>
+              <a:rPr lang="en-US" sz="2400" dirty="0">
+                <a:solidFill>
+                  <a:schemeClr val="tx1"/>
+                </a:solidFill>
+                <a:latin typeface="+mj-lt"/>
+                <a:ea typeface="+mj-ea"/>
+                <a:cs typeface="+mj-cs"/>
+              </a:rPr>
+              <a:t>	- Course Type: small class, one-to-one class, on-line class, etc.</a:t>
             </a:r>
             <a:br>
               <a:rPr lang="en-US" sz="2800" dirty="0">
@@ -11185,28 +13640,7 @@
                 <a:ea typeface="+mj-ea"/>
                 <a:cs typeface="+mj-cs"/>
               </a:rPr>
-              <a:t>- Globalization / Localization</a:t>
-            </a:r>
-            <a:br>
-              <a:rPr lang="en-US" sz="2800" dirty="0">
-                <a:solidFill>
-                  <a:schemeClr val="tx1"/>
-                </a:solidFill>
-                <a:latin typeface="+mj-lt"/>
-                <a:ea typeface="+mj-ea"/>
-                <a:cs typeface="+mj-cs"/>
-              </a:rPr>
-            </a:br>
-            <a:r>
-              <a:rPr lang="en-US" sz="2800" dirty="0">
-                <a:solidFill>
-                  <a:schemeClr val="tx1"/>
-                </a:solidFill>
-                <a:latin typeface="+mj-lt"/>
-                <a:ea typeface="+mj-ea"/>
-                <a:cs typeface="+mj-cs"/>
-              </a:rPr>
-              <a:t>- Unit Test</a:t>
+              <a:t>- Payment</a:t>
             </a:r>
             <a:br>
               <a:rPr lang="en-US" sz="2800" dirty="0">
@@ -11219,17 +13653,7 @@
               </a:rPr>
             </a:br>
             <a:br>
-              <a:rPr lang="en-US" sz="3600" dirty="0">
-                <a:solidFill>
-                  <a:schemeClr val="tx1"/>
-                </a:solidFill>
-                <a:latin typeface="+mj-lt"/>
-                <a:ea typeface="+mj-ea"/>
-                <a:cs typeface="+mj-cs"/>
-              </a:rPr>
-            </a:br>
-            <a:br>
-              <a:rPr lang="en-US" sz="3600" dirty="0">
+              <a:rPr lang="en-US" sz="2800" dirty="0">
                 <a:solidFill>
                   <a:schemeClr val="tx1"/>
                 </a:solidFill>
@@ -11254,28 +13678,7 @@
                 <a:ea typeface="+mj-ea"/>
                 <a:cs typeface="+mj-cs"/>
               </a:rPr>
-              <a:t>Challenges</a:t>
-            </a:r>
-            <a:br>
-              <a:rPr lang="en-US" sz="3600" dirty="0">
-                <a:solidFill>
-                  <a:schemeClr val="tx1"/>
-                </a:solidFill>
-                <a:latin typeface="+mj-lt"/>
-                <a:ea typeface="+mj-ea"/>
-                <a:cs typeface="+mj-cs"/>
-              </a:rPr>
-            </a:br>
-            <a:r>
-              <a:rPr lang="en-US" sz="2800" dirty="0">
-                <a:solidFill>
-                  <a:schemeClr val="tx1"/>
-                </a:solidFill>
-                <a:latin typeface="+mj-lt"/>
-                <a:ea typeface="+mj-ea"/>
-                <a:cs typeface="+mj-cs"/>
-              </a:rPr>
-              <a:t>- MVVM Architecture</a:t>
+              <a:t>Modules</a:t>
             </a:r>
             <a:br>
               <a:rPr lang="en-US" sz="2800" dirty="0">
@@ -11296,7 +13699,7 @@
                 <a:ea typeface="+mj-ea"/>
                 <a:cs typeface="+mj-cs"/>
               </a:rPr>
-              <a:t>- Multiple Validations (XAML, view model, model, database)</a:t>
+              <a:t>- Student Application </a:t>
             </a:r>
             <a:br>
               <a:rPr lang="en-US" sz="2800" dirty="0">
@@ -11317,7 +13720,18 @@
                 <a:ea typeface="+mj-ea"/>
                 <a:cs typeface="+mj-cs"/>
               </a:rPr>
-              <a:t>- UI Design (Responsive, Tab, Animation Effect, User Control)</a:t>
+              <a:t>	</a:t>
+            </a:r>
+            <a:r>
+              <a:rPr lang="en-US" sz="2400" dirty="0">
+                <a:solidFill>
+                  <a:schemeClr val="tx1"/>
+                </a:solidFill>
+                <a:latin typeface="+mj-lt"/>
+                <a:ea typeface="+mj-ea"/>
+                <a:cs typeface="+mj-cs"/>
+              </a:rPr>
+              <a:t>- register courses, cancel courses, payment</a:t>
             </a:r>
             <a:br>
               <a:rPr lang="en-US" sz="2800" dirty="0">
@@ -11338,10 +13752,31 @@
                 <a:ea typeface="+mj-ea"/>
                 <a:cs typeface="+mj-cs"/>
               </a:rPr>
-              <a:t>- Drawing pie chart / bar chart</a:t>
+              <a:t>- School Application</a:t>
             </a:r>
             <a:br>
-              <a:rPr lang="en-US" sz="2800" dirty="0">
+              <a:rPr lang="en-US" sz="2400" dirty="0">
+                <a:solidFill>
+                  <a:schemeClr val="tx1"/>
+                </a:solidFill>
+                <a:latin typeface="+mj-lt"/>
+                <a:ea typeface="+mj-ea"/>
+                <a:cs typeface="+mj-cs"/>
+              </a:rPr>
+            </a:br>
+            <a:r>
+              <a:rPr lang="en-US" sz="2400" dirty="0">
+                <a:solidFill>
+                  <a:schemeClr val="tx1"/>
+                </a:solidFill>
+                <a:latin typeface="+mj-lt"/>
+                <a:ea typeface="+mj-ea"/>
+                <a:cs typeface="+mj-cs"/>
+              </a:rPr>
+              <a:t>	- Teacher (course time, assignment, grade)</a:t>
+            </a:r>
+            <a:br>
+              <a:rPr lang="en-US" sz="2400" dirty="0">
                 <a:solidFill>
                   <a:schemeClr val="tx1"/>
                 </a:solidFill>
@@ -11359,10 +13794,10 @@
                 <a:ea typeface="+mj-ea"/>
                 <a:cs typeface="+mj-cs"/>
               </a:rPr>
-              <a:t>- String Translation</a:t>
+              <a:t>- Library</a:t>
             </a:r>
             <a:br>
-              <a:rPr lang="en-US" sz="2800" dirty="0">
+              <a:rPr lang="en-US" sz="2400" dirty="0">
                 <a:solidFill>
                   <a:schemeClr val="tx1"/>
                 </a:solidFill>
@@ -11372,7 +13807,7 @@
               </a:rPr>
             </a:br>
             <a:r>
-              <a:rPr lang="en-US" sz="2800" dirty="0">
+              <a:rPr lang="en-US" sz="2400" dirty="0">
                 <a:solidFill>
                   <a:schemeClr val="tx1"/>
                 </a:solidFill>
@@ -11380,36 +13815,12 @@
                 <a:ea typeface="+mj-ea"/>
                 <a:cs typeface="+mj-cs"/>
               </a:rPr>
-              <a:t>- Database Migration (Local to Azure)</a:t>
+              <a:t>	- all common shared functionalities</a:t>
             </a:r>
-            <a:br>
-              <a:rPr lang="en-US" sz="2800" dirty="0">
-                <a:solidFill>
-                  <a:schemeClr val="tx1"/>
-                </a:solidFill>
-                <a:latin typeface="+mj-lt"/>
-                <a:ea typeface="+mj-ea"/>
-                <a:cs typeface="+mj-cs"/>
-              </a:rPr>
-            </a:br>
-            <a:r>
-              <a:rPr lang="en-US" sz="2800" dirty="0">
-                <a:solidFill>
-                  <a:schemeClr val="tx1"/>
-                </a:solidFill>
-                <a:latin typeface="+mj-lt"/>
-                <a:ea typeface="+mj-ea"/>
-                <a:cs typeface="+mj-cs"/>
-              </a:rPr>
-              <a:t>- Publish Install Packages</a:t>
-            </a:r>
-            <a:endParaRPr lang="en-US" sz="2800" strike="sngStrike" dirty="0">
+            <a:endParaRPr lang="en-US" sz="2800" dirty="0">
               <a:solidFill>
-                <a:srgbClr val="FF0000"/>
+                <a:schemeClr val="tx1"/>
               </a:solidFill>
-              <a:highlight>
-                <a:srgbClr val="FFFF00"/>
-              </a:highlight>
               <a:latin typeface="+mj-lt"/>
               <a:ea typeface="+mj-ea"/>
               <a:cs typeface="+mj-cs"/>
@@ -11419,7 +13830,7 @@
       </p:sp>
       <p:sp>
         <p:nvSpPr>
-          <p:cNvPr id="16" name="Freeform: Shape 15">
+          <p:cNvPr id="20" name="Freeform: Shape 19">
             <a:extLst>
               <a:ext uri="{FF2B5EF4-FFF2-40B4-BE49-F238E27FC236}">
                 <a16:creationId xmlns:a16="http://schemas.microsoft.com/office/drawing/2014/main" id="{5EB73228-F09B-409F-9EC1-7E853C4F5B43}"/>
@@ -11552,14 +13963,44 @@
           </a:bodyPr>
           <a:lstStyle/>
           <a:p>
-            <a:pPr algn="ctr"/>
-            <a:endParaRPr lang="en-US"/>
+            <a:pPr marL="0" marR="0" lvl="0" indent="0" algn="ctr" defTabSz="825175" rtl="0" eaLnBrk="1" fontAlgn="auto" latinLnBrk="0" hangingPunct="0">
+              <a:lnSpc>
+                <a:spcPct val="100000"/>
+              </a:lnSpc>
+              <a:spcBef>
+                <a:spcPts val="0"/>
+              </a:spcBef>
+              <a:spcAft>
+                <a:spcPts val="0"/>
+              </a:spcAft>
+              <a:buClrTx/>
+              <a:buSzTx/>
+              <a:buFontTx/>
+              <a:buNone/>
+              <a:tabLst/>
+              <a:defRPr/>
+            </a:pPr>
+            <a:endParaRPr kumimoji="0" lang="en-US" sz="5000" b="0" i="0" u="none" strike="noStrike" kern="0" cap="none" spc="0" normalizeH="0" baseline="0" noProof="0">
+              <a:ln>
+                <a:noFill/>
+              </a:ln>
+              <a:solidFill>
+                <a:prstClr val="white"/>
+              </a:solidFill>
+              <a:effectLst/>
+              <a:uLnTx/>
+              <a:uFillTx/>
+              <a:latin typeface="Calibri"/>
+              <a:ea typeface="+mn-ea"/>
+              <a:cs typeface="+mn-cs"/>
+              <a:sym typeface="Helvetica Light"/>
+            </a:endParaRPr>
           </a:p>
         </p:txBody>
       </p:sp>
       <p:sp>
         <p:nvSpPr>
-          <p:cNvPr id="18" name="Freeform: Shape 17">
+          <p:cNvPr id="22" name="Freeform: Shape 21">
             <a:extLst>
               <a:ext uri="{FF2B5EF4-FFF2-40B4-BE49-F238E27FC236}">
                 <a16:creationId xmlns:a16="http://schemas.microsoft.com/office/drawing/2014/main" id="{3150A4AE-7BE7-480D-BD8C-3951E6479910}"/>
@@ -11662,25 +14103,837 @@
           </a:bodyPr>
           <a:lstStyle/>
           <a:p>
-            <a:pPr algn="ctr"/>
-            <a:endParaRPr lang="en-US"/>
+            <a:pPr marL="0" marR="0" lvl="0" indent="0" algn="ctr" defTabSz="825175" rtl="0" eaLnBrk="1" fontAlgn="auto" latinLnBrk="0" hangingPunct="0">
+              <a:lnSpc>
+                <a:spcPct val="100000"/>
+              </a:lnSpc>
+              <a:spcBef>
+                <a:spcPts val="0"/>
+              </a:spcBef>
+              <a:spcAft>
+                <a:spcPts val="0"/>
+              </a:spcAft>
+              <a:buClrTx/>
+              <a:buSzTx/>
+              <a:buFontTx/>
+              <a:buNone/>
+              <a:tabLst/>
+              <a:defRPr/>
+            </a:pPr>
+            <a:endParaRPr kumimoji="0" lang="en-US" sz="5000" b="0" i="0" u="none" strike="noStrike" kern="0" cap="none" spc="0" normalizeH="0" baseline="0" noProof="0">
+              <a:ln>
+                <a:noFill/>
+              </a:ln>
+              <a:solidFill>
+                <a:prstClr val="white"/>
+              </a:solidFill>
+              <a:effectLst/>
+              <a:uLnTx/>
+              <a:uFillTx/>
+              <a:latin typeface="Calibri"/>
+              <a:ea typeface="+mn-ea"/>
+              <a:cs typeface="+mn-cs"/>
+              <a:sym typeface="Helvetica Light"/>
+            </a:endParaRPr>
           </a:p>
         </p:txBody>
       </p:sp>
     </p:spTree>
     <p:extLst>
       <p:ext uri="{BB962C8B-B14F-4D97-AF65-F5344CB8AC3E}">
-        <p14:creationId xmlns:p14="http://schemas.microsoft.com/office/powerpoint/2010/main" val="1568361308"/>
+        <p14:creationId xmlns:p14="http://schemas.microsoft.com/office/powerpoint/2010/main" val="3160972817"/>
       </p:ext>
     </p:extLst>
   </p:cSld>
   <p:clrMapOvr>
     <a:masterClrMapping/>
   </p:clrMapOvr>
+  <p:timing>
+    <p:tnLst>
+      <p:par>
+        <p:cTn id="1" dur="indefinite" restart="never" nodeType="tmRoot">
+          <p:childTnLst>
+            <p:seq concurrent="1" nextAc="seek">
+              <p:cTn id="2" dur="indefinite" nodeType="mainSeq">
+                <p:childTnLst>
+                  <p:par>
+                    <p:cTn id="3" fill="hold">
+                      <p:stCondLst>
+                        <p:cond delay="indefinite"/>
+                        <p:cond evt="onBegin" delay="0">
+                          <p:tn val="2"/>
+                        </p:cond>
+                      </p:stCondLst>
+                      <p:childTnLst>
+                        <p:par>
+                          <p:cTn id="4" fill="hold">
+                            <p:stCondLst>
+                              <p:cond delay="0"/>
+                            </p:stCondLst>
+                            <p:childTnLst>
+                              <p:par>
+                                <p:cTn id="5" presetID="10" presetClass="entr" presetSubtype="0" fill="hold" grpId="0" nodeType="withEffect">
+                                  <p:stCondLst>
+                                    <p:cond delay="1000"/>
+                                  </p:stCondLst>
+                                  <p:iterate>
+                                    <p:tmPct val="10000"/>
+                                  </p:iterate>
+                                  <p:childTnLst>
+                                    <p:set>
+                                      <p:cBhvr>
+                                        <p:cTn id="6" dur="1" fill="hold">
+                                          <p:stCondLst>
+                                            <p:cond delay="0"/>
+                                          </p:stCondLst>
+                                        </p:cTn>
+                                        <p:tgtEl>
+                                          <p:spTgt spid="6"/>
+                                        </p:tgtEl>
+                                        <p:attrNameLst>
+                                          <p:attrName>style.visibility</p:attrName>
+                                        </p:attrNameLst>
+                                      </p:cBhvr>
+                                      <p:to>
+                                        <p:strVal val="visible"/>
+                                      </p:to>
+                                    </p:set>
+                                    <p:animEffect transition="in" filter="fade">
+                                      <p:cBhvr>
+                                        <p:cTn id="7" dur="700"/>
+                                        <p:tgtEl>
+                                          <p:spTgt spid="6"/>
+                                        </p:tgtEl>
+                                      </p:cBhvr>
+                                    </p:animEffect>
+                                  </p:childTnLst>
+                                </p:cTn>
+                              </p:par>
+                            </p:childTnLst>
+                          </p:cTn>
+                        </p:par>
+                      </p:childTnLst>
+                    </p:cTn>
+                  </p:par>
+                </p:childTnLst>
+              </p:cTn>
+              <p:prevCondLst>
+                <p:cond evt="onPrev" delay="0">
+                  <p:tgtEl>
+                    <p:sldTgt/>
+                  </p:tgtEl>
+                </p:cond>
+              </p:prevCondLst>
+              <p:nextCondLst>
+                <p:cond evt="onNext" delay="0">
+                  <p:tgtEl>
+                    <p:sldTgt/>
+                  </p:tgtEl>
+                </p:cond>
+              </p:nextCondLst>
+            </p:seq>
+          </p:childTnLst>
+        </p:cTn>
+      </p:par>
+    </p:tnLst>
+    <p:bldLst>
+      <p:bldP spid="6" grpId="0"/>
+    </p:bldLst>
+  </p:timing>
 </p:sld>
 </file>
 
 <file path=ppt/slides/slide4.xml><?xml version="1.0" encoding="utf-8"?>
+<p:sld xmlns:a="http://schemas.openxmlformats.org/drawingml/2006/main" xmlns:r="http://schemas.openxmlformats.org/officeDocument/2006/relationships" xmlns:p="http://schemas.openxmlformats.org/presentationml/2006/main">
+  <p:cSld>
+    <p:bg>
+      <p:bgPr>
+        <a:solidFill>
+          <a:schemeClr val="bg1"/>
+        </a:solidFill>
+        <a:effectLst/>
+      </p:bgPr>
+    </p:bg>
+    <p:spTree>
+      <p:nvGrpSpPr>
+        <p:cNvPr id="1" name=""/>
+        <p:cNvGrpSpPr/>
+        <p:nvPr/>
+      </p:nvGrpSpPr>
+      <p:grpSpPr>
+        <a:xfrm>
+          <a:off x="0" y="0"/>
+          <a:ext cx="0" cy="0"/>
+          <a:chOff x="0" y="0"/>
+          <a:chExt cx="0" cy="0"/>
+        </a:xfrm>
+      </p:grpSpPr>
+      <p:pic>
+        <p:nvPicPr>
+          <p:cNvPr id="3" name="Picture 2" descr="Chart, bubble chart&#10;&#10;Description automatically generated">
+            <a:extLst>
+              <a:ext uri="{FF2B5EF4-FFF2-40B4-BE49-F238E27FC236}">
+                <a16:creationId xmlns:a16="http://schemas.microsoft.com/office/drawing/2014/main" id="{5C116FA5-3FF7-4695-8D7B-D42992BAC524}"/>
+              </a:ext>
+            </a:extLst>
+          </p:cNvPr>
+          <p:cNvPicPr>
+            <a:picLocks noChangeAspect="1"/>
+          </p:cNvPicPr>
+          <p:nvPr/>
+        </p:nvPicPr>
+        <p:blipFill rotWithShape="1">
+          <a:blip r:embed="rId2">
+            <a:extLst>
+              <a:ext uri="{28A0092B-C50C-407E-A947-70E740481C1C}">
+                <a14:useLocalDpi xmlns:a14="http://schemas.microsoft.com/office/drawing/2010/main" val="0"/>
+              </a:ext>
+            </a:extLst>
+          </a:blip>
+          <a:srcRect l="10976" r="30151"/>
+          <a:stretch/>
+        </p:blipFill>
+        <p:spPr>
+          <a:xfrm>
+            <a:off x="12710884" y="10"/>
+            <a:ext cx="11673116" cy="10260818"/>
+          </a:xfrm>
+          <a:custGeom>
+            <a:avLst/>
+            <a:gdLst/>
+            <a:ahLst/>
+            <a:cxnLst/>
+            <a:rect l="l" t="t" r="r" b="b"/>
+            <a:pathLst>
+              <a:path w="5836558" h="5130414">
+                <a:moveTo>
+                  <a:pt x="2376055" y="0"/>
+                </a:moveTo>
+                <a:lnTo>
+                  <a:pt x="5836558" y="0"/>
+                </a:lnTo>
+                <a:lnTo>
+                  <a:pt x="5836558" y="5130414"/>
+                </a:lnTo>
+                <a:lnTo>
+                  <a:pt x="0" y="5130414"/>
+                </a:lnTo>
+                <a:close/>
+              </a:path>
+            </a:pathLst>
+          </a:custGeom>
+        </p:spPr>
+      </p:pic>
+      <p:sp>
+        <p:nvSpPr>
+          <p:cNvPr id="6" name="Title 5">
+            <a:extLst>
+              <a:ext uri="{FF2B5EF4-FFF2-40B4-BE49-F238E27FC236}">
+                <a16:creationId xmlns:a16="http://schemas.microsoft.com/office/drawing/2014/main" id="{705888C3-B4EE-E941-BA2B-EDBE718A4F0F}"/>
+              </a:ext>
+            </a:extLst>
+          </p:cNvPr>
+          <p:cNvSpPr>
+            <a:spLocks noGrp="1"/>
+          </p:cNvSpPr>
+          <p:nvPr>
+            <p:ph type="title"/>
+          </p:nvPr>
+        </p:nvSpPr>
+        <p:spPr>
+          <a:xfrm>
+            <a:off x="1110996" y="1098700"/>
+            <a:ext cx="11796930" cy="8264400"/>
+          </a:xfrm>
+        </p:spPr>
+        <p:txBody>
+          <a:bodyPr vert="horz" lIns="91440" tIns="45720" rIns="91440" bIns="45720" rtlCol="0" anchor="ctr">
+            <a:noAutofit/>
+          </a:bodyPr>
+          <a:lstStyle/>
+          <a:p>
+            <a:r>
+              <a:rPr lang="en-US" sz="3600" b="1" dirty="0">
+                <a:solidFill>
+                  <a:schemeClr val="tx1"/>
+                </a:solidFill>
+                <a:effectLst>
+                  <a:outerShdw blurRad="38100" dist="38100" dir="2700000" algn="tl">
+                    <a:srgbClr val="000000">
+                      <a:alpha val="43137"/>
+                    </a:srgbClr>
+                  </a:outerShdw>
+                </a:effectLst>
+                <a:latin typeface="+mj-lt"/>
+                <a:ea typeface="+mj-ea"/>
+                <a:cs typeface="+mj-cs"/>
+              </a:rPr>
+              <a:t>Solution</a:t>
+            </a:r>
+            <a:br>
+              <a:rPr lang="en-US" sz="2800" dirty="0">
+                <a:solidFill>
+                  <a:schemeClr val="tx1"/>
+                </a:solidFill>
+                <a:latin typeface="+mj-lt"/>
+                <a:ea typeface="+mj-ea"/>
+                <a:cs typeface="+mj-cs"/>
+              </a:rPr>
+            </a:br>
+            <a:r>
+              <a:rPr lang="en-US" sz="2800" dirty="0">
+                <a:solidFill>
+                  <a:schemeClr val="tx1"/>
+                </a:solidFill>
+                <a:latin typeface="+mj-lt"/>
+                <a:ea typeface="+mj-ea"/>
+                <a:cs typeface="+mj-cs"/>
+              </a:rPr>
+              <a:t>- Student Application </a:t>
+            </a:r>
+            <a:br>
+              <a:rPr lang="en-US" sz="2800" dirty="0">
+                <a:solidFill>
+                  <a:schemeClr val="tx1"/>
+                </a:solidFill>
+                <a:latin typeface="+mj-lt"/>
+                <a:ea typeface="+mj-ea"/>
+                <a:cs typeface="+mj-cs"/>
+              </a:rPr>
+            </a:br>
+            <a:r>
+              <a:rPr lang="en-US" sz="2800" dirty="0">
+                <a:solidFill>
+                  <a:schemeClr val="tx1"/>
+                </a:solidFill>
+                <a:latin typeface="+mj-lt"/>
+                <a:ea typeface="+mj-ea"/>
+                <a:cs typeface="+mj-cs"/>
+              </a:rPr>
+              <a:t>	</a:t>
+            </a:r>
+            <a:r>
+              <a:rPr lang="en-US" sz="2400" dirty="0">
+                <a:solidFill>
+                  <a:schemeClr val="tx1"/>
+                </a:solidFill>
+                <a:latin typeface="+mj-lt"/>
+                <a:ea typeface="+mj-ea"/>
+                <a:cs typeface="+mj-cs"/>
+              </a:rPr>
+              <a:t>- register courses, cancel courses, payment</a:t>
+            </a:r>
+            <a:br>
+              <a:rPr lang="en-US" sz="2800" dirty="0">
+                <a:solidFill>
+                  <a:schemeClr val="tx1"/>
+                </a:solidFill>
+                <a:latin typeface="+mj-lt"/>
+                <a:ea typeface="+mj-ea"/>
+                <a:cs typeface="+mj-cs"/>
+              </a:rPr>
+            </a:br>
+            <a:r>
+              <a:rPr lang="en-US" sz="2800" dirty="0">
+                <a:solidFill>
+                  <a:schemeClr val="tx1"/>
+                </a:solidFill>
+                <a:latin typeface="+mj-lt"/>
+                <a:ea typeface="+mj-ea"/>
+                <a:cs typeface="+mj-cs"/>
+              </a:rPr>
+              <a:t>- School Application</a:t>
+            </a:r>
+            <a:br>
+              <a:rPr lang="en-US" sz="2400" dirty="0">
+                <a:solidFill>
+                  <a:schemeClr val="tx1"/>
+                </a:solidFill>
+                <a:latin typeface="+mj-lt"/>
+                <a:ea typeface="+mj-ea"/>
+                <a:cs typeface="+mj-cs"/>
+              </a:rPr>
+            </a:br>
+            <a:r>
+              <a:rPr lang="en-US" sz="2400" dirty="0">
+                <a:solidFill>
+                  <a:schemeClr val="tx1"/>
+                </a:solidFill>
+                <a:latin typeface="+mj-lt"/>
+                <a:ea typeface="+mj-ea"/>
+                <a:cs typeface="+mj-cs"/>
+              </a:rPr>
+              <a:t>	- Teacher (course time, assignment, grade)</a:t>
+            </a:r>
+            <a:br>
+              <a:rPr lang="en-US" sz="2400" dirty="0">
+                <a:solidFill>
+                  <a:schemeClr val="tx1"/>
+                </a:solidFill>
+                <a:latin typeface="+mj-lt"/>
+                <a:ea typeface="+mj-ea"/>
+                <a:cs typeface="+mj-cs"/>
+              </a:rPr>
+            </a:br>
+            <a:r>
+              <a:rPr lang="en-US" sz="2800" dirty="0">
+                <a:solidFill>
+                  <a:schemeClr val="tx1"/>
+                </a:solidFill>
+                <a:latin typeface="+mj-lt"/>
+                <a:ea typeface="+mj-ea"/>
+                <a:cs typeface="+mj-cs"/>
+              </a:rPr>
+              <a:t>- Library</a:t>
+            </a:r>
+            <a:br>
+              <a:rPr lang="en-US" sz="2400" dirty="0">
+                <a:solidFill>
+                  <a:schemeClr val="tx1"/>
+                </a:solidFill>
+                <a:latin typeface="+mj-lt"/>
+                <a:ea typeface="+mj-ea"/>
+                <a:cs typeface="+mj-cs"/>
+              </a:rPr>
+            </a:br>
+            <a:r>
+              <a:rPr lang="en-US" sz="2400" dirty="0">
+                <a:solidFill>
+                  <a:schemeClr val="tx1"/>
+                </a:solidFill>
+                <a:latin typeface="+mj-lt"/>
+                <a:ea typeface="+mj-ea"/>
+                <a:cs typeface="+mj-cs"/>
+              </a:rPr>
+              <a:t>	- all common shared functionalities</a:t>
+            </a:r>
+            <a:endParaRPr lang="en-US" sz="2800" dirty="0">
+              <a:solidFill>
+                <a:schemeClr val="tx1"/>
+              </a:solidFill>
+              <a:latin typeface="+mj-lt"/>
+              <a:ea typeface="+mj-ea"/>
+              <a:cs typeface="+mj-cs"/>
+            </a:endParaRPr>
+          </a:p>
+        </p:txBody>
+      </p:sp>
+      <p:sp>
+        <p:nvSpPr>
+          <p:cNvPr id="20" name="Freeform: Shape 19">
+            <a:extLst>
+              <a:ext uri="{FF2B5EF4-FFF2-40B4-BE49-F238E27FC236}">
+                <a16:creationId xmlns:a16="http://schemas.microsoft.com/office/drawing/2014/main" id="{5EB73228-F09B-409F-9EC1-7E853C4F5B43}"/>
+              </a:ext>
+              <a:ext uri="{C183D7F6-B498-43B3-948B-1728B52AA6E4}">
+                <adec:decorative xmlns:adec="http://schemas.microsoft.com/office/drawing/2017/decorative" val="1"/>
+              </a:ext>
+            </a:extLst>
+          </p:cNvPr>
+          <p:cNvSpPr>
+            <a:spLocks noGrp="1" noRot="1" noChangeAspect="1" noMove="1" noResize="1" noEditPoints="1" noAdjustHandles="1" noChangeArrowheads="1" noChangeShapeType="1" noTextEdit="1"/>
+          </p:cNvSpPr>
+          <p:nvPr>
+            <p:extLst>
+              <p:ext uri="{386F3935-93C4-4BCD-93E2-E3B085C9AB24}">
+                <p16:designElem xmlns:p16="http://schemas.microsoft.com/office/powerpoint/2015/main" val="1"/>
+              </p:ext>
+            </p:extLst>
+          </p:nvPr>
+        </p:nvSpPr>
+        <p:spPr>
+          <a:xfrm>
+            <a:off x="11163680" y="10585018"/>
+            <a:ext cx="13220320" cy="3130982"/>
+          </a:xfrm>
+          <a:custGeom>
+            <a:avLst/>
+            <a:gdLst>
+              <a:gd name="connsiteX0" fmla="*/ 1186806 w 6610160"/>
+              <a:gd name="connsiteY0" fmla="*/ 0 h 1565491"/>
+              <a:gd name="connsiteX1" fmla="*/ 1692132 w 6610160"/>
+              <a:gd name="connsiteY1" fmla="*/ 0 h 1565491"/>
+              <a:gd name="connsiteX2" fmla="*/ 6104834 w 6610160"/>
+              <a:gd name="connsiteY2" fmla="*/ 0 h 1565491"/>
+              <a:gd name="connsiteX3" fmla="*/ 6610160 w 6610160"/>
+              <a:gd name="connsiteY3" fmla="*/ 0 h 1565491"/>
+              <a:gd name="connsiteX4" fmla="*/ 6610160 w 6610160"/>
+              <a:gd name="connsiteY4" fmla="*/ 1565491 h 1565491"/>
+              <a:gd name="connsiteX5" fmla="*/ 0 w 6610160"/>
+              <a:gd name="connsiteY5" fmla="*/ 1565491 h 1565491"/>
+              <a:gd name="connsiteX6" fmla="*/ 724290 w 6610160"/>
+              <a:gd name="connsiteY6" fmla="*/ 1591 h 1565491"/>
+              <a:gd name="connsiteX7" fmla="*/ 1186070 w 6610160"/>
+              <a:gd name="connsiteY7" fmla="*/ 1591 h 1565491"/>
+            </a:gdLst>
+            <a:ahLst/>
+            <a:cxnLst>
+              <a:cxn ang="0">
+                <a:pos x="connsiteX0" y="connsiteY0"/>
+              </a:cxn>
+              <a:cxn ang="0">
+                <a:pos x="connsiteX1" y="connsiteY1"/>
+              </a:cxn>
+              <a:cxn ang="0">
+                <a:pos x="connsiteX2" y="connsiteY2"/>
+              </a:cxn>
+              <a:cxn ang="0">
+                <a:pos x="connsiteX3" y="connsiteY3"/>
+              </a:cxn>
+              <a:cxn ang="0">
+                <a:pos x="connsiteX4" y="connsiteY4"/>
+              </a:cxn>
+              <a:cxn ang="0">
+                <a:pos x="connsiteX5" y="connsiteY5"/>
+              </a:cxn>
+              <a:cxn ang="0">
+                <a:pos x="connsiteX6" y="connsiteY6"/>
+              </a:cxn>
+              <a:cxn ang="0">
+                <a:pos x="connsiteX7" y="connsiteY7"/>
+              </a:cxn>
+            </a:cxnLst>
+            <a:rect l="l" t="t" r="r" b="b"/>
+            <a:pathLst>
+              <a:path w="6610160" h="1565491">
+                <a:moveTo>
+                  <a:pt x="1186806" y="0"/>
+                </a:moveTo>
+                <a:lnTo>
+                  <a:pt x="1692132" y="0"/>
+                </a:lnTo>
+                <a:lnTo>
+                  <a:pt x="6104834" y="0"/>
+                </a:lnTo>
+                <a:lnTo>
+                  <a:pt x="6610160" y="0"/>
+                </a:lnTo>
+                <a:lnTo>
+                  <a:pt x="6610160" y="1565491"/>
+                </a:lnTo>
+                <a:lnTo>
+                  <a:pt x="0" y="1565491"/>
+                </a:lnTo>
+                <a:lnTo>
+                  <a:pt x="724290" y="1591"/>
+                </a:lnTo>
+                <a:lnTo>
+                  <a:pt x="1186070" y="1591"/>
+                </a:lnTo>
+                <a:close/>
+              </a:path>
+            </a:pathLst>
+          </a:custGeom>
+          <a:solidFill>
+            <a:srgbClr val="262626"/>
+          </a:solidFill>
+          <a:ln>
+            <a:noFill/>
+          </a:ln>
+        </p:spPr>
+        <p:style>
+          <a:lnRef idx="2">
+            <a:schemeClr val="accent1">
+              <a:shade val="50000"/>
+            </a:schemeClr>
+          </a:lnRef>
+          <a:fillRef idx="1">
+            <a:schemeClr val="accent1"/>
+          </a:fillRef>
+          <a:effectRef idx="0">
+            <a:schemeClr val="accent1"/>
+          </a:effectRef>
+          <a:fontRef idx="minor">
+            <a:schemeClr val="lt1"/>
+          </a:fontRef>
+        </p:style>
+        <p:txBody>
+          <a:bodyPr wrap="square" rtlCol="0" anchor="ctr">
+            <a:noAutofit/>
+          </a:bodyPr>
+          <a:lstStyle/>
+          <a:p>
+            <a:pPr marL="0" marR="0" lvl="0" indent="0" algn="ctr" defTabSz="825175" rtl="0" eaLnBrk="1" fontAlgn="auto" latinLnBrk="0" hangingPunct="0">
+              <a:lnSpc>
+                <a:spcPct val="100000"/>
+              </a:lnSpc>
+              <a:spcBef>
+                <a:spcPts val="0"/>
+              </a:spcBef>
+              <a:spcAft>
+                <a:spcPts val="0"/>
+              </a:spcAft>
+              <a:buClrTx/>
+              <a:buSzTx/>
+              <a:buFontTx/>
+              <a:buNone/>
+              <a:tabLst/>
+              <a:defRPr/>
+            </a:pPr>
+            <a:endParaRPr kumimoji="0" lang="en-US" sz="5000" b="0" i="0" u="none" strike="noStrike" kern="0" cap="none" spc="0" normalizeH="0" baseline="0" noProof="0">
+              <a:ln>
+                <a:noFill/>
+              </a:ln>
+              <a:solidFill>
+                <a:prstClr val="white"/>
+              </a:solidFill>
+              <a:effectLst/>
+              <a:uLnTx/>
+              <a:uFillTx/>
+              <a:latin typeface="Calibri"/>
+              <a:ea typeface="+mn-ea"/>
+              <a:cs typeface="+mn-cs"/>
+              <a:sym typeface="Helvetica Light"/>
+            </a:endParaRPr>
+          </a:p>
+        </p:txBody>
+      </p:sp>
+      <p:sp>
+        <p:nvSpPr>
+          <p:cNvPr id="22" name="Freeform: Shape 21">
+            <a:extLst>
+              <a:ext uri="{FF2B5EF4-FFF2-40B4-BE49-F238E27FC236}">
+                <a16:creationId xmlns:a16="http://schemas.microsoft.com/office/drawing/2014/main" id="{3150A4AE-7BE7-480D-BD8C-3951E6479910}"/>
+              </a:ext>
+              <a:ext uri="{C183D7F6-B498-43B3-948B-1728B52AA6E4}">
+                <adec:decorative xmlns:adec="http://schemas.microsoft.com/office/drawing/2017/decorative" val="1"/>
+              </a:ext>
+            </a:extLst>
+          </p:cNvPr>
+          <p:cNvSpPr>
+            <a:spLocks noGrp="1" noRot="1" noChangeAspect="1" noMove="1" noResize="1" noEditPoints="1" noAdjustHandles="1" noChangeArrowheads="1" noChangeShapeType="1" noTextEdit="1"/>
+          </p:cNvSpPr>
+          <p:nvPr>
+            <p:extLst>
+              <p:ext uri="{386F3935-93C4-4BCD-93E2-E3B085C9AB24}">
+                <p16:designElem xmlns:p16="http://schemas.microsoft.com/office/powerpoint/2015/main" val="1"/>
+              </p:ext>
+            </p:extLst>
+          </p:nvPr>
+        </p:nvSpPr>
+        <p:spPr>
+          <a:xfrm>
+            <a:off x="0" y="10585020"/>
+            <a:ext cx="12288740" cy="3130982"/>
+          </a:xfrm>
+          <a:custGeom>
+            <a:avLst/>
+            <a:gdLst>
+              <a:gd name="connsiteX0" fmla="*/ 0 w 6144370"/>
+              <a:gd name="connsiteY0" fmla="*/ 0 h 1565491"/>
+              <a:gd name="connsiteX1" fmla="*/ 6144370 w 6144370"/>
+              <a:gd name="connsiteY1" fmla="*/ 0 h 1565491"/>
+              <a:gd name="connsiteX2" fmla="*/ 5419344 w 6144370"/>
+              <a:gd name="connsiteY2" fmla="*/ 1565491 h 1565491"/>
+              <a:gd name="connsiteX3" fmla="*/ 0 w 6144370"/>
+              <a:gd name="connsiteY3" fmla="*/ 1565491 h 1565491"/>
+            </a:gdLst>
+            <a:ahLst/>
+            <a:cxnLst>
+              <a:cxn ang="0">
+                <a:pos x="connsiteX0" y="connsiteY0"/>
+              </a:cxn>
+              <a:cxn ang="0">
+                <a:pos x="connsiteX1" y="connsiteY1"/>
+              </a:cxn>
+              <a:cxn ang="0">
+                <a:pos x="connsiteX2" y="connsiteY2"/>
+              </a:cxn>
+              <a:cxn ang="0">
+                <a:pos x="connsiteX3" y="connsiteY3"/>
+              </a:cxn>
+            </a:cxnLst>
+            <a:rect l="l" t="t" r="r" b="b"/>
+            <a:pathLst>
+              <a:path w="6144370" h="1565491">
+                <a:moveTo>
+                  <a:pt x="0" y="0"/>
+                </a:moveTo>
+                <a:lnTo>
+                  <a:pt x="6144370" y="0"/>
+                </a:lnTo>
+                <a:lnTo>
+                  <a:pt x="5419344" y="1565491"/>
+                </a:lnTo>
+                <a:lnTo>
+                  <a:pt x="0" y="1565491"/>
+                </a:lnTo>
+                <a:close/>
+              </a:path>
+            </a:pathLst>
+          </a:custGeom>
+          <a:solidFill>
+            <a:srgbClr val="B4B4B4">
+              <a:alpha val="50000"/>
+            </a:srgbClr>
+          </a:solidFill>
+          <a:ln>
+            <a:noFill/>
+          </a:ln>
+        </p:spPr>
+        <p:style>
+          <a:lnRef idx="2">
+            <a:schemeClr val="accent1">
+              <a:shade val="50000"/>
+            </a:schemeClr>
+          </a:lnRef>
+          <a:fillRef idx="1">
+            <a:schemeClr val="accent1"/>
+          </a:fillRef>
+          <a:effectRef idx="0">
+            <a:schemeClr val="accent1"/>
+          </a:effectRef>
+          <a:fontRef idx="minor">
+            <a:schemeClr val="lt1"/>
+          </a:fontRef>
+        </p:style>
+        <p:txBody>
+          <a:bodyPr wrap="square" rtlCol="0" anchor="ctr">
+            <a:noAutofit/>
+          </a:bodyPr>
+          <a:lstStyle/>
+          <a:p>
+            <a:pPr marL="0" marR="0" lvl="0" indent="0" algn="ctr" defTabSz="825175" rtl="0" eaLnBrk="1" fontAlgn="auto" latinLnBrk="0" hangingPunct="0">
+              <a:lnSpc>
+                <a:spcPct val="100000"/>
+              </a:lnSpc>
+              <a:spcBef>
+                <a:spcPts val="0"/>
+              </a:spcBef>
+              <a:spcAft>
+                <a:spcPts val="0"/>
+              </a:spcAft>
+              <a:buClrTx/>
+              <a:buSzTx/>
+              <a:buFontTx/>
+              <a:buNone/>
+              <a:tabLst/>
+              <a:defRPr/>
+            </a:pPr>
+            <a:endParaRPr kumimoji="0" lang="en-US" sz="5000" b="0" i="0" u="none" strike="noStrike" kern="0" cap="none" spc="0" normalizeH="0" baseline="0" noProof="0">
+              <a:ln>
+                <a:noFill/>
+              </a:ln>
+              <a:solidFill>
+                <a:prstClr val="white"/>
+              </a:solidFill>
+              <a:effectLst/>
+              <a:uLnTx/>
+              <a:uFillTx/>
+              <a:latin typeface="Calibri"/>
+              <a:ea typeface="+mn-ea"/>
+              <a:cs typeface="+mn-cs"/>
+              <a:sym typeface="Helvetica Light"/>
+            </a:endParaRPr>
+          </a:p>
+        </p:txBody>
+      </p:sp>
+    </p:spTree>
+    <p:extLst>
+      <p:ext uri="{BB962C8B-B14F-4D97-AF65-F5344CB8AC3E}">
+        <p14:creationId xmlns:p14="http://schemas.microsoft.com/office/powerpoint/2010/main" val="3759581646"/>
+      </p:ext>
+    </p:extLst>
+  </p:cSld>
+  <p:clrMapOvr>
+    <a:masterClrMapping/>
+  </p:clrMapOvr>
+  <p:timing>
+    <p:tnLst>
+      <p:par>
+        <p:cTn id="1" dur="indefinite" restart="never" nodeType="tmRoot">
+          <p:childTnLst>
+            <p:seq concurrent="1" nextAc="seek">
+              <p:cTn id="2" dur="indefinite" nodeType="mainSeq">
+                <p:childTnLst>
+                  <p:par>
+                    <p:cTn id="3" fill="hold">
+                      <p:stCondLst>
+                        <p:cond delay="indefinite"/>
+                        <p:cond evt="onBegin" delay="0">
+                          <p:tn val="2"/>
+                        </p:cond>
+                      </p:stCondLst>
+                      <p:childTnLst>
+                        <p:par>
+                          <p:cTn id="4" fill="hold">
+                            <p:stCondLst>
+                              <p:cond delay="0"/>
+                            </p:stCondLst>
+                            <p:childTnLst>
+                              <p:par>
+                                <p:cTn id="5" presetID="10" presetClass="entr" presetSubtype="0" fill="hold" grpId="0" nodeType="withEffect">
+                                  <p:stCondLst>
+                                    <p:cond delay="1000"/>
+                                  </p:stCondLst>
+                                  <p:iterate>
+                                    <p:tmPct val="10000"/>
+                                  </p:iterate>
+                                  <p:childTnLst>
+                                    <p:set>
+                                      <p:cBhvr>
+                                        <p:cTn id="6" dur="1" fill="hold">
+                                          <p:stCondLst>
+                                            <p:cond delay="0"/>
+                                          </p:stCondLst>
+                                        </p:cTn>
+                                        <p:tgtEl>
+                                          <p:spTgt spid="6"/>
+                                        </p:tgtEl>
+                                        <p:attrNameLst>
+                                          <p:attrName>style.visibility</p:attrName>
+                                        </p:attrNameLst>
+                                      </p:cBhvr>
+                                      <p:to>
+                                        <p:strVal val="visible"/>
+                                      </p:to>
+                                    </p:set>
+                                    <p:animEffect transition="in" filter="fade">
+                                      <p:cBhvr>
+                                        <p:cTn id="7" dur="700"/>
+                                        <p:tgtEl>
+                                          <p:spTgt spid="6"/>
+                                        </p:tgtEl>
+                                      </p:cBhvr>
+                                    </p:animEffect>
+                                  </p:childTnLst>
+                                </p:cTn>
+                              </p:par>
+                            </p:childTnLst>
+                          </p:cTn>
+                        </p:par>
+                      </p:childTnLst>
+                    </p:cTn>
+                  </p:par>
+                </p:childTnLst>
+              </p:cTn>
+              <p:prevCondLst>
+                <p:cond evt="onPrev" delay="0">
+                  <p:tgtEl>
+                    <p:sldTgt/>
+                  </p:tgtEl>
+                </p:cond>
+              </p:prevCondLst>
+              <p:nextCondLst>
+                <p:cond evt="onNext" delay="0">
+                  <p:tgtEl>
+                    <p:sldTgt/>
+                  </p:tgtEl>
+                </p:cond>
+              </p:nextCondLst>
+            </p:seq>
+          </p:childTnLst>
+        </p:cTn>
+      </p:par>
+    </p:tnLst>
+    <p:bldLst>
+      <p:bldP spid="6" grpId="0"/>
+    </p:bldLst>
+  </p:timing>
+</p:sld>
+</file>
+
+<file path=ppt/slides/slide5.xml><?xml version="1.0" encoding="utf-8"?>
 <p:sld xmlns:a="http://schemas.openxmlformats.org/drawingml/2006/main" xmlns:r="http://schemas.openxmlformats.org/officeDocument/2006/relationships" xmlns:p="http://schemas.openxmlformats.org/presentationml/2006/main">
   <p:cSld>
     <p:bg>
@@ -12323,7 +15576,7 @@
                 <a:ea typeface="+mj-ea"/>
                 <a:cs typeface="+mj-cs"/>
               </a:rPr>
-              <a:t>Struggles in the first Client-Server Project</a:t>
+              <a:t>Challenges in the first Client-Server Project</a:t>
             </a:r>
             <a:endParaRPr lang="en-US" sz="6000" dirty="0"/>
           </a:p>
@@ -12342,7 +15595,7 @@
 </p:sld>
 </file>
 
-<file path=ppt/slides/slide5.xml><?xml version="1.0" encoding="utf-8"?>
+<file path=ppt/slides/slide6.xml><?xml version="1.0" encoding="utf-8"?>
 <p:sld xmlns:a="http://schemas.openxmlformats.org/drawingml/2006/main" xmlns:r="http://schemas.openxmlformats.org/officeDocument/2006/relationships" xmlns:p="http://schemas.openxmlformats.org/presentationml/2006/main">
   <p:cSld>
     <p:bg>
@@ -12994,7 +16247,7 @@
 </p:sld>
 </file>
 
-<file path=ppt/slides/slide6.xml><?xml version="1.0" encoding="utf-8"?>
+<file path=ppt/slides/slide7.xml><?xml version="1.0" encoding="utf-8"?>
 <p:sld xmlns:a="http://schemas.openxmlformats.org/drawingml/2006/main" xmlns:r="http://schemas.openxmlformats.org/officeDocument/2006/relationships" xmlns:p="http://schemas.openxmlformats.org/presentationml/2006/main">
   <p:cSld>
     <p:bg>
@@ -14586,7 +17839,7 @@
 </p:sld>
 </file>
 
-<file path=ppt/slides/slide7.xml><?xml version="1.0" encoding="utf-8"?>
+<file path=ppt/slides/slide8.xml><?xml version="1.0" encoding="utf-8"?>
 <p:sld xmlns:a="http://schemas.openxmlformats.org/drawingml/2006/main" xmlns:r="http://schemas.openxmlformats.org/officeDocument/2006/relationships" xmlns:p="http://schemas.openxmlformats.org/presentationml/2006/main">
   <p:cSld>
     <p:bg>
@@ -16055,7 +19308,7 @@
 </p:sld>
 </file>
 
-<file path=ppt/slides/slide8.xml><?xml version="1.0" encoding="utf-8"?>
+<file path=ppt/slides/slide9.xml><?xml version="1.0" encoding="utf-8"?>
 <p:sld xmlns:a="http://schemas.openxmlformats.org/drawingml/2006/main" xmlns:r="http://schemas.openxmlformats.org/officeDocument/2006/relationships" xmlns:p="http://schemas.openxmlformats.org/presentationml/2006/main">
   <p:cSld>
     <p:bg>
@@ -16627,1159 +19880,6 @@
     <p:extLst>
       <p:ext uri="{BB962C8B-B14F-4D97-AF65-F5344CB8AC3E}">
         <p14:creationId xmlns:p14="http://schemas.microsoft.com/office/powerpoint/2010/main" val="553149760"/>
-      </p:ext>
-    </p:extLst>
-  </p:cSld>
-  <p:clrMapOvr>
-    <a:masterClrMapping/>
-  </p:clrMapOvr>
-</p:sld>
-</file>
-
-<file path=ppt/slides/slide9.xml><?xml version="1.0" encoding="utf-8"?>
-<p:sld xmlns:a="http://schemas.openxmlformats.org/drawingml/2006/main" xmlns:r="http://schemas.openxmlformats.org/officeDocument/2006/relationships" xmlns:p="http://schemas.openxmlformats.org/presentationml/2006/main">
-  <p:cSld>
-    <p:bg>
-      <p:bgPr>
-        <a:solidFill>
-          <a:schemeClr val="bg1"/>
-        </a:solidFill>
-        <a:effectLst/>
-      </p:bgPr>
-    </p:bg>
-    <p:spTree>
-      <p:nvGrpSpPr>
-        <p:cNvPr id="1" name=""/>
-        <p:cNvGrpSpPr/>
-        <p:nvPr/>
-      </p:nvGrpSpPr>
-      <p:grpSpPr>
-        <a:xfrm>
-          <a:off x="0" y="0"/>
-          <a:ext cx="0" cy="0"/>
-          <a:chOff x="0" y="0"/>
-          <a:chExt cx="0" cy="0"/>
-        </a:xfrm>
-      </p:grpSpPr>
-      <p:sp useBgFill="1">
-        <p:nvSpPr>
-          <p:cNvPr id="30" name="Rectangle 29">
-            <a:extLst>
-              <a:ext uri="{FF2B5EF4-FFF2-40B4-BE49-F238E27FC236}">
-                <a16:creationId xmlns:a16="http://schemas.microsoft.com/office/drawing/2014/main" id="{38257DC7-C8AB-454B-9095-B5BE2C910D8B}"/>
-              </a:ext>
-              <a:ext uri="{C183D7F6-B498-43B3-948B-1728B52AA6E4}">
-                <adec:decorative xmlns:adec="http://schemas.microsoft.com/office/drawing/2017/decorative" val="1"/>
-              </a:ext>
-            </a:extLst>
-          </p:cNvPr>
-          <p:cNvSpPr>
-            <a:spLocks noGrp="1" noRot="1" noChangeAspect="1" noMove="1" noResize="1" noEditPoints="1" noAdjustHandles="1" noChangeArrowheads="1" noChangeShapeType="1" noTextEdit="1"/>
-          </p:cNvSpPr>
-          <p:nvPr>
-            <p:extLst>
-              <p:ext uri="{386F3935-93C4-4BCD-93E2-E3B085C9AB24}">
-                <p16:designElem xmlns:p16="http://schemas.microsoft.com/office/powerpoint/2015/main" val="1"/>
-              </p:ext>
-            </p:extLst>
-          </p:nvPr>
-        </p:nvSpPr>
-        <p:spPr>
-          <a:xfrm>
-            <a:off x="-4" y="0"/>
-            <a:ext cx="24384010" cy="13716000"/>
-          </a:xfrm>
-          <a:prstGeom prst="rect">
-            <a:avLst/>
-          </a:prstGeom>
-          <a:ln>
-            <a:noFill/>
-          </a:ln>
-        </p:spPr>
-        <p:style>
-          <a:lnRef idx="2">
-            <a:schemeClr val="accent1">
-              <a:shade val="50000"/>
-            </a:schemeClr>
-          </a:lnRef>
-          <a:fillRef idx="1">
-            <a:schemeClr val="accent1"/>
-          </a:fillRef>
-          <a:effectRef idx="0">
-            <a:schemeClr val="accent1"/>
-          </a:effectRef>
-          <a:fontRef idx="minor">
-            <a:schemeClr val="lt1"/>
-          </a:fontRef>
-        </p:style>
-        <p:txBody>
-          <a:bodyPr rtlCol="0" anchor="ctr"/>
-          <a:lstStyle/>
-          <a:p>
-            <a:pPr marL="0" marR="0" lvl="0" indent="0" algn="ctr" defTabSz="825175" rtl="0" eaLnBrk="1" fontAlgn="auto" latinLnBrk="0" hangingPunct="0">
-              <a:lnSpc>
-                <a:spcPct val="100000"/>
-              </a:lnSpc>
-              <a:spcBef>
-                <a:spcPts val="0"/>
-              </a:spcBef>
-              <a:spcAft>
-                <a:spcPts val="0"/>
-              </a:spcAft>
-              <a:buClrTx/>
-              <a:buSzTx/>
-              <a:buFontTx/>
-              <a:buNone/>
-              <a:tabLst/>
-              <a:defRPr/>
-            </a:pPr>
-            <a:endParaRPr kumimoji="0" lang="en-US" sz="5000" b="0" i="0" u="none" strike="noStrike" kern="0" cap="none" spc="0" normalizeH="0" baseline="0" noProof="0">
-              <a:ln>
-                <a:noFill/>
-              </a:ln>
-              <a:solidFill>
-                <a:prstClr val="white"/>
-              </a:solidFill>
-              <a:effectLst/>
-              <a:uLnTx/>
-              <a:uFillTx/>
-              <a:latin typeface="Calibri"/>
-              <a:ea typeface="+mn-ea"/>
-              <a:cs typeface="+mn-cs"/>
-              <a:sym typeface="Helvetica Light"/>
-            </a:endParaRPr>
-          </a:p>
-        </p:txBody>
-      </p:sp>
-      <p:pic>
-        <p:nvPicPr>
-          <p:cNvPr id="3" name="Picture 2" descr="Chart, bubble chart&#10;&#10;Description automatically generated">
-            <a:extLst>
-              <a:ext uri="{FF2B5EF4-FFF2-40B4-BE49-F238E27FC236}">
-                <a16:creationId xmlns:a16="http://schemas.microsoft.com/office/drawing/2014/main" id="{5C116FA5-3FF7-4695-8D7B-D42992BAC524}"/>
-              </a:ext>
-            </a:extLst>
-          </p:cNvPr>
-          <p:cNvPicPr>
-            <a:picLocks noChangeAspect="1"/>
-          </p:cNvPicPr>
-          <p:nvPr/>
-        </p:nvPicPr>
-        <p:blipFill rotWithShape="1">
-          <a:blip r:embed="rId3">
-            <a:extLst>
-              <a:ext uri="{28A0092B-C50C-407E-A947-70E740481C1C}">
-                <a14:useLocalDpi xmlns:a14="http://schemas.microsoft.com/office/drawing/2010/main" val="0"/>
-              </a:ext>
-            </a:extLst>
-          </a:blip>
-          <a:srcRect l="28733" r="31333" b="-1"/>
-          <a:stretch/>
-        </p:blipFill>
-        <p:spPr>
-          <a:xfrm>
-            <a:off x="14963234" y="1507680"/>
-            <a:ext cx="9420766" cy="12208320"/>
-          </a:xfrm>
-          <a:custGeom>
-            <a:avLst/>
-            <a:gdLst/>
-            <a:ahLst/>
-            <a:cxnLst/>
-            <a:rect l="l" t="t" r="r" b="b"/>
-            <a:pathLst>
-              <a:path w="4710383" h="6104160">
-                <a:moveTo>
-                  <a:pt x="2581213" y="5529271"/>
-                </a:moveTo>
-                <a:cubicBezTo>
-                  <a:pt x="2581213" y="5529271"/>
-                  <a:pt x="2581213" y="5529271"/>
-                  <a:pt x="4212052" y="5529271"/>
-                </a:cubicBezTo>
-                <a:cubicBezTo>
-                  <a:pt x="4314199" y="5529271"/>
-                  <a:pt x="4412824" y="5585421"/>
-                  <a:pt x="4462137" y="5676664"/>
-                </a:cubicBezTo>
-                <a:cubicBezTo>
-                  <a:pt x="4462137" y="5676664"/>
-                  <a:pt x="4462137" y="5676664"/>
-                  <a:pt x="4661644" y="6020228"/>
-                </a:cubicBezTo>
-                <a:lnTo>
-                  <a:pt x="4710383" y="6104160"/>
-                </a:lnTo>
-                <a:lnTo>
-                  <a:pt x="2080429" y="6104160"/>
-                </a:lnTo>
-                <a:lnTo>
-                  <a:pt x="2184381" y="5924374"/>
-                </a:lnTo>
-                <a:cubicBezTo>
-                  <a:pt x="2229076" y="5847072"/>
-                  <a:pt x="2276752" y="5764617"/>
-                  <a:pt x="2327605" y="5676664"/>
-                </a:cubicBezTo>
-                <a:cubicBezTo>
-                  <a:pt x="2380440" y="5585421"/>
-                  <a:pt x="2475543" y="5529271"/>
-                  <a:pt x="2581213" y="5529271"/>
-                </a:cubicBezTo>
-                <a:close/>
-                <a:moveTo>
-                  <a:pt x="2563539" y="4022432"/>
-                </a:moveTo>
-                <a:cubicBezTo>
-                  <a:pt x="2563539" y="4022432"/>
-                  <a:pt x="2563539" y="4022432"/>
-                  <a:pt x="3208691" y="4022432"/>
-                </a:cubicBezTo>
-                <a:cubicBezTo>
-                  <a:pt x="3249101" y="4022432"/>
-                  <a:pt x="3288116" y="4044644"/>
-                  <a:pt x="3307624" y="4080740"/>
-                </a:cubicBezTo>
-                <a:cubicBezTo>
-                  <a:pt x="3307624" y="4080740"/>
-                  <a:pt x="3307624" y="4080740"/>
-                  <a:pt x="3630897" y="4637438"/>
-                </a:cubicBezTo>
-                <a:cubicBezTo>
-                  <a:pt x="3651799" y="4672145"/>
-                  <a:pt x="3651799" y="4716569"/>
-                  <a:pt x="3630897" y="4751276"/>
-                </a:cubicBezTo>
-                <a:cubicBezTo>
-                  <a:pt x="3630897" y="4751276"/>
-                  <a:pt x="3630897" y="4751276"/>
-                  <a:pt x="3307624" y="5307975"/>
-                </a:cubicBezTo>
-                <a:cubicBezTo>
-                  <a:pt x="3288116" y="5344069"/>
-                  <a:pt x="3249101" y="5366282"/>
-                  <a:pt x="3208691" y="5366282"/>
-                </a:cubicBezTo>
-                <a:cubicBezTo>
-                  <a:pt x="3208691" y="5366282"/>
-                  <a:pt x="3208691" y="5366282"/>
-                  <a:pt x="2563539" y="5366282"/>
-                </a:cubicBezTo>
-                <a:cubicBezTo>
-                  <a:pt x="2521736" y="5366282"/>
-                  <a:pt x="2484114" y="5344069"/>
-                  <a:pt x="2463212" y="5307975"/>
-                </a:cubicBezTo>
-                <a:cubicBezTo>
-                  <a:pt x="2463212" y="5307975"/>
-                  <a:pt x="2463212" y="5307975"/>
-                  <a:pt x="2141332" y="4751276"/>
-                </a:cubicBezTo>
-                <a:cubicBezTo>
-                  <a:pt x="2120431" y="4716569"/>
-                  <a:pt x="2120431" y="4672145"/>
-                  <a:pt x="2141332" y="4637438"/>
-                </a:cubicBezTo>
-                <a:cubicBezTo>
-                  <a:pt x="2141332" y="4637438"/>
-                  <a:pt x="2141332" y="4637438"/>
-                  <a:pt x="2463212" y="4080740"/>
-                </a:cubicBezTo>
-                <a:cubicBezTo>
-                  <a:pt x="2484114" y="4044644"/>
-                  <a:pt x="2521736" y="4022432"/>
-                  <a:pt x="2563539" y="4022432"/>
-                </a:cubicBezTo>
-                <a:close/>
-                <a:moveTo>
-                  <a:pt x="2493311" y="3428754"/>
-                </a:moveTo>
-                <a:cubicBezTo>
-                  <a:pt x="2493311" y="3428754"/>
-                  <a:pt x="2493311" y="3428754"/>
-                  <a:pt x="2726177" y="3428754"/>
-                </a:cubicBezTo>
-                <a:cubicBezTo>
-                  <a:pt x="2740762" y="3428754"/>
-                  <a:pt x="2754844" y="3436772"/>
-                  <a:pt x="2761886" y="3449800"/>
-                </a:cubicBezTo>
-                <a:cubicBezTo>
-                  <a:pt x="2761886" y="3449800"/>
-                  <a:pt x="2761886" y="3449800"/>
-                  <a:pt x="2878570" y="3650739"/>
-                </a:cubicBezTo>
-                <a:cubicBezTo>
-                  <a:pt x="2886115" y="3663266"/>
-                  <a:pt x="2886115" y="3679301"/>
-                  <a:pt x="2878570" y="3691828"/>
-                </a:cubicBezTo>
-                <a:cubicBezTo>
-                  <a:pt x="2878570" y="3691828"/>
-                  <a:pt x="2878570" y="3691828"/>
-                  <a:pt x="2761886" y="3892766"/>
-                </a:cubicBezTo>
-                <a:cubicBezTo>
-                  <a:pt x="2754844" y="3905795"/>
-                  <a:pt x="2740762" y="3913812"/>
-                  <a:pt x="2726177" y="3913812"/>
-                </a:cubicBezTo>
-                <a:cubicBezTo>
-                  <a:pt x="2726177" y="3913812"/>
-                  <a:pt x="2726177" y="3913812"/>
-                  <a:pt x="2493311" y="3913812"/>
-                </a:cubicBezTo>
-                <a:cubicBezTo>
-                  <a:pt x="2478223" y="3913812"/>
-                  <a:pt x="2464643" y="3905795"/>
-                  <a:pt x="2457098" y="3892766"/>
-                </a:cubicBezTo>
-                <a:cubicBezTo>
-                  <a:pt x="2457098" y="3892766"/>
-                  <a:pt x="2457098" y="3892766"/>
-                  <a:pt x="2340917" y="3691828"/>
-                </a:cubicBezTo>
-                <a:cubicBezTo>
-                  <a:pt x="2333373" y="3679301"/>
-                  <a:pt x="2333373" y="3663266"/>
-                  <a:pt x="2340917" y="3650739"/>
-                </a:cubicBezTo>
-                <a:cubicBezTo>
-                  <a:pt x="2340917" y="3650739"/>
-                  <a:pt x="2340917" y="3650739"/>
-                  <a:pt x="2457098" y="3449800"/>
-                </a:cubicBezTo>
-                <a:cubicBezTo>
-                  <a:pt x="2464643" y="3436772"/>
-                  <a:pt x="2478223" y="3428754"/>
-                  <a:pt x="2493311" y="3428754"/>
-                </a:cubicBezTo>
-                <a:close/>
-                <a:moveTo>
-                  <a:pt x="1733609" y="2705264"/>
-                </a:moveTo>
-                <a:cubicBezTo>
-                  <a:pt x="1733609" y="2705264"/>
-                  <a:pt x="1733609" y="2705264"/>
-                  <a:pt x="2174613" y="2705264"/>
-                </a:cubicBezTo>
-                <a:cubicBezTo>
-                  <a:pt x="2202236" y="2705264"/>
-                  <a:pt x="2228906" y="2720447"/>
-                  <a:pt x="2242241" y="2745121"/>
-                </a:cubicBezTo>
-                <a:cubicBezTo>
-                  <a:pt x="2242241" y="2745121"/>
-                  <a:pt x="2242241" y="2745121"/>
-                  <a:pt x="2463220" y="3125661"/>
-                </a:cubicBezTo>
-                <a:cubicBezTo>
-                  <a:pt x="2477507" y="3149385"/>
-                  <a:pt x="2477507" y="3179753"/>
-                  <a:pt x="2463220" y="3203478"/>
-                </a:cubicBezTo>
-                <a:cubicBezTo>
-                  <a:pt x="2463220" y="3203478"/>
-                  <a:pt x="2463220" y="3203478"/>
-                  <a:pt x="2242241" y="3584017"/>
-                </a:cubicBezTo>
-                <a:cubicBezTo>
-                  <a:pt x="2228906" y="3608691"/>
-                  <a:pt x="2202236" y="3623874"/>
-                  <a:pt x="2174613" y="3623874"/>
-                </a:cubicBezTo>
-                <a:cubicBezTo>
-                  <a:pt x="2174613" y="3623874"/>
-                  <a:pt x="2174613" y="3623874"/>
-                  <a:pt x="1733609" y="3623874"/>
-                </a:cubicBezTo>
-                <a:cubicBezTo>
-                  <a:pt x="1705034" y="3623874"/>
-                  <a:pt x="1679316" y="3608691"/>
-                  <a:pt x="1665029" y="3584017"/>
-                </a:cubicBezTo>
-                <a:cubicBezTo>
-                  <a:pt x="1665029" y="3584017"/>
-                  <a:pt x="1665029" y="3584017"/>
-                  <a:pt x="1445004" y="3203478"/>
-                </a:cubicBezTo>
-                <a:cubicBezTo>
-                  <a:pt x="1430715" y="3179753"/>
-                  <a:pt x="1430715" y="3149385"/>
-                  <a:pt x="1445004" y="3125661"/>
-                </a:cubicBezTo>
-                <a:cubicBezTo>
-                  <a:pt x="1445004" y="3125661"/>
-                  <a:pt x="1445004" y="3125661"/>
-                  <a:pt x="1665029" y="2745121"/>
-                </a:cubicBezTo>
-                <a:cubicBezTo>
-                  <a:pt x="1679316" y="2720447"/>
-                  <a:pt x="1705034" y="2705264"/>
-                  <a:pt x="1733609" y="2705264"/>
-                </a:cubicBezTo>
-                <a:close/>
-                <a:moveTo>
-                  <a:pt x="3163744" y="1328911"/>
-                </a:moveTo>
-                <a:cubicBezTo>
-                  <a:pt x="3163744" y="1328911"/>
-                  <a:pt x="3163744" y="1328911"/>
-                  <a:pt x="3931865" y="1328911"/>
-                </a:cubicBezTo>
-                <a:cubicBezTo>
-                  <a:pt x="3979976" y="1328911"/>
-                  <a:pt x="4026428" y="1355357"/>
-                  <a:pt x="4049655" y="1398332"/>
-                </a:cubicBezTo>
-                <a:cubicBezTo>
-                  <a:pt x="4049655" y="1398332"/>
-                  <a:pt x="4049655" y="1398332"/>
-                  <a:pt x="4434545" y="2061138"/>
-                </a:cubicBezTo>
-                <a:cubicBezTo>
-                  <a:pt x="4459430" y="2102461"/>
-                  <a:pt x="4459430" y="2155353"/>
-                  <a:pt x="4434545" y="2196675"/>
-                </a:cubicBezTo>
-                <a:cubicBezTo>
-                  <a:pt x="4434545" y="2196675"/>
-                  <a:pt x="4434545" y="2196675"/>
-                  <a:pt x="4049655" y="2859481"/>
-                </a:cubicBezTo>
-                <a:cubicBezTo>
-                  <a:pt x="4026428" y="2902456"/>
-                  <a:pt x="3979976" y="2928902"/>
-                  <a:pt x="3931865" y="2928902"/>
-                </a:cubicBezTo>
-                <a:cubicBezTo>
-                  <a:pt x="3931865" y="2928902"/>
-                  <a:pt x="3931865" y="2928902"/>
-                  <a:pt x="3163744" y="2928902"/>
-                </a:cubicBezTo>
-                <a:cubicBezTo>
-                  <a:pt x="3113973" y="2928902"/>
-                  <a:pt x="3069180" y="2902456"/>
-                  <a:pt x="3044295" y="2859481"/>
-                </a:cubicBezTo>
-                <a:cubicBezTo>
-                  <a:pt x="3044295" y="2859481"/>
-                  <a:pt x="3044295" y="2859481"/>
-                  <a:pt x="2661065" y="2196675"/>
-                </a:cubicBezTo>
-                <a:cubicBezTo>
-                  <a:pt x="2636179" y="2155353"/>
-                  <a:pt x="2636179" y="2102461"/>
-                  <a:pt x="2661065" y="2061138"/>
-                </a:cubicBezTo>
-                <a:cubicBezTo>
-                  <a:pt x="2661065" y="2061138"/>
-                  <a:pt x="2661065" y="2061138"/>
-                  <a:pt x="3044295" y="1398332"/>
-                </a:cubicBezTo>
-                <a:cubicBezTo>
-                  <a:pt x="3069180" y="1355357"/>
-                  <a:pt x="3113973" y="1328911"/>
-                  <a:pt x="3163744" y="1328911"/>
-                </a:cubicBezTo>
-                <a:close/>
-                <a:moveTo>
-                  <a:pt x="841327" y="0"/>
-                </a:moveTo>
-                <a:cubicBezTo>
-                  <a:pt x="841327" y="0"/>
-                  <a:pt x="841327" y="0"/>
-                  <a:pt x="2080896" y="0"/>
-                </a:cubicBezTo>
-                <a:cubicBezTo>
-                  <a:pt x="2158536" y="0"/>
-                  <a:pt x="2233499" y="42678"/>
-                  <a:pt x="2270981" y="112029"/>
-                </a:cubicBezTo>
-                <a:cubicBezTo>
-                  <a:pt x="2270981" y="112029"/>
-                  <a:pt x="2270981" y="112029"/>
-                  <a:pt x="2892105" y="1181644"/>
-                </a:cubicBezTo>
-                <a:cubicBezTo>
-                  <a:pt x="2932263" y="1248329"/>
-                  <a:pt x="2932263" y="1333683"/>
-                  <a:pt x="2892105" y="1400367"/>
-                </a:cubicBezTo>
-                <a:cubicBezTo>
-                  <a:pt x="2892105" y="1400367"/>
-                  <a:pt x="2892105" y="1400367"/>
-                  <a:pt x="2270981" y="2469983"/>
-                </a:cubicBezTo>
-                <a:cubicBezTo>
-                  <a:pt x="2233499" y="2539334"/>
-                  <a:pt x="2158536" y="2582012"/>
-                  <a:pt x="2080896" y="2582012"/>
-                </a:cubicBezTo>
-                <a:cubicBezTo>
-                  <a:pt x="2080896" y="2582012"/>
-                  <a:pt x="2080896" y="2582012"/>
-                  <a:pt x="841327" y="2582012"/>
-                </a:cubicBezTo>
-                <a:cubicBezTo>
-                  <a:pt x="761010" y="2582012"/>
-                  <a:pt x="688724" y="2539334"/>
-                  <a:pt x="648565" y="2469983"/>
-                </a:cubicBezTo>
-                <a:cubicBezTo>
-                  <a:pt x="648565" y="2469983"/>
-                  <a:pt x="648565" y="2469983"/>
-                  <a:pt x="30120" y="1400367"/>
-                </a:cubicBezTo>
-                <a:cubicBezTo>
-                  <a:pt x="-10039" y="1333683"/>
-                  <a:pt x="-10039" y="1248329"/>
-                  <a:pt x="30120" y="1181644"/>
-                </a:cubicBezTo>
-                <a:cubicBezTo>
-                  <a:pt x="30120" y="1181644"/>
-                  <a:pt x="30120" y="1181644"/>
-                  <a:pt x="648565" y="112029"/>
-                </a:cubicBezTo>
-                <a:cubicBezTo>
-                  <a:pt x="688724" y="42678"/>
-                  <a:pt x="761010" y="0"/>
-                  <a:pt x="841327" y="0"/>
-                </a:cubicBezTo>
-                <a:close/>
-              </a:path>
-            </a:pathLst>
-          </a:custGeom>
-        </p:spPr>
-      </p:pic>
-      <p:sp>
-        <p:nvSpPr>
-          <p:cNvPr id="7" name="Title 6">
-            <a:extLst>
-              <a:ext uri="{FF2B5EF4-FFF2-40B4-BE49-F238E27FC236}">
-                <a16:creationId xmlns:a16="http://schemas.microsoft.com/office/drawing/2014/main" id="{8CE7791B-2975-4C35-98EB-8B19B282F523}"/>
-              </a:ext>
-            </a:extLst>
-          </p:cNvPr>
-          <p:cNvSpPr>
-            <a:spLocks noGrp="1"/>
-          </p:cNvSpPr>
-          <p:nvPr>
-            <p:ph type="title"/>
-          </p:nvPr>
-        </p:nvSpPr>
-        <p:spPr/>
-        <p:txBody>
-          <a:bodyPr>
-            <a:normAutofit/>
-          </a:bodyPr>
-          <a:lstStyle/>
-          <a:p>
-            <a:r>
-              <a:rPr lang="en-US" sz="6000" b="1" dirty="0">
-                <a:solidFill>
-                  <a:schemeClr val="tx1"/>
-                </a:solidFill>
-                <a:effectLst>
-                  <a:outerShdw blurRad="38100" dist="38100" dir="2700000" algn="tl">
-                    <a:srgbClr val="000000">
-                      <a:alpha val="43137"/>
-                    </a:srgbClr>
-                  </a:outerShdw>
-                </a:effectLst>
-                <a:latin typeface="+mj-lt"/>
-                <a:ea typeface="+mj-ea"/>
-                <a:cs typeface="+mj-cs"/>
-              </a:rPr>
-              <a:t>String Translation</a:t>
-            </a:r>
-            <a:endParaRPr lang="en-US" sz="6000" dirty="0"/>
-          </a:p>
-        </p:txBody>
-      </p:sp>
-      <p:pic>
-        <p:nvPicPr>
-          <p:cNvPr id="4" name="Picture 3" descr="Graphical user interface, application&#10;&#10;Description automatically generated">
-            <a:extLst>
-              <a:ext uri="{FF2B5EF4-FFF2-40B4-BE49-F238E27FC236}">
-                <a16:creationId xmlns:a16="http://schemas.microsoft.com/office/drawing/2014/main" id="{A1690D3C-20C3-4846-8E28-8140AC4937D2}"/>
-              </a:ext>
-            </a:extLst>
-          </p:cNvPr>
-          <p:cNvPicPr>
-            <a:picLocks noChangeAspect="1"/>
-          </p:cNvPicPr>
-          <p:nvPr/>
-        </p:nvPicPr>
-        <p:blipFill>
-          <a:blip r:embed="rId4" cstate="print">
-            <a:extLst>
-              <a:ext uri="{28A0092B-C50C-407E-A947-70E740481C1C}">
-                <a14:useLocalDpi xmlns:a14="http://schemas.microsoft.com/office/drawing/2010/main" val="0"/>
-              </a:ext>
-            </a:extLst>
-          </a:blip>
-          <a:stretch>
-            <a:fillRect/>
-          </a:stretch>
-        </p:blipFill>
-        <p:spPr>
-          <a:xfrm>
-            <a:off x="65314" y="5565620"/>
-            <a:ext cx="15342599" cy="8150380"/>
-          </a:xfrm>
-          <a:prstGeom prst="rect">
-            <a:avLst/>
-          </a:prstGeom>
-        </p:spPr>
-      </p:pic>
-      <p:sp>
-        <p:nvSpPr>
-          <p:cNvPr id="5" name="Oval 4">
-            <a:extLst>
-              <a:ext uri="{FF2B5EF4-FFF2-40B4-BE49-F238E27FC236}">
-                <a16:creationId xmlns:a16="http://schemas.microsoft.com/office/drawing/2014/main" id="{7F04C021-2A99-4FE9-8D8F-BC7366BED46B}"/>
-              </a:ext>
-            </a:extLst>
-          </p:cNvPr>
-          <p:cNvSpPr/>
-          <p:nvPr/>
-        </p:nvSpPr>
-        <p:spPr>
-          <a:xfrm>
-            <a:off x="930728" y="6915150"/>
-            <a:ext cx="2326822" cy="228600"/>
-          </a:xfrm>
-          <a:prstGeom prst="ellipse">
-            <a:avLst/>
-          </a:prstGeom>
-          <a:noFill/>
-          <a:ln w="38100">
-            <a:solidFill>
-              <a:srgbClr val="C00000"/>
-            </a:solidFill>
-          </a:ln>
-        </p:spPr>
-        <p:style>
-          <a:lnRef idx="2">
-            <a:schemeClr val="accent2"/>
-          </a:lnRef>
-          <a:fillRef idx="1">
-            <a:schemeClr val="lt1"/>
-          </a:fillRef>
-          <a:effectRef idx="0">
-            <a:schemeClr val="accent2"/>
-          </a:effectRef>
-          <a:fontRef idx="minor">
-            <a:schemeClr val="dk1"/>
-          </a:fontRef>
-        </p:style>
-        <p:txBody>
-          <a:bodyPr rtlCol="0" anchor="ctr"/>
-          <a:lstStyle/>
-          <a:p>
-            <a:pPr algn="ctr"/>
-            <a:endParaRPr lang="en-US"/>
-          </a:p>
-        </p:txBody>
-      </p:sp>
-      <p:sp>
-        <p:nvSpPr>
-          <p:cNvPr id="8" name="Oval 7">
-            <a:extLst>
-              <a:ext uri="{FF2B5EF4-FFF2-40B4-BE49-F238E27FC236}">
-                <a16:creationId xmlns:a16="http://schemas.microsoft.com/office/drawing/2014/main" id="{64FA3919-9524-4474-94D4-3AC707C1CC60}"/>
-              </a:ext>
-            </a:extLst>
-          </p:cNvPr>
-          <p:cNvSpPr/>
-          <p:nvPr/>
-        </p:nvSpPr>
-        <p:spPr>
-          <a:xfrm>
-            <a:off x="930728" y="7537521"/>
-            <a:ext cx="2326822" cy="228600"/>
-          </a:xfrm>
-          <a:prstGeom prst="ellipse">
-            <a:avLst/>
-          </a:prstGeom>
-          <a:noFill/>
-          <a:ln w="38100">
-            <a:solidFill>
-              <a:srgbClr val="C00000"/>
-            </a:solidFill>
-          </a:ln>
-        </p:spPr>
-        <p:style>
-          <a:lnRef idx="2">
-            <a:schemeClr val="accent2"/>
-          </a:lnRef>
-          <a:fillRef idx="1">
-            <a:schemeClr val="lt1"/>
-          </a:fillRef>
-          <a:effectRef idx="0">
-            <a:schemeClr val="accent2"/>
-          </a:effectRef>
-          <a:fontRef idx="minor">
-            <a:schemeClr val="dk1"/>
-          </a:fontRef>
-        </p:style>
-        <p:txBody>
-          <a:bodyPr rtlCol="0" anchor="ctr"/>
-          <a:lstStyle/>
-          <a:p>
-            <a:pPr algn="ctr"/>
-            <a:endParaRPr lang="en-US"/>
-          </a:p>
-        </p:txBody>
-      </p:sp>
-      <p:sp>
-        <p:nvSpPr>
-          <p:cNvPr id="9" name="Oval 8">
-            <a:extLst>
-              <a:ext uri="{FF2B5EF4-FFF2-40B4-BE49-F238E27FC236}">
-                <a16:creationId xmlns:a16="http://schemas.microsoft.com/office/drawing/2014/main" id="{36AF0699-FEA5-4BA8-AC89-21F88FABE9C5}"/>
-              </a:ext>
-            </a:extLst>
-          </p:cNvPr>
-          <p:cNvSpPr/>
-          <p:nvPr/>
-        </p:nvSpPr>
-        <p:spPr>
-          <a:xfrm>
-            <a:off x="5304062" y="7559291"/>
-            <a:ext cx="2762251" cy="417215"/>
-          </a:xfrm>
-          <a:prstGeom prst="ellipse">
-            <a:avLst/>
-          </a:prstGeom>
-          <a:noFill/>
-          <a:ln w="38100">
-            <a:solidFill>
-              <a:srgbClr val="C00000"/>
-            </a:solidFill>
-          </a:ln>
-        </p:spPr>
-        <p:style>
-          <a:lnRef idx="2">
-            <a:schemeClr val="accent2"/>
-          </a:lnRef>
-          <a:fillRef idx="1">
-            <a:schemeClr val="lt1"/>
-          </a:fillRef>
-          <a:effectRef idx="0">
-            <a:schemeClr val="accent2"/>
-          </a:effectRef>
-          <a:fontRef idx="minor">
-            <a:schemeClr val="dk1"/>
-          </a:fontRef>
-        </p:style>
-        <p:txBody>
-          <a:bodyPr rtlCol="0" anchor="ctr"/>
-          <a:lstStyle/>
-          <a:p>
-            <a:pPr algn="ctr"/>
-            <a:endParaRPr lang="en-US"/>
-          </a:p>
-        </p:txBody>
-      </p:sp>
-      <p:sp>
-        <p:nvSpPr>
-          <p:cNvPr id="10" name="Oval 9">
-            <a:extLst>
-              <a:ext uri="{FF2B5EF4-FFF2-40B4-BE49-F238E27FC236}">
-                <a16:creationId xmlns:a16="http://schemas.microsoft.com/office/drawing/2014/main" id="{08FA1E1F-5911-4586-831C-FE2FD1ECFEBA}"/>
-              </a:ext>
-            </a:extLst>
-          </p:cNvPr>
-          <p:cNvSpPr/>
-          <p:nvPr/>
-        </p:nvSpPr>
-        <p:spPr>
-          <a:xfrm>
-            <a:off x="8735786" y="7515750"/>
-            <a:ext cx="3943350" cy="667585"/>
-          </a:xfrm>
-          <a:prstGeom prst="ellipse">
-            <a:avLst/>
-          </a:prstGeom>
-          <a:noFill/>
-          <a:ln w="38100">
-            <a:solidFill>
-              <a:srgbClr val="C00000"/>
-            </a:solidFill>
-          </a:ln>
-        </p:spPr>
-        <p:style>
-          <a:lnRef idx="2">
-            <a:schemeClr val="accent2"/>
-          </a:lnRef>
-          <a:fillRef idx="1">
-            <a:schemeClr val="lt1"/>
-          </a:fillRef>
-          <a:effectRef idx="0">
-            <a:schemeClr val="accent2"/>
-          </a:effectRef>
-          <a:fontRef idx="minor">
-            <a:schemeClr val="dk1"/>
-          </a:fontRef>
-        </p:style>
-        <p:txBody>
-          <a:bodyPr rtlCol="0" anchor="ctr"/>
-          <a:lstStyle/>
-          <a:p>
-            <a:pPr algn="ctr"/>
-            <a:endParaRPr lang="en-US"/>
-          </a:p>
-        </p:txBody>
-      </p:sp>
-      <p:sp>
-        <p:nvSpPr>
-          <p:cNvPr id="6" name="Speech Bubble: Rectangle with Corners Rounded 5">
-            <a:extLst>
-              <a:ext uri="{FF2B5EF4-FFF2-40B4-BE49-F238E27FC236}">
-                <a16:creationId xmlns:a16="http://schemas.microsoft.com/office/drawing/2014/main" id="{EFB0916B-2CF6-41D3-AACD-612396471B83}"/>
-              </a:ext>
-            </a:extLst>
-          </p:cNvPr>
-          <p:cNvSpPr/>
-          <p:nvPr/>
-        </p:nvSpPr>
-        <p:spPr>
-          <a:xfrm>
-            <a:off x="314325" y="2571749"/>
-            <a:ext cx="3559628" cy="2530929"/>
-          </a:xfrm>
-          <a:prstGeom prst="wedgeRoundRectCallout">
-            <a:avLst>
-              <a:gd name="adj1" fmla="val -12347"/>
-              <a:gd name="adj2" fmla="val 115403"/>
-              <a:gd name="adj3" fmla="val 16667"/>
-            </a:avLst>
-          </a:prstGeom>
-        </p:spPr>
-        <p:style>
-          <a:lnRef idx="2">
-            <a:schemeClr val="accent1">
-              <a:shade val="50000"/>
-            </a:schemeClr>
-          </a:lnRef>
-          <a:fillRef idx="1">
-            <a:schemeClr val="accent1"/>
-          </a:fillRef>
-          <a:effectRef idx="0">
-            <a:schemeClr val="accent1"/>
-          </a:effectRef>
-          <a:fontRef idx="minor">
-            <a:schemeClr val="lt1"/>
-          </a:fontRef>
-        </p:style>
-        <p:txBody>
-          <a:bodyPr rtlCol="0" anchor="ctr"/>
-          <a:lstStyle/>
-          <a:p>
-            <a:pPr algn="ctr"/>
-            <a:r>
-              <a:rPr lang="en-CA" sz="2800" dirty="0"/>
-              <a:t>Use translation resources in </a:t>
-            </a:r>
-            <a:r>
-              <a:rPr lang="en-CA" sz="2800" dirty="0">
-                <a:solidFill>
-                  <a:schemeClr val="bg1">
-                    <a:lumMod val="85000"/>
-                  </a:schemeClr>
-                </a:solidFill>
-              </a:rPr>
-              <a:t>XAML</a:t>
-            </a:r>
-            <a:endParaRPr lang="en-US" sz="2800" dirty="0">
-              <a:solidFill>
-                <a:schemeClr val="bg1">
-                  <a:lumMod val="85000"/>
-                </a:schemeClr>
-              </a:solidFill>
-            </a:endParaRPr>
-          </a:p>
-        </p:txBody>
-      </p:sp>
-      <p:sp>
-        <p:nvSpPr>
-          <p:cNvPr id="12" name="Speech Bubble: Rectangle with Corners Rounded 11">
-            <a:extLst>
-              <a:ext uri="{FF2B5EF4-FFF2-40B4-BE49-F238E27FC236}">
-                <a16:creationId xmlns:a16="http://schemas.microsoft.com/office/drawing/2014/main" id="{09F3B65E-BC46-4A20-B61E-28A0CE5062CD}"/>
-              </a:ext>
-            </a:extLst>
-          </p:cNvPr>
-          <p:cNvSpPr/>
-          <p:nvPr/>
-        </p:nvSpPr>
-        <p:spPr>
-          <a:xfrm>
-            <a:off x="4378237" y="2571748"/>
-            <a:ext cx="3559628" cy="2530929"/>
-          </a:xfrm>
-          <a:prstGeom prst="wedgeRoundRectCallout">
-            <a:avLst>
-              <a:gd name="adj1" fmla="val -8448"/>
-              <a:gd name="adj2" fmla="val 155080"/>
-              <a:gd name="adj3" fmla="val 16667"/>
-            </a:avLst>
-          </a:prstGeom>
-        </p:spPr>
-        <p:style>
-          <a:lnRef idx="2">
-            <a:schemeClr val="accent1">
-              <a:shade val="50000"/>
-            </a:schemeClr>
-          </a:lnRef>
-          <a:fillRef idx="1">
-            <a:schemeClr val="accent1"/>
-          </a:fillRef>
-          <a:effectRef idx="0">
-            <a:schemeClr val="accent1"/>
-          </a:effectRef>
-          <a:fontRef idx="minor">
-            <a:schemeClr val="lt1"/>
-          </a:fontRef>
-        </p:style>
-        <p:txBody>
-          <a:bodyPr rtlCol="0" anchor="ctr"/>
-          <a:lstStyle/>
-          <a:p>
-            <a:pPr algn="ctr"/>
-            <a:r>
-              <a:rPr lang="en-CA" sz="2800" dirty="0"/>
-              <a:t>Use translation resources in </a:t>
-            </a:r>
-            <a:r>
-              <a:rPr lang="en-CA" sz="2800" dirty="0" err="1">
-                <a:solidFill>
-                  <a:schemeClr val="bg1">
-                    <a:lumMod val="85000"/>
-                  </a:schemeClr>
-                </a:solidFill>
-              </a:rPr>
-              <a:t>c#</a:t>
-            </a:r>
-            <a:r>
-              <a:rPr lang="en-CA" sz="2800" dirty="0">
-                <a:solidFill>
-                  <a:schemeClr val="bg1">
-                    <a:lumMod val="85000"/>
-                  </a:schemeClr>
-                </a:solidFill>
-              </a:rPr>
-              <a:t> code</a:t>
-            </a:r>
-            <a:endParaRPr lang="en-US" sz="2800" dirty="0">
-              <a:solidFill>
-                <a:schemeClr val="bg1">
-                  <a:lumMod val="85000"/>
-                </a:schemeClr>
-              </a:solidFill>
-            </a:endParaRPr>
-          </a:p>
-        </p:txBody>
-      </p:sp>
-      <p:sp>
-        <p:nvSpPr>
-          <p:cNvPr id="13" name="Speech Bubble: Rectangle with Corners Rounded 12">
-            <a:extLst>
-              <a:ext uri="{FF2B5EF4-FFF2-40B4-BE49-F238E27FC236}">
-                <a16:creationId xmlns:a16="http://schemas.microsoft.com/office/drawing/2014/main" id="{71D3D2EF-54B2-4833-97F8-B3590056C5BF}"/>
-              </a:ext>
-            </a:extLst>
-          </p:cNvPr>
-          <p:cNvSpPr/>
-          <p:nvPr/>
-        </p:nvSpPr>
-        <p:spPr>
-          <a:xfrm>
-            <a:off x="8442149" y="2571747"/>
-            <a:ext cx="3559628" cy="2530929"/>
-          </a:xfrm>
-          <a:prstGeom prst="wedgeRoundRectCallout">
-            <a:avLst>
-              <a:gd name="adj1" fmla="val 1873"/>
-              <a:gd name="adj2" fmla="val 149274"/>
-              <a:gd name="adj3" fmla="val 16667"/>
-            </a:avLst>
-          </a:prstGeom>
-        </p:spPr>
-        <p:style>
-          <a:lnRef idx="2">
-            <a:schemeClr val="accent1">
-              <a:shade val="50000"/>
-            </a:schemeClr>
-          </a:lnRef>
-          <a:fillRef idx="1">
-            <a:schemeClr val="accent1"/>
-          </a:fillRef>
-          <a:effectRef idx="0">
-            <a:schemeClr val="accent1"/>
-          </a:effectRef>
-          <a:fontRef idx="minor">
-            <a:schemeClr val="lt1"/>
-          </a:fontRef>
-        </p:style>
-        <p:txBody>
-          <a:bodyPr rtlCol="0" anchor="ctr"/>
-          <a:lstStyle/>
-          <a:p>
-            <a:pPr algn="ctr"/>
-            <a:r>
-              <a:rPr lang="en-CA" sz="2800" dirty="0"/>
-              <a:t>Set language culture (configuration) before </a:t>
-            </a:r>
-            <a:r>
-              <a:rPr lang="en-US" sz="2800" dirty="0" err="1">
-                <a:solidFill>
-                  <a:schemeClr val="bg1">
-                    <a:lumMod val="85000"/>
-                  </a:schemeClr>
-                </a:solidFill>
-              </a:rPr>
-              <a:t>InitializeComponent</a:t>
-            </a:r>
-            <a:r>
-              <a:rPr lang="en-US" sz="2800" dirty="0">
-                <a:solidFill>
-                  <a:schemeClr val="bg1">
-                    <a:lumMod val="85000"/>
-                  </a:schemeClr>
-                </a:solidFill>
-              </a:rPr>
-              <a:t>()</a:t>
-            </a:r>
-          </a:p>
-        </p:txBody>
-      </p:sp>
-      <p:sp>
-        <p:nvSpPr>
-          <p:cNvPr id="14" name="Oval 13">
-            <a:extLst>
-              <a:ext uri="{FF2B5EF4-FFF2-40B4-BE49-F238E27FC236}">
-                <a16:creationId xmlns:a16="http://schemas.microsoft.com/office/drawing/2014/main" id="{00D65003-EE98-476B-9574-E2DCD96FCCA7}"/>
-              </a:ext>
-            </a:extLst>
-          </p:cNvPr>
-          <p:cNvSpPr/>
-          <p:nvPr/>
-        </p:nvSpPr>
-        <p:spPr>
-          <a:xfrm>
-            <a:off x="12645662" y="6838949"/>
-            <a:ext cx="2762251" cy="667585"/>
-          </a:xfrm>
-          <a:prstGeom prst="ellipse">
-            <a:avLst/>
-          </a:prstGeom>
-          <a:noFill/>
-          <a:ln w="38100">
-            <a:solidFill>
-              <a:srgbClr val="C00000"/>
-            </a:solidFill>
-          </a:ln>
-        </p:spPr>
-        <p:style>
-          <a:lnRef idx="2">
-            <a:schemeClr val="accent2"/>
-          </a:lnRef>
-          <a:fillRef idx="1">
-            <a:schemeClr val="lt1"/>
-          </a:fillRef>
-          <a:effectRef idx="0">
-            <a:schemeClr val="accent2"/>
-          </a:effectRef>
-          <a:fontRef idx="minor">
-            <a:schemeClr val="dk1"/>
-          </a:fontRef>
-        </p:style>
-        <p:txBody>
-          <a:bodyPr rtlCol="0" anchor="ctr"/>
-          <a:lstStyle/>
-          <a:p>
-            <a:pPr algn="ctr"/>
-            <a:endParaRPr lang="en-US"/>
-          </a:p>
-        </p:txBody>
-      </p:sp>
-      <p:sp>
-        <p:nvSpPr>
-          <p:cNvPr id="15" name="Speech Bubble: Rectangle with Corners Rounded 14">
-            <a:extLst>
-              <a:ext uri="{FF2B5EF4-FFF2-40B4-BE49-F238E27FC236}">
-                <a16:creationId xmlns:a16="http://schemas.microsoft.com/office/drawing/2014/main" id="{BA20947C-FBCE-45E8-98EF-07A83E44D4E6}"/>
-              </a:ext>
-            </a:extLst>
-          </p:cNvPr>
-          <p:cNvSpPr/>
-          <p:nvPr/>
-        </p:nvSpPr>
-        <p:spPr>
-          <a:xfrm>
-            <a:off x="15473231" y="9129557"/>
-            <a:ext cx="3559628" cy="2530929"/>
-          </a:xfrm>
-          <a:prstGeom prst="wedgeRoundRectCallout">
-            <a:avLst>
-              <a:gd name="adj1" fmla="val -72668"/>
-              <a:gd name="adj2" fmla="val -117178"/>
-              <a:gd name="adj3" fmla="val 16667"/>
-            </a:avLst>
-          </a:prstGeom>
-        </p:spPr>
-        <p:style>
-          <a:lnRef idx="2">
-            <a:schemeClr val="accent1">
-              <a:shade val="50000"/>
-            </a:schemeClr>
-          </a:lnRef>
-          <a:fillRef idx="1">
-            <a:schemeClr val="accent1"/>
-          </a:fillRef>
-          <a:effectRef idx="0">
-            <a:schemeClr val="accent1"/>
-          </a:effectRef>
-          <a:fontRef idx="minor">
-            <a:schemeClr val="lt1"/>
-          </a:fontRef>
-        </p:style>
-        <p:txBody>
-          <a:bodyPr rtlCol="0" anchor="ctr"/>
-          <a:lstStyle/>
-          <a:p>
-            <a:pPr algn="ctr"/>
-            <a:r>
-              <a:rPr lang="en-CA" sz="2800" dirty="0"/>
-              <a:t>Resources in </a:t>
-            </a:r>
-            <a:r>
-              <a:rPr lang="en-CA" sz="2800" dirty="0">
-                <a:solidFill>
-                  <a:schemeClr val="bg1">
-                    <a:lumMod val="85000"/>
-                  </a:schemeClr>
-                </a:solidFill>
-              </a:rPr>
-              <a:t>Properties</a:t>
-            </a:r>
-            <a:endParaRPr lang="en-US" sz="2800" dirty="0">
-              <a:solidFill>
-                <a:schemeClr val="bg1">
-                  <a:lumMod val="85000"/>
-                </a:schemeClr>
-              </a:solidFill>
-            </a:endParaRPr>
-          </a:p>
-        </p:txBody>
-      </p:sp>
-    </p:spTree>
-    <p:extLst>
-      <p:ext uri="{BB962C8B-B14F-4D97-AF65-F5344CB8AC3E}">
-        <p14:creationId xmlns:p14="http://schemas.microsoft.com/office/powerpoint/2010/main" val="2185895508"/>
       </p:ext>
     </p:extLst>
   </p:cSld>

</xml_diff>